<commit_message>
All Graphics.asm library rewritten and READY TO USE!!!
ALSO PRINTS DOTS!!!!! ................................

Signed-off-by: OmerWexler <omerwexler14@gmail.com>
</commit_message>
<xml_diff>
--- a/Screens/Presentation1.pptx
+++ b/Screens/Presentation1.pptx
@@ -433,7 +433,7 @@
           <a:p>
             <a:fld id="{3201D0F4-FCAE-4EF6-A237-A60763AE8455}" type="datetimeFigureOut">
               <a:rPr lang="en-US" smtClean="0"/>
-              <a:t>5/22/2019</a:t>
+              <a:t>5/23/2019</a:t>
             </a:fld>
             <a:endParaRPr lang="en-US"/>
           </a:p>
@@ -631,7 +631,7 @@
           <a:p>
             <a:fld id="{3201D0F4-FCAE-4EF6-A237-A60763AE8455}" type="datetimeFigureOut">
               <a:rPr lang="en-US" smtClean="0"/>
-              <a:t>5/22/2019</a:t>
+              <a:t>5/23/2019</a:t>
             </a:fld>
             <a:endParaRPr lang="en-US"/>
           </a:p>
@@ -839,7 +839,7 @@
           <a:p>
             <a:fld id="{3201D0F4-FCAE-4EF6-A237-A60763AE8455}" type="datetimeFigureOut">
               <a:rPr lang="en-US" smtClean="0"/>
-              <a:t>5/22/2019</a:t>
+              <a:t>5/23/2019</a:t>
             </a:fld>
             <a:endParaRPr lang="en-US"/>
           </a:p>
@@ -1037,7 +1037,7 @@
           <a:p>
             <a:fld id="{3201D0F4-FCAE-4EF6-A237-A60763AE8455}" type="datetimeFigureOut">
               <a:rPr lang="en-US" smtClean="0"/>
-              <a:t>5/22/2019</a:t>
+              <a:t>5/23/2019</a:t>
             </a:fld>
             <a:endParaRPr lang="en-US"/>
           </a:p>
@@ -1312,7 +1312,7 @@
           <a:p>
             <a:fld id="{3201D0F4-FCAE-4EF6-A237-A60763AE8455}" type="datetimeFigureOut">
               <a:rPr lang="en-US" smtClean="0"/>
-              <a:t>5/22/2019</a:t>
+              <a:t>5/23/2019</a:t>
             </a:fld>
             <a:endParaRPr lang="en-US"/>
           </a:p>
@@ -1577,7 +1577,7 @@
           <a:p>
             <a:fld id="{3201D0F4-FCAE-4EF6-A237-A60763AE8455}" type="datetimeFigureOut">
               <a:rPr lang="en-US" smtClean="0"/>
-              <a:t>5/22/2019</a:t>
+              <a:t>5/23/2019</a:t>
             </a:fld>
             <a:endParaRPr lang="en-US"/>
           </a:p>
@@ -1989,7 +1989,7 @@
           <a:p>
             <a:fld id="{3201D0F4-FCAE-4EF6-A237-A60763AE8455}" type="datetimeFigureOut">
               <a:rPr lang="en-US" smtClean="0"/>
-              <a:t>5/22/2019</a:t>
+              <a:t>5/23/2019</a:t>
             </a:fld>
             <a:endParaRPr lang="en-US"/>
           </a:p>
@@ -2130,7 +2130,7 @@
           <a:p>
             <a:fld id="{3201D0F4-FCAE-4EF6-A237-A60763AE8455}" type="datetimeFigureOut">
               <a:rPr lang="en-US" smtClean="0"/>
-              <a:t>5/22/2019</a:t>
+              <a:t>5/23/2019</a:t>
             </a:fld>
             <a:endParaRPr lang="en-US"/>
           </a:p>
@@ -2243,7 +2243,7 @@
           <a:p>
             <a:fld id="{3201D0F4-FCAE-4EF6-A237-A60763AE8455}" type="datetimeFigureOut">
               <a:rPr lang="en-US" smtClean="0"/>
-              <a:t>5/22/2019</a:t>
+              <a:t>5/23/2019</a:t>
             </a:fld>
             <a:endParaRPr lang="en-US"/>
           </a:p>
@@ -2554,7 +2554,7 @@
           <a:p>
             <a:fld id="{3201D0F4-FCAE-4EF6-A237-A60763AE8455}" type="datetimeFigureOut">
               <a:rPr lang="en-US" smtClean="0"/>
-              <a:t>5/22/2019</a:t>
+              <a:t>5/23/2019</a:t>
             </a:fld>
             <a:endParaRPr lang="en-US"/>
           </a:p>
@@ -2842,7 +2842,7 @@
           <a:p>
             <a:fld id="{3201D0F4-FCAE-4EF6-A237-A60763AE8455}" type="datetimeFigureOut">
               <a:rPr lang="en-US" smtClean="0"/>
-              <a:t>5/22/2019</a:t>
+              <a:t>5/23/2019</a:t>
             </a:fld>
             <a:endParaRPr lang="en-US"/>
           </a:p>
@@ -3092,7 +3092,7 @@
           <a:p>
             <a:fld id="{3201D0F4-FCAE-4EF6-A237-A60763AE8455}" type="datetimeFigureOut">
               <a:rPr lang="en-US" smtClean="0"/>
-              <a:t>5/22/2019</a:t>
+              <a:t>5/23/2019</a:t>
             </a:fld>
             <a:endParaRPr lang="en-US"/>
           </a:p>
@@ -26681,7 +26681,7 @@
                 </a:solidFill>
                 <a:latin typeface="Impact" panose="020B0806030902050204" pitchFamily="34" charset="0"/>
               </a:rPr>
-              <a:t>1 2 3 4 5 6 7 8 9 </a:t>
+              <a:t>1 2 3 4 5 6 7 8 9 0 .</a:t>
             </a:r>
           </a:p>
         </p:txBody>

</xml_diff>

<commit_message>
Project is now fully done and working.
Signed-off-by: OmerWexler <omerwexler14@gmail.com>
</commit_message>
<xml_diff>
--- a/Screens/Presentation1.pptx
+++ b/Screens/Presentation1.pptx
@@ -46,18 +46,16 @@
     <p:sldId id="323" r:id="rId40"/>
     <p:sldId id="272" r:id="rId41"/>
     <p:sldId id="340" r:id="rId42"/>
-    <p:sldId id="274" r:id="rId43"/>
-    <p:sldId id="341" r:id="rId44"/>
-    <p:sldId id="273" r:id="rId45"/>
-    <p:sldId id="335" r:id="rId46"/>
-    <p:sldId id="324" r:id="rId47"/>
-    <p:sldId id="278" r:id="rId48"/>
-    <p:sldId id="325" r:id="rId49"/>
-    <p:sldId id="306" r:id="rId50"/>
-    <p:sldId id="308" r:id="rId51"/>
-    <p:sldId id="336" r:id="rId52"/>
-    <p:sldId id="326" r:id="rId53"/>
-    <p:sldId id="337" r:id="rId54"/>
+    <p:sldId id="273" r:id="rId43"/>
+    <p:sldId id="335" r:id="rId44"/>
+    <p:sldId id="324" r:id="rId45"/>
+    <p:sldId id="278" r:id="rId46"/>
+    <p:sldId id="325" r:id="rId47"/>
+    <p:sldId id="306" r:id="rId48"/>
+    <p:sldId id="308" r:id="rId49"/>
+    <p:sldId id="336" r:id="rId50"/>
+    <p:sldId id="326" r:id="rId51"/>
+    <p:sldId id="337" r:id="rId52"/>
   </p:sldIdLst>
   <p:sldSz cx="12192000" cy="6858000"/>
   <p:notesSz cx="6858000" cy="9144000"/>
@@ -234,8 +232,6 @@
           <p14:sldIdLst>
             <p14:sldId id="272"/>
             <p14:sldId id="340"/>
-            <p14:sldId id="274"/>
-            <p14:sldId id="341"/>
             <p14:sldId id="273"/>
             <p14:sldId id="335"/>
             <p14:sldId id="324"/>
@@ -20718,15 +20714,12 @@
             </a:r>
           </a:p>
           <a:p>
-            <a:r>
-              <a:rPr lang="en-US" sz="4000" spc="300" dirty="0">
-                <a:solidFill>
-                  <a:srgbClr val="2EEE53"/>
-                </a:solidFill>
-                <a:latin typeface="Impact" panose="020B0806030902050204" pitchFamily="34" charset="0"/>
-              </a:rPr>
-              <a:t>		</a:t>
-            </a:r>
+            <a:endParaRPr lang="en-US" sz="4000" spc="300" dirty="0">
+              <a:solidFill>
+                <a:srgbClr val="2EEE53"/>
+              </a:solidFill>
+              <a:latin typeface="Impact" panose="020B0806030902050204" pitchFamily="34" charset="0"/>
+            </a:endParaRPr>
           </a:p>
           <a:p>
             <a:r>
@@ -21653,35 +21646,17 @@
                 </a:solidFill>
                 <a:latin typeface="Impact" panose="020B0806030902050204" pitchFamily="34" charset="0"/>
               </a:rPr>
-              <a:t>	</a:t>
-            </a:r>
-            <a:r>
-              <a:rPr lang="en-US" sz="4000" spc="300" dirty="0">
-                <a:solidFill>
-                  <a:srgbClr val="C00000"/>
-                </a:solidFill>
-                <a:latin typeface="Impact" panose="020B0806030902050204" pitchFamily="34" charset="0"/>
-              </a:rPr>
-              <a:t>INVALID PASSWORD</a:t>
-            </a:r>
-            <a:r>
-              <a:rPr lang="en-US" sz="4000" spc="300" dirty="0">
-                <a:solidFill>
-                  <a:srgbClr val="2EEE53"/>
-                </a:solidFill>
-                <a:latin typeface="Impact" panose="020B0806030902050204" pitchFamily="34" charset="0"/>
-              </a:rPr>
-              <a:t> 		</a:t>
-            </a:r>
-          </a:p>
-        </p:txBody>
-      </p:sp>
-      <p:sp>
-        <p:nvSpPr>
-          <p:cNvPr id="6" name="Rectangle: Diagonal Corners Snipped 5">
-            <a:extLst>
-              <a:ext uri="{FF2B5EF4-FFF2-40B4-BE49-F238E27FC236}">
-                <a16:creationId xmlns:a16="http://schemas.microsoft.com/office/drawing/2014/main" id="{5C762463-6390-4D1A-84BA-98320DEC8CBB}"/>
+              <a:t>		</a:t>
+            </a:r>
+          </a:p>
+        </p:txBody>
+      </p:sp>
+      <p:sp>
+        <p:nvSpPr>
+          <p:cNvPr id="12" name="Rectangle: Diagonal Corners Snipped 11">
+            <a:extLst>
+              <a:ext uri="{FF2B5EF4-FFF2-40B4-BE49-F238E27FC236}">
+                <a16:creationId xmlns:a16="http://schemas.microsoft.com/office/drawing/2014/main" id="{3E074101-ED45-47F3-9880-70918F77EFA1}"/>
               </a:ext>
             </a:extLst>
           </p:cNvPr>
@@ -21738,10 +21713,10 @@
       </p:sp>
       <p:sp>
         <p:nvSpPr>
-          <p:cNvPr id="7" name="TextBox 6">
-            <a:extLst>
-              <a:ext uri="{FF2B5EF4-FFF2-40B4-BE49-F238E27FC236}">
-                <a16:creationId xmlns:a16="http://schemas.microsoft.com/office/drawing/2014/main" id="{EF017451-16EB-4FBC-BDE5-11997050F072}"/>
+          <p:cNvPr id="13" name="TextBox 12">
+            <a:extLst>
+              <a:ext uri="{FF2B5EF4-FFF2-40B4-BE49-F238E27FC236}">
+                <a16:creationId xmlns:a16="http://schemas.microsoft.com/office/drawing/2014/main" id="{F6C5A567-CA49-4B3F-80DD-23A87F15C3B9}"/>
               </a:ext>
             </a:extLst>
           </p:cNvPr>
@@ -21783,10 +21758,117 @@
           </a:p>
         </p:txBody>
       </p:sp>
+      <p:sp>
+        <p:nvSpPr>
+          <p:cNvPr id="14" name="Rectangle: Diagonal Corners Snipped 13">
+            <a:extLst>
+              <a:ext uri="{FF2B5EF4-FFF2-40B4-BE49-F238E27FC236}">
+                <a16:creationId xmlns:a16="http://schemas.microsoft.com/office/drawing/2014/main" id="{E16ADE09-3ABF-4074-9FBA-50D4D778B3C4}"/>
+              </a:ext>
+            </a:extLst>
+          </p:cNvPr>
+          <p:cNvSpPr/>
+          <p:nvPr/>
+        </p:nvSpPr>
+        <p:spPr>
+          <a:xfrm rot="10800000">
+            <a:off x="10738872" y="5953927"/>
+            <a:ext cx="1757927" cy="579598"/>
+          </a:xfrm>
+          <a:prstGeom prst="snip2DiagRect">
+            <a:avLst>
+              <a:gd name="adj1" fmla="val 50000"/>
+              <a:gd name="adj2" fmla="val 0"/>
+            </a:avLst>
+          </a:prstGeom>
+          <a:solidFill>
+            <a:schemeClr val="tx1">
+              <a:alpha val="60000"/>
+            </a:schemeClr>
+          </a:solidFill>
+          <a:ln w="95250">
+            <a:solidFill>
+              <a:schemeClr val="bg1"/>
+            </a:solidFill>
+          </a:ln>
+          <a:effectLst/>
+        </p:spPr>
+        <p:style>
+          <a:lnRef idx="2">
+            <a:schemeClr val="accent1">
+              <a:shade val="50000"/>
+            </a:schemeClr>
+          </a:lnRef>
+          <a:fillRef idx="1">
+            <a:schemeClr val="accent1"/>
+          </a:fillRef>
+          <a:effectRef idx="0">
+            <a:schemeClr val="accent1"/>
+          </a:effectRef>
+          <a:fontRef idx="minor">
+            <a:schemeClr val="lt1"/>
+          </a:fontRef>
+        </p:style>
+        <p:txBody>
+          <a:bodyPr rtlCol="0" anchor="ctr"/>
+          <a:lstStyle/>
+          <a:p>
+            <a:pPr algn="ctr"/>
+            <a:endParaRPr lang="en-US" dirty="0"/>
+          </a:p>
+        </p:txBody>
+      </p:sp>
+      <p:sp>
+        <p:nvSpPr>
+          <p:cNvPr id="17" name="TextBox 16">
+            <a:extLst>
+              <a:ext uri="{FF2B5EF4-FFF2-40B4-BE49-F238E27FC236}">
+                <a16:creationId xmlns:a16="http://schemas.microsoft.com/office/drawing/2014/main" id="{716C6318-4E35-425B-86F1-3EA4B10658A7}"/>
+              </a:ext>
+            </a:extLst>
+          </p:cNvPr>
+          <p:cNvSpPr txBox="1"/>
+          <p:nvPr/>
+        </p:nvSpPr>
+        <p:spPr>
+          <a:xfrm>
+            <a:off x="10817937" y="5953929"/>
+            <a:ext cx="1588814" cy="584775"/>
+          </a:xfrm>
+          <a:prstGeom prst="rect">
+            <a:avLst/>
+          </a:prstGeom>
+          <a:noFill/>
+        </p:spPr>
+        <p:txBody>
+          <a:bodyPr wrap="square" rtlCol="0">
+            <a:spAutoFit/>
+          </a:bodyPr>
+          <a:lstStyle/>
+          <a:p>
+            <a:pPr algn="ctr"/>
+            <a:r>
+              <a:rPr lang="en-US" sz="3200" spc="300" dirty="0">
+                <a:solidFill>
+                  <a:srgbClr val="2EEE53"/>
+                </a:solidFill>
+                <a:latin typeface="Impact" panose="020B0806030902050204" pitchFamily="34" charset="0"/>
+              </a:rPr>
+              <a:t>Next</a:t>
+            </a:r>
+            <a:endParaRPr lang="en-US" sz="8000" spc="300" dirty="0">
+              <a:solidFill>
+                <a:srgbClr val="2EEE53"/>
+              </a:solidFill>
+              <a:latin typeface="Impact" panose="020B0806030902050204" pitchFamily="34" charset="0"/>
+            </a:endParaRPr>
+          </a:p>
+        </p:txBody>
+      </p:sp>
     </p:spTree>
     <p:extLst>
       <p:ext uri="{BB962C8B-B14F-4D97-AF65-F5344CB8AC3E}">
-        <p14:creationId xmlns:p14="http://schemas.microsoft.com/office/powerpoint/2010/main" val="2155612871"/>
+        <p14:creationId xmlns:p14="http://schemas.microsoft.com/office/powerpoint/2010/main" val="1430053362"/>
       </p:ext>
     </p:extLst>
   </p:cSld>
@@ -22124,35 +22206,17 @@
                 </a:solidFill>
                 <a:latin typeface="Impact" panose="020B0806030902050204" pitchFamily="34" charset="0"/>
               </a:rPr>
-              <a:t>	</a:t>
-            </a:r>
-            <a:r>
-              <a:rPr lang="en-US" sz="4000" spc="300" dirty="0">
-                <a:solidFill>
-                  <a:srgbClr val="C00000"/>
-                </a:solidFill>
-                <a:latin typeface="Impact" panose="020B0806030902050204" pitchFamily="34" charset="0"/>
-              </a:rPr>
-              <a:t>INVALID PASSWORD</a:t>
-            </a:r>
-            <a:r>
-              <a:rPr lang="en-US" sz="4000" spc="300" dirty="0">
-                <a:solidFill>
-                  <a:srgbClr val="2EEE53"/>
-                </a:solidFill>
-                <a:latin typeface="Impact" panose="020B0806030902050204" pitchFamily="34" charset="0"/>
-              </a:rPr>
-              <a:t> 		</a:t>
-            </a:r>
-          </a:p>
-        </p:txBody>
-      </p:sp>
-      <p:sp>
-        <p:nvSpPr>
-          <p:cNvPr id="8" name="Rectangle: Diagonal Corners Snipped 7">
-            <a:extLst>
-              <a:ext uri="{FF2B5EF4-FFF2-40B4-BE49-F238E27FC236}">
-                <a16:creationId xmlns:a16="http://schemas.microsoft.com/office/drawing/2014/main" id="{C84AB837-A347-493E-90EF-C79BB57576EF}"/>
+              <a:t>			</a:t>
+            </a:r>
+          </a:p>
+        </p:txBody>
+      </p:sp>
+      <p:sp>
+        <p:nvSpPr>
+          <p:cNvPr id="12" name="Rectangle: Diagonal Corners Snipped 11">
+            <a:extLst>
+              <a:ext uri="{FF2B5EF4-FFF2-40B4-BE49-F238E27FC236}">
+                <a16:creationId xmlns:a16="http://schemas.microsoft.com/office/drawing/2014/main" id="{3E074101-ED45-47F3-9880-70918F77EFA1}"/>
               </a:ext>
             </a:extLst>
           </p:cNvPr>
@@ -22209,10 +22273,10 @@
       </p:sp>
       <p:sp>
         <p:nvSpPr>
-          <p:cNvPr id="9" name="TextBox 8">
-            <a:extLst>
-              <a:ext uri="{FF2B5EF4-FFF2-40B4-BE49-F238E27FC236}">
-                <a16:creationId xmlns:a16="http://schemas.microsoft.com/office/drawing/2014/main" id="{8B85961F-5AA2-45C5-BE1A-DB844C3F55EB}"/>
+          <p:cNvPr id="13" name="TextBox 12">
+            <a:extLst>
+              <a:ext uri="{FF2B5EF4-FFF2-40B4-BE49-F238E27FC236}">
+                <a16:creationId xmlns:a16="http://schemas.microsoft.com/office/drawing/2014/main" id="{F6C5A567-CA49-4B3F-80DD-23A87F15C3B9}"/>
               </a:ext>
             </a:extLst>
           </p:cNvPr>
@@ -22254,10 +22318,117 @@
           </a:p>
         </p:txBody>
       </p:sp>
+      <p:sp>
+        <p:nvSpPr>
+          <p:cNvPr id="14" name="Rectangle: Diagonal Corners Snipped 13">
+            <a:extLst>
+              <a:ext uri="{FF2B5EF4-FFF2-40B4-BE49-F238E27FC236}">
+                <a16:creationId xmlns:a16="http://schemas.microsoft.com/office/drawing/2014/main" id="{E16ADE09-3ABF-4074-9FBA-50D4D778B3C4}"/>
+              </a:ext>
+            </a:extLst>
+          </p:cNvPr>
+          <p:cNvSpPr/>
+          <p:nvPr/>
+        </p:nvSpPr>
+        <p:spPr>
+          <a:xfrm rot="10800000">
+            <a:off x="10738872" y="5953927"/>
+            <a:ext cx="1757927" cy="579598"/>
+          </a:xfrm>
+          <a:prstGeom prst="snip2DiagRect">
+            <a:avLst>
+              <a:gd name="adj1" fmla="val 50000"/>
+              <a:gd name="adj2" fmla="val 0"/>
+            </a:avLst>
+          </a:prstGeom>
+          <a:solidFill>
+            <a:schemeClr val="tx1">
+              <a:alpha val="60000"/>
+            </a:schemeClr>
+          </a:solidFill>
+          <a:ln w="95250">
+            <a:solidFill>
+              <a:schemeClr val="bg1"/>
+            </a:solidFill>
+          </a:ln>
+          <a:effectLst/>
+        </p:spPr>
+        <p:style>
+          <a:lnRef idx="2">
+            <a:schemeClr val="accent1">
+              <a:shade val="50000"/>
+            </a:schemeClr>
+          </a:lnRef>
+          <a:fillRef idx="1">
+            <a:schemeClr val="accent1"/>
+          </a:fillRef>
+          <a:effectRef idx="0">
+            <a:schemeClr val="accent1"/>
+          </a:effectRef>
+          <a:fontRef idx="minor">
+            <a:schemeClr val="lt1"/>
+          </a:fontRef>
+        </p:style>
+        <p:txBody>
+          <a:bodyPr rtlCol="0" anchor="ctr"/>
+          <a:lstStyle/>
+          <a:p>
+            <a:pPr algn="ctr"/>
+            <a:endParaRPr lang="en-US" dirty="0"/>
+          </a:p>
+        </p:txBody>
+      </p:sp>
+      <p:sp>
+        <p:nvSpPr>
+          <p:cNvPr id="17" name="TextBox 16">
+            <a:extLst>
+              <a:ext uri="{FF2B5EF4-FFF2-40B4-BE49-F238E27FC236}">
+                <a16:creationId xmlns:a16="http://schemas.microsoft.com/office/drawing/2014/main" id="{716C6318-4E35-425B-86F1-3EA4B10658A7}"/>
+              </a:ext>
+            </a:extLst>
+          </p:cNvPr>
+          <p:cNvSpPr txBox="1"/>
+          <p:nvPr/>
+        </p:nvSpPr>
+        <p:spPr>
+          <a:xfrm>
+            <a:off x="10817937" y="5953929"/>
+            <a:ext cx="1588814" cy="584775"/>
+          </a:xfrm>
+          <a:prstGeom prst="rect">
+            <a:avLst/>
+          </a:prstGeom>
+          <a:noFill/>
+        </p:spPr>
+        <p:txBody>
+          <a:bodyPr wrap="square" rtlCol="0">
+            <a:spAutoFit/>
+          </a:bodyPr>
+          <a:lstStyle/>
+          <a:p>
+            <a:pPr algn="ctr"/>
+            <a:r>
+              <a:rPr lang="en-US" sz="3200" spc="300" dirty="0">
+                <a:solidFill>
+                  <a:srgbClr val="2EEE53"/>
+                </a:solidFill>
+                <a:latin typeface="Impact" panose="020B0806030902050204" pitchFamily="34" charset="0"/>
+              </a:rPr>
+              <a:t>Next</a:t>
+            </a:r>
+            <a:endParaRPr lang="en-US" sz="8000" spc="300" dirty="0">
+              <a:solidFill>
+                <a:srgbClr val="2EEE53"/>
+              </a:solidFill>
+              <a:latin typeface="Impact" panose="020B0806030902050204" pitchFamily="34" charset="0"/>
+            </a:endParaRPr>
+          </a:p>
+        </p:txBody>
+      </p:sp>
     </p:spTree>
     <p:extLst>
       <p:ext uri="{BB962C8B-B14F-4D97-AF65-F5344CB8AC3E}">
-        <p14:creationId xmlns:p14="http://schemas.microsoft.com/office/powerpoint/2010/main" val="3972882602"/>
+        <p14:creationId xmlns:p14="http://schemas.microsoft.com/office/powerpoint/2010/main" val="309062697"/>
       </p:ext>
     </p:extLst>
   </p:cSld>
@@ -22737,7 +22908,7 @@
           </a:solidFill>
           <a:ln w="95250">
             <a:solidFill>
-              <a:schemeClr val="bg1"/>
+              <a:srgbClr val="2EEE53"/>
             </a:solidFill>
           </a:ln>
           <a:effectLst/>
@@ -22817,7 +22988,7 @@
     </p:spTree>
     <p:extLst>
       <p:ext uri="{BB962C8B-B14F-4D97-AF65-F5344CB8AC3E}">
-        <p14:creationId xmlns:p14="http://schemas.microsoft.com/office/powerpoint/2010/main" val="1430053362"/>
+        <p14:creationId xmlns:p14="http://schemas.microsoft.com/office/powerpoint/2010/main" val="719850693"/>
       </p:ext>
     </p:extLst>
   </p:cSld>
@@ -22946,7 +23117,7 @@
                 </a:solidFill>
                 <a:latin typeface="Impact" panose="020B0806030902050204" pitchFamily="34" charset="0"/>
               </a:rPr>
-              <a:t>The Encryption :</a:t>
+              <a:t>The Encryption:</a:t>
             </a:r>
           </a:p>
         </p:txBody>
@@ -23026,7 +23197,7 @@
         <p:spPr>
           <a:xfrm>
             <a:off x="0" y="2137947"/>
-            <a:ext cx="11719560" cy="3785652"/>
+            <a:ext cx="11719560" cy="2554545"/>
           </a:xfrm>
           <a:prstGeom prst="rect">
             <a:avLst/>
@@ -23046,338 +23217,45 @@
                 </a:solidFill>
                 <a:latin typeface="Impact" panose="020B0806030902050204" pitchFamily="34" charset="0"/>
               </a:rPr>
-              <a:t>Great name, now please choose a password:</a:t>
-            </a:r>
-          </a:p>
-          <a:p>
-            <a:r>
-              <a:rPr lang="en-US" sz="4000" spc="300" dirty="0">
-                <a:solidFill>
-                  <a:srgbClr val="2EEE53"/>
-                </a:solidFill>
-                <a:latin typeface="Impact" panose="020B0806030902050204" pitchFamily="34" charset="0"/>
-              </a:rPr>
-              <a:t>	- Must be </a:t>
-            </a:r>
-            <a:r>
-              <a:rPr lang="en-US" sz="4000" b="1" u="sng" spc="300" dirty="0">
-                <a:solidFill>
-                  <a:srgbClr val="2EEE53"/>
-                </a:solidFill>
-                <a:latin typeface="Impact" panose="020B0806030902050204" pitchFamily="34" charset="0"/>
-              </a:rPr>
-              <a:t>SHORTER</a:t>
-            </a:r>
-            <a:r>
-              <a:rPr lang="en-US" sz="4000" spc="300" dirty="0">
-                <a:solidFill>
-                  <a:srgbClr val="2EEE53"/>
-                </a:solidFill>
-                <a:latin typeface="Impact" panose="020B0806030902050204" pitchFamily="34" charset="0"/>
-              </a:rPr>
-              <a:t> then 16 letters. </a:t>
-            </a:r>
-          </a:p>
-          <a:p>
-            <a:r>
-              <a:rPr lang="en-US" sz="4000" spc="300" dirty="0">
-                <a:solidFill>
-                  <a:srgbClr val="2EEE53"/>
-                </a:solidFill>
-                <a:latin typeface="Impact" panose="020B0806030902050204" pitchFamily="34" charset="0"/>
-              </a:rPr>
-              <a:t>	- Must include only </a:t>
-            </a:r>
-            <a:r>
-              <a:rPr lang="en-US" sz="4000" b="1" u="sng" spc="300" dirty="0">
-                <a:solidFill>
-                  <a:srgbClr val="2EEE53"/>
-                </a:solidFill>
-                <a:latin typeface="Impact" panose="020B0806030902050204" pitchFamily="34" charset="0"/>
-              </a:rPr>
-              <a:t>LETTERS</a:t>
-            </a:r>
-            <a:r>
-              <a:rPr lang="en-US" sz="4000" spc="300" dirty="0">
-                <a:solidFill>
-                  <a:srgbClr val="2EEE53"/>
-                </a:solidFill>
-                <a:latin typeface="Impact" panose="020B0806030902050204" pitchFamily="34" charset="0"/>
-              </a:rPr>
-              <a:t>, and </a:t>
-            </a:r>
-            <a:r>
-              <a:rPr lang="en-US" sz="4000" b="1" u="sng" spc="300" dirty="0">
-                <a:solidFill>
-                  <a:srgbClr val="2EEE53"/>
-                </a:solidFill>
-                <a:latin typeface="Impact" panose="020B0806030902050204" pitchFamily="34" charset="0"/>
-              </a:rPr>
-              <a:t>NUMBERS</a:t>
-            </a:r>
-            <a:r>
-              <a:rPr lang="en-US" sz="4000" spc="300" dirty="0">
-                <a:solidFill>
-                  <a:srgbClr val="2EEE53"/>
-                </a:solidFill>
-                <a:latin typeface="Impact" panose="020B0806030902050204" pitchFamily="34" charset="0"/>
-              </a:rPr>
-              <a:t>.</a:t>
-            </a:r>
-          </a:p>
-          <a:p>
-            <a:r>
-              <a:rPr lang="en-US" sz="4000" spc="300" dirty="0">
-                <a:solidFill>
-                  <a:srgbClr val="2EEE53"/>
-                </a:solidFill>
-                <a:latin typeface="Impact" panose="020B0806030902050204" pitchFamily="34" charset="0"/>
-              </a:rPr>
-              <a:t>		</a:t>
-            </a:r>
-          </a:p>
-          <a:p>
-            <a:r>
-              <a:rPr lang="en-US" sz="4000" spc="300" dirty="0">
-                <a:solidFill>
-                  <a:srgbClr val="2EEE53"/>
-                </a:solidFill>
-                <a:latin typeface="Impact" panose="020B0806030902050204" pitchFamily="34" charset="0"/>
-              </a:rPr>
-              <a:t>	Password:</a:t>
-            </a:r>
-          </a:p>
-          <a:p>
-            <a:r>
-              <a:rPr lang="en-US" sz="4000" spc="300" dirty="0">
-                <a:solidFill>
-                  <a:srgbClr val="2EEE53"/>
-                </a:solidFill>
-                <a:latin typeface="Impact" panose="020B0806030902050204" pitchFamily="34" charset="0"/>
-              </a:rPr>
-              <a:t>	VALID PASSWORD 		</a:t>
-            </a:r>
-          </a:p>
-        </p:txBody>
-      </p:sp>
-      <p:sp>
-        <p:nvSpPr>
-          <p:cNvPr id="12" name="Rectangle: Diagonal Corners Snipped 11">
-            <a:extLst>
-              <a:ext uri="{FF2B5EF4-FFF2-40B4-BE49-F238E27FC236}">
-                <a16:creationId xmlns:a16="http://schemas.microsoft.com/office/drawing/2014/main" id="{3E074101-ED45-47F3-9880-70918F77EFA1}"/>
-              </a:ext>
-            </a:extLst>
-          </p:cNvPr>
-          <p:cNvSpPr/>
-          <p:nvPr/>
-        </p:nvSpPr>
-        <p:spPr>
-          <a:xfrm rot="10800000">
-            <a:off x="-302508" y="5954995"/>
-            <a:ext cx="1757927" cy="579598"/>
-          </a:xfrm>
-          <a:prstGeom prst="snip2DiagRect">
-            <a:avLst>
-              <a:gd name="adj1" fmla="val 50000"/>
-              <a:gd name="adj2" fmla="val 0"/>
-            </a:avLst>
-          </a:prstGeom>
-          <a:solidFill>
-            <a:schemeClr val="tx1">
-              <a:alpha val="60000"/>
-            </a:schemeClr>
-          </a:solidFill>
-          <a:ln w="95250">
-            <a:solidFill>
-              <a:srgbClr val="C00000"/>
-            </a:solidFill>
-          </a:ln>
-          <a:effectLst/>
-        </p:spPr>
-        <p:style>
-          <a:lnRef idx="2">
-            <a:schemeClr val="accent1">
-              <a:shade val="50000"/>
-            </a:schemeClr>
-          </a:lnRef>
-          <a:fillRef idx="1">
-            <a:schemeClr val="accent1"/>
-          </a:fillRef>
-          <a:effectRef idx="0">
-            <a:schemeClr val="accent1"/>
-          </a:effectRef>
-          <a:fontRef idx="minor">
-            <a:schemeClr val="lt1"/>
-          </a:fontRef>
-        </p:style>
-        <p:txBody>
-          <a:bodyPr rtlCol="0" anchor="ctr"/>
-          <a:lstStyle/>
-          <a:p>
-            <a:pPr algn="ctr"/>
-            <a:endParaRPr lang="en-US" dirty="0"/>
-          </a:p>
-        </p:txBody>
-      </p:sp>
-      <p:sp>
-        <p:nvSpPr>
-          <p:cNvPr id="13" name="TextBox 12">
-            <a:extLst>
-              <a:ext uri="{FF2B5EF4-FFF2-40B4-BE49-F238E27FC236}">
-                <a16:creationId xmlns:a16="http://schemas.microsoft.com/office/drawing/2014/main" id="{F6C5A567-CA49-4B3F-80DD-23A87F15C3B9}"/>
-              </a:ext>
-            </a:extLst>
-          </p:cNvPr>
-          <p:cNvSpPr txBox="1"/>
-          <p:nvPr/>
-        </p:nvSpPr>
-        <p:spPr>
-          <a:xfrm>
-            <a:off x="-223443" y="5954997"/>
-            <a:ext cx="1588814" cy="584775"/>
-          </a:xfrm>
-          <a:prstGeom prst="rect">
-            <a:avLst/>
-          </a:prstGeom>
-          <a:noFill/>
-        </p:spPr>
-        <p:txBody>
-          <a:bodyPr wrap="square" rtlCol="0">
-            <a:spAutoFit/>
-          </a:bodyPr>
-          <a:lstStyle/>
-          <a:p>
-            <a:pPr algn="ctr"/>
-            <a:r>
-              <a:rPr lang="en-US" sz="3200" spc="300" dirty="0">
-                <a:solidFill>
-                  <a:srgbClr val="C00000"/>
-                </a:solidFill>
-                <a:latin typeface="Impact" panose="020B0806030902050204" pitchFamily="34" charset="0"/>
-              </a:rPr>
-              <a:t>Back</a:t>
-            </a:r>
-            <a:endParaRPr lang="en-US" sz="8000" spc="300" dirty="0">
-              <a:solidFill>
-                <a:srgbClr val="C00000"/>
-              </a:solidFill>
-              <a:latin typeface="Impact" panose="020B0806030902050204" pitchFamily="34" charset="0"/>
-            </a:endParaRPr>
-          </a:p>
-        </p:txBody>
-      </p:sp>
-      <p:sp>
-        <p:nvSpPr>
-          <p:cNvPr id="14" name="Rectangle: Diagonal Corners Snipped 13">
-            <a:extLst>
-              <a:ext uri="{FF2B5EF4-FFF2-40B4-BE49-F238E27FC236}">
-                <a16:creationId xmlns:a16="http://schemas.microsoft.com/office/drawing/2014/main" id="{E16ADE09-3ABF-4074-9FBA-50D4D778B3C4}"/>
-              </a:ext>
-            </a:extLst>
-          </p:cNvPr>
-          <p:cNvSpPr/>
-          <p:nvPr/>
-        </p:nvSpPr>
-        <p:spPr>
-          <a:xfrm rot="10800000">
-            <a:off x="10738872" y="5953927"/>
-            <a:ext cx="1757927" cy="579598"/>
-          </a:xfrm>
-          <a:prstGeom prst="snip2DiagRect">
-            <a:avLst>
-              <a:gd name="adj1" fmla="val 50000"/>
-              <a:gd name="adj2" fmla="val 0"/>
-            </a:avLst>
-          </a:prstGeom>
-          <a:solidFill>
-            <a:schemeClr val="tx1">
-              <a:alpha val="60000"/>
-            </a:schemeClr>
-          </a:solidFill>
-          <a:ln w="95250">
-            <a:solidFill>
-              <a:schemeClr val="bg1"/>
-            </a:solidFill>
-          </a:ln>
-          <a:effectLst/>
-        </p:spPr>
-        <p:style>
-          <a:lnRef idx="2">
-            <a:schemeClr val="accent1">
-              <a:shade val="50000"/>
-            </a:schemeClr>
-          </a:lnRef>
-          <a:fillRef idx="1">
-            <a:schemeClr val="accent1"/>
-          </a:fillRef>
-          <a:effectRef idx="0">
-            <a:schemeClr val="accent1"/>
-          </a:effectRef>
-          <a:fontRef idx="minor">
-            <a:schemeClr val="lt1"/>
-          </a:fontRef>
-        </p:style>
-        <p:txBody>
-          <a:bodyPr rtlCol="0" anchor="ctr"/>
-          <a:lstStyle/>
-          <a:p>
-            <a:pPr algn="ctr"/>
-            <a:endParaRPr lang="en-US" dirty="0"/>
-          </a:p>
-        </p:txBody>
-      </p:sp>
-      <p:sp>
-        <p:nvSpPr>
-          <p:cNvPr id="17" name="TextBox 16">
-            <a:extLst>
-              <a:ext uri="{FF2B5EF4-FFF2-40B4-BE49-F238E27FC236}">
-                <a16:creationId xmlns:a16="http://schemas.microsoft.com/office/drawing/2014/main" id="{716C6318-4E35-425B-86F1-3EA4B10658A7}"/>
-              </a:ext>
-            </a:extLst>
-          </p:cNvPr>
-          <p:cNvSpPr txBox="1"/>
-          <p:nvPr/>
-        </p:nvSpPr>
-        <p:spPr>
-          <a:xfrm>
-            <a:off x="10817937" y="5953929"/>
-            <a:ext cx="1588814" cy="584775"/>
-          </a:xfrm>
-          <a:prstGeom prst="rect">
-            <a:avLst/>
-          </a:prstGeom>
-          <a:noFill/>
-        </p:spPr>
-        <p:txBody>
-          <a:bodyPr wrap="square" rtlCol="0">
-            <a:spAutoFit/>
-          </a:bodyPr>
-          <a:lstStyle/>
-          <a:p>
-            <a:pPr algn="ctr"/>
-            <a:r>
-              <a:rPr lang="en-US" sz="3200" spc="300" dirty="0">
-                <a:solidFill>
-                  <a:srgbClr val="2EEE53"/>
-                </a:solidFill>
-                <a:latin typeface="Impact" panose="020B0806030902050204" pitchFamily="34" charset="0"/>
-              </a:rPr>
-              <a:t>Next</a:t>
-            </a:r>
-            <a:endParaRPr lang="en-US" sz="8000" spc="300" dirty="0">
+              <a:t>Your file is being encrypted.</a:t>
+            </a:r>
+          </a:p>
+          <a:p>
+            <a:r>
+              <a:rPr lang="en-US" sz="4000" spc="300" dirty="0">
+                <a:solidFill>
+                  <a:srgbClr val="2EEE53"/>
+                </a:solidFill>
+                <a:latin typeface="Impact" panose="020B0806030902050204" pitchFamily="34" charset="0"/>
+              </a:rPr>
+              <a:t>Please wait…</a:t>
+            </a:r>
+          </a:p>
+          <a:p>
+            <a:endParaRPr lang="en-US" sz="4000" spc="300" dirty="0">
               <a:solidFill>
                 <a:srgbClr val="2EEE53"/>
               </a:solidFill>
               <a:latin typeface="Impact" panose="020B0806030902050204" pitchFamily="34" charset="0"/>
             </a:endParaRPr>
           </a:p>
+          <a:p>
+            <a:r>
+              <a:rPr lang="en-US" sz="4000" spc="300" dirty="0">
+                <a:solidFill>
+                  <a:srgbClr val="2EEE53"/>
+                </a:solidFill>
+                <a:latin typeface="Impact" panose="020B0806030902050204" pitchFamily="34" charset="0"/>
+              </a:rPr>
+              <a:t>Progress - </a:t>
+            </a:r>
+          </a:p>
         </p:txBody>
       </p:sp>
     </p:spTree>
     <p:extLst>
       <p:ext uri="{BB962C8B-B14F-4D97-AF65-F5344CB8AC3E}">
-        <p14:creationId xmlns:p14="http://schemas.microsoft.com/office/powerpoint/2010/main" val="309062697"/>
+        <p14:creationId xmlns:p14="http://schemas.microsoft.com/office/powerpoint/2010/main" val="1939987590"/>
       </p:ext>
     </p:extLst>
   </p:cSld>
@@ -23506,7 +23384,7 @@
                 </a:solidFill>
                 <a:latin typeface="Impact" panose="020B0806030902050204" pitchFamily="34" charset="0"/>
               </a:rPr>
-              <a:t>The Encryption :</a:t>
+              <a:t>The Encryption:</a:t>
             </a:r>
           </a:p>
         </p:txBody>
@@ -23586,7 +23464,7 @@
         <p:spPr>
           <a:xfrm>
             <a:off x="0" y="2137947"/>
-            <a:ext cx="11719560" cy="3785652"/>
+            <a:ext cx="11719560" cy="2554545"/>
           </a:xfrm>
           <a:prstGeom prst="rect">
             <a:avLst/>
@@ -23606,126 +23484,47 @@
                 </a:solidFill>
                 <a:latin typeface="Impact" panose="020B0806030902050204" pitchFamily="34" charset="0"/>
               </a:rPr>
-              <a:t>Great name, now please choose a password:</a:t>
-            </a:r>
-          </a:p>
-          <a:p>
-            <a:r>
-              <a:rPr lang="en-US" sz="4000" spc="300" dirty="0">
-                <a:solidFill>
-                  <a:srgbClr val="2EEE53"/>
-                </a:solidFill>
-                <a:latin typeface="Impact" panose="020B0806030902050204" pitchFamily="34" charset="0"/>
-              </a:rPr>
-              <a:t>	- Must be </a:t>
-            </a:r>
-            <a:r>
-              <a:rPr lang="en-US" sz="4000" b="1" u="sng" spc="300" dirty="0">
-                <a:solidFill>
-                  <a:srgbClr val="2EEE53"/>
-                </a:solidFill>
-                <a:latin typeface="Impact" panose="020B0806030902050204" pitchFamily="34" charset="0"/>
-              </a:rPr>
-              <a:t>SHORTER</a:t>
-            </a:r>
-            <a:r>
-              <a:rPr lang="en-US" sz="4000" spc="300" dirty="0">
-                <a:solidFill>
-                  <a:srgbClr val="2EEE53"/>
-                </a:solidFill>
-                <a:latin typeface="Impact" panose="020B0806030902050204" pitchFamily="34" charset="0"/>
-              </a:rPr>
-              <a:t> then 16 letters. </a:t>
-            </a:r>
-          </a:p>
-          <a:p>
-            <a:r>
-              <a:rPr lang="en-US" sz="4000" spc="300" dirty="0">
-                <a:solidFill>
-                  <a:srgbClr val="2EEE53"/>
-                </a:solidFill>
-                <a:latin typeface="Impact" panose="020B0806030902050204" pitchFamily="34" charset="0"/>
-              </a:rPr>
-              <a:t>	- Must include only </a:t>
-            </a:r>
-            <a:r>
-              <a:rPr lang="en-US" sz="4000" b="1" u="sng" spc="300" dirty="0">
-                <a:solidFill>
-                  <a:srgbClr val="2EEE53"/>
-                </a:solidFill>
-                <a:latin typeface="Impact" panose="020B0806030902050204" pitchFamily="34" charset="0"/>
-              </a:rPr>
-              <a:t>LETTERS</a:t>
-            </a:r>
-            <a:r>
-              <a:rPr lang="en-US" sz="4000" spc="300" dirty="0">
-                <a:solidFill>
-                  <a:srgbClr val="2EEE53"/>
-                </a:solidFill>
-                <a:latin typeface="Impact" panose="020B0806030902050204" pitchFamily="34" charset="0"/>
-              </a:rPr>
-              <a:t>, and </a:t>
-            </a:r>
-            <a:r>
-              <a:rPr lang="en-US" sz="4000" b="1" u="sng" spc="300" dirty="0">
-                <a:solidFill>
-                  <a:srgbClr val="2EEE53"/>
-                </a:solidFill>
-                <a:latin typeface="Impact" panose="020B0806030902050204" pitchFamily="34" charset="0"/>
-              </a:rPr>
-              <a:t>NUMBERS</a:t>
-            </a:r>
-            <a:r>
-              <a:rPr lang="en-US" sz="4000" spc="300" dirty="0">
-                <a:solidFill>
-                  <a:srgbClr val="2EEE53"/>
-                </a:solidFill>
-                <a:latin typeface="Impact" panose="020B0806030902050204" pitchFamily="34" charset="0"/>
-              </a:rPr>
-              <a:t>.</a:t>
-            </a:r>
-          </a:p>
-          <a:p>
-            <a:r>
-              <a:rPr lang="en-US" sz="4000" spc="300" dirty="0">
-                <a:solidFill>
-                  <a:srgbClr val="2EEE53"/>
-                </a:solidFill>
-                <a:latin typeface="Impact" panose="020B0806030902050204" pitchFamily="34" charset="0"/>
-              </a:rPr>
-              <a:t>		</a:t>
-            </a:r>
-          </a:p>
-          <a:p>
-            <a:r>
-              <a:rPr lang="en-US" sz="4000" spc="300" dirty="0">
-                <a:solidFill>
-                  <a:srgbClr val="2EEE53"/>
-                </a:solidFill>
-                <a:latin typeface="Impact" panose="020B0806030902050204" pitchFamily="34" charset="0"/>
-              </a:rPr>
-              <a:t>	Password:</a:t>
-            </a:r>
-          </a:p>
-          <a:p>
-            <a:r>
-              <a:rPr lang="en-US" sz="4000" spc="300" dirty="0">
-                <a:solidFill>
-                  <a:srgbClr val="2EEE53"/>
-                </a:solidFill>
-                <a:latin typeface="Impact" panose="020B0806030902050204" pitchFamily="34" charset="0"/>
-              </a:rPr>
-              <a:t>	VALID PASSWORD 		</a:t>
-            </a:r>
-          </a:p>
-        </p:txBody>
-      </p:sp>
-      <p:sp>
-        <p:nvSpPr>
-          <p:cNvPr id="12" name="Rectangle: Diagonal Corners Snipped 11">
-            <a:extLst>
-              <a:ext uri="{FF2B5EF4-FFF2-40B4-BE49-F238E27FC236}">
-                <a16:creationId xmlns:a16="http://schemas.microsoft.com/office/drawing/2014/main" id="{3E074101-ED45-47F3-9880-70918F77EFA1}"/>
+              <a:t>Your file is being encrypted.</a:t>
+            </a:r>
+          </a:p>
+          <a:p>
+            <a:r>
+              <a:rPr lang="en-US" sz="4000" spc="300" dirty="0">
+                <a:solidFill>
+                  <a:srgbClr val="2EEE53"/>
+                </a:solidFill>
+                <a:latin typeface="Impact" panose="020B0806030902050204" pitchFamily="34" charset="0"/>
+              </a:rPr>
+              <a:t>Please wait…</a:t>
+            </a:r>
+          </a:p>
+          <a:p>
+            <a:endParaRPr lang="en-US" sz="4000" spc="300" dirty="0">
+              <a:solidFill>
+                <a:srgbClr val="2EEE53"/>
+              </a:solidFill>
+              <a:latin typeface="Impact" panose="020B0806030902050204" pitchFamily="34" charset="0"/>
+            </a:endParaRPr>
+          </a:p>
+          <a:p>
+            <a:r>
+              <a:rPr lang="en-US" sz="4000" spc="300" dirty="0">
+                <a:solidFill>
+                  <a:srgbClr val="2EEE53"/>
+                </a:solidFill>
+                <a:latin typeface="Impact" panose="020B0806030902050204" pitchFamily="34" charset="0"/>
+              </a:rPr>
+              <a:t>Progress - </a:t>
+            </a:r>
+          </a:p>
+        </p:txBody>
+      </p:sp>
+      <p:sp>
+        <p:nvSpPr>
+          <p:cNvPr id="6" name="Rectangle: Diagonal Corners Snipped 5">
+            <a:extLst>
+              <a:ext uri="{FF2B5EF4-FFF2-40B4-BE49-F238E27FC236}">
+                <a16:creationId xmlns:a16="http://schemas.microsoft.com/office/drawing/2014/main" id="{062DCE8A-0AE9-4F4F-87BE-20C20853C780}"/>
               </a:ext>
             </a:extLst>
           </p:cNvPr>
@@ -23734,7 +23533,7 @@
         </p:nvSpPr>
         <p:spPr>
           <a:xfrm rot="10800000">
-            <a:off x="-302508" y="5954995"/>
+            <a:off x="10738872" y="5947621"/>
             <a:ext cx="1757927" cy="579598"/>
           </a:xfrm>
           <a:prstGeom prst="snip2DiagRect">
@@ -23782,10 +23581,10 @@
       </p:sp>
       <p:sp>
         <p:nvSpPr>
-          <p:cNvPr id="13" name="TextBox 12">
-            <a:extLst>
-              <a:ext uri="{FF2B5EF4-FFF2-40B4-BE49-F238E27FC236}">
-                <a16:creationId xmlns:a16="http://schemas.microsoft.com/office/drawing/2014/main" id="{F6C5A567-CA49-4B3F-80DD-23A87F15C3B9}"/>
+          <p:cNvPr id="7" name="TextBox 6">
+            <a:extLst>
+              <a:ext uri="{FF2B5EF4-FFF2-40B4-BE49-F238E27FC236}">
+                <a16:creationId xmlns:a16="http://schemas.microsoft.com/office/drawing/2014/main" id="{DF436022-48DC-428B-8B7B-465B2C7CFC25}"/>
               </a:ext>
             </a:extLst>
           </p:cNvPr>
@@ -23794,120 +23593,16 @@
         </p:nvSpPr>
         <p:spPr>
           <a:xfrm>
-            <a:off x="-223443" y="5954997"/>
+            <a:off x="10817937" y="5947623"/>
             <a:ext cx="1588814" cy="584775"/>
           </a:xfrm>
           <a:prstGeom prst="rect">
             <a:avLst/>
           </a:prstGeom>
           <a:noFill/>
-        </p:spPr>
-        <p:txBody>
-          <a:bodyPr wrap="square" rtlCol="0">
-            <a:spAutoFit/>
-          </a:bodyPr>
-          <a:lstStyle/>
-          <a:p>
-            <a:pPr algn="ctr"/>
-            <a:r>
-              <a:rPr lang="en-US" sz="3200" spc="300" dirty="0">
-                <a:solidFill>
-                  <a:srgbClr val="C00000"/>
-                </a:solidFill>
-                <a:latin typeface="Impact" panose="020B0806030902050204" pitchFamily="34" charset="0"/>
-              </a:rPr>
-              <a:t>Back</a:t>
-            </a:r>
-            <a:endParaRPr lang="en-US" sz="8000" spc="300" dirty="0">
-              <a:solidFill>
-                <a:srgbClr val="C00000"/>
-              </a:solidFill>
-              <a:latin typeface="Impact" panose="020B0806030902050204" pitchFamily="34" charset="0"/>
-            </a:endParaRPr>
-          </a:p>
-        </p:txBody>
-      </p:sp>
-      <p:sp>
-        <p:nvSpPr>
-          <p:cNvPr id="14" name="Rectangle: Diagonal Corners Snipped 13">
-            <a:extLst>
-              <a:ext uri="{FF2B5EF4-FFF2-40B4-BE49-F238E27FC236}">
-                <a16:creationId xmlns:a16="http://schemas.microsoft.com/office/drawing/2014/main" id="{E16ADE09-3ABF-4074-9FBA-50D4D778B3C4}"/>
-              </a:ext>
-            </a:extLst>
-          </p:cNvPr>
-          <p:cNvSpPr/>
-          <p:nvPr/>
-        </p:nvSpPr>
-        <p:spPr>
-          <a:xfrm rot="10800000">
-            <a:off x="10738872" y="5953927"/>
-            <a:ext cx="1757927" cy="579598"/>
-          </a:xfrm>
-          <a:prstGeom prst="snip2DiagRect">
-            <a:avLst>
-              <a:gd name="adj1" fmla="val 50000"/>
-              <a:gd name="adj2" fmla="val 0"/>
-            </a:avLst>
-          </a:prstGeom>
-          <a:solidFill>
-            <a:schemeClr val="tx1">
-              <a:alpha val="60000"/>
-            </a:schemeClr>
-          </a:solidFill>
-          <a:ln w="95250">
-            <a:solidFill>
-              <a:srgbClr val="2EEE53"/>
-            </a:solidFill>
+          <a:ln>
+            <a:noFill/>
           </a:ln>
-          <a:effectLst/>
-        </p:spPr>
-        <p:style>
-          <a:lnRef idx="2">
-            <a:schemeClr val="accent1">
-              <a:shade val="50000"/>
-            </a:schemeClr>
-          </a:lnRef>
-          <a:fillRef idx="1">
-            <a:schemeClr val="accent1"/>
-          </a:fillRef>
-          <a:effectRef idx="0">
-            <a:schemeClr val="accent1"/>
-          </a:effectRef>
-          <a:fontRef idx="minor">
-            <a:schemeClr val="lt1"/>
-          </a:fontRef>
-        </p:style>
-        <p:txBody>
-          <a:bodyPr rtlCol="0" anchor="ctr"/>
-          <a:lstStyle/>
-          <a:p>
-            <a:pPr algn="ctr"/>
-            <a:endParaRPr lang="en-US" dirty="0"/>
-          </a:p>
-        </p:txBody>
-      </p:sp>
-      <p:sp>
-        <p:nvSpPr>
-          <p:cNvPr id="17" name="TextBox 16">
-            <a:extLst>
-              <a:ext uri="{FF2B5EF4-FFF2-40B4-BE49-F238E27FC236}">
-                <a16:creationId xmlns:a16="http://schemas.microsoft.com/office/drawing/2014/main" id="{716C6318-4E35-425B-86F1-3EA4B10658A7}"/>
-              </a:ext>
-            </a:extLst>
-          </p:cNvPr>
-          <p:cNvSpPr txBox="1"/>
-          <p:nvPr/>
-        </p:nvSpPr>
-        <p:spPr>
-          <a:xfrm>
-            <a:off x="10817937" y="5953929"/>
-            <a:ext cx="1588814" cy="584775"/>
-          </a:xfrm>
-          <a:prstGeom prst="rect">
-            <a:avLst/>
-          </a:prstGeom>
-          <a:noFill/>
         </p:spPr>
         <p:txBody>
           <a:bodyPr wrap="square" rtlCol="0">
@@ -23937,7 +23632,7 @@
     </p:spTree>
     <p:extLst>
       <p:ext uri="{BB962C8B-B14F-4D97-AF65-F5344CB8AC3E}">
-        <p14:creationId xmlns:p14="http://schemas.microsoft.com/office/powerpoint/2010/main" val="719850693"/>
+        <p14:creationId xmlns:p14="http://schemas.microsoft.com/office/powerpoint/2010/main" val="1175555624"/>
       </p:ext>
     </p:extLst>
   </p:cSld>
@@ -24201,10 +23896,117 @@
           </a:p>
         </p:txBody>
       </p:sp>
+      <p:sp>
+        <p:nvSpPr>
+          <p:cNvPr id="10" name="Rectangle: Diagonal Corners Snipped 9">
+            <a:extLst>
+              <a:ext uri="{FF2B5EF4-FFF2-40B4-BE49-F238E27FC236}">
+                <a16:creationId xmlns:a16="http://schemas.microsoft.com/office/drawing/2014/main" id="{53B7CC88-4C5D-4A0E-9BCF-617CFBD05F41}"/>
+              </a:ext>
+            </a:extLst>
+          </p:cNvPr>
+          <p:cNvSpPr/>
+          <p:nvPr/>
+        </p:nvSpPr>
+        <p:spPr>
+          <a:xfrm rot="10800000">
+            <a:off x="10738872" y="5947621"/>
+            <a:ext cx="1757927" cy="579598"/>
+          </a:xfrm>
+          <a:prstGeom prst="snip2DiagRect">
+            <a:avLst>
+              <a:gd name="adj1" fmla="val 50000"/>
+              <a:gd name="adj2" fmla="val 0"/>
+            </a:avLst>
+          </a:prstGeom>
+          <a:solidFill>
+            <a:schemeClr val="tx1">
+              <a:alpha val="60000"/>
+            </a:schemeClr>
+          </a:solidFill>
+          <a:ln w="95250">
+            <a:solidFill>
+              <a:srgbClr val="2EEE53"/>
+            </a:solidFill>
+          </a:ln>
+          <a:effectLst/>
+        </p:spPr>
+        <p:style>
+          <a:lnRef idx="2">
+            <a:schemeClr val="accent1">
+              <a:shade val="50000"/>
+            </a:schemeClr>
+          </a:lnRef>
+          <a:fillRef idx="1">
+            <a:schemeClr val="accent1"/>
+          </a:fillRef>
+          <a:effectRef idx="0">
+            <a:schemeClr val="accent1"/>
+          </a:effectRef>
+          <a:fontRef idx="minor">
+            <a:schemeClr val="lt1"/>
+          </a:fontRef>
+        </p:style>
+        <p:txBody>
+          <a:bodyPr rtlCol="0" anchor="ctr"/>
+          <a:lstStyle/>
+          <a:p>
+            <a:pPr algn="ctr"/>
+            <a:endParaRPr lang="en-US" dirty="0"/>
+          </a:p>
+        </p:txBody>
+      </p:sp>
+      <p:sp>
+        <p:nvSpPr>
+          <p:cNvPr id="11" name="TextBox 10">
+            <a:extLst>
+              <a:ext uri="{FF2B5EF4-FFF2-40B4-BE49-F238E27FC236}">
+                <a16:creationId xmlns:a16="http://schemas.microsoft.com/office/drawing/2014/main" id="{60035FEB-C8BD-4EDD-9B1E-9A87F81EBBCE}"/>
+              </a:ext>
+            </a:extLst>
+          </p:cNvPr>
+          <p:cNvSpPr txBox="1"/>
+          <p:nvPr/>
+        </p:nvSpPr>
+        <p:spPr>
+          <a:xfrm>
+            <a:off x="10817937" y="5947623"/>
+            <a:ext cx="1588814" cy="584775"/>
+          </a:xfrm>
+          <a:prstGeom prst="rect">
+            <a:avLst/>
+          </a:prstGeom>
+          <a:noFill/>
+        </p:spPr>
+        <p:txBody>
+          <a:bodyPr wrap="square" rtlCol="0">
+            <a:spAutoFit/>
+          </a:bodyPr>
+          <a:lstStyle/>
+          <a:p>
+            <a:pPr algn="ctr"/>
+            <a:r>
+              <a:rPr lang="en-US" sz="3200" spc="300" dirty="0">
+                <a:solidFill>
+                  <a:srgbClr val="2EEE53"/>
+                </a:solidFill>
+                <a:latin typeface="Impact" panose="020B0806030902050204" pitchFamily="34" charset="0"/>
+              </a:rPr>
+              <a:t>Next</a:t>
+            </a:r>
+            <a:endParaRPr lang="en-US" sz="8000" spc="300" dirty="0">
+              <a:solidFill>
+                <a:srgbClr val="2EEE53"/>
+              </a:solidFill>
+              <a:latin typeface="Impact" panose="020B0806030902050204" pitchFamily="34" charset="0"/>
+            </a:endParaRPr>
+          </a:p>
+        </p:txBody>
+      </p:sp>
     </p:spTree>
     <p:extLst>
       <p:ext uri="{BB962C8B-B14F-4D97-AF65-F5344CB8AC3E}">
-        <p14:creationId xmlns:p14="http://schemas.microsoft.com/office/powerpoint/2010/main" val="1939987590"/>
+        <p14:creationId xmlns:p14="http://schemas.microsoft.com/office/powerpoint/2010/main" val="1066838294"/>
       </p:ext>
     </p:extLst>
   </p:cSld>
@@ -24413,7 +24215,7 @@
         <p:spPr>
           <a:xfrm>
             <a:off x="0" y="2137947"/>
-            <a:ext cx="11719560" cy="2554545"/>
+            <a:ext cx="11719560" cy="3785652"/>
           </a:xfrm>
           <a:prstGeom prst="rect">
             <a:avLst/>
@@ -24433,47 +24235,144 @@
                 </a:solidFill>
                 <a:latin typeface="Impact" panose="020B0806030902050204" pitchFamily="34" charset="0"/>
               </a:rPr>
-              <a:t>Your file is being encrypted.</a:t>
-            </a:r>
-          </a:p>
-          <a:p>
-            <a:r>
-              <a:rPr lang="en-US" sz="4000" spc="300" dirty="0">
-                <a:solidFill>
-                  <a:srgbClr val="2EEE53"/>
-                </a:solidFill>
-                <a:latin typeface="Impact" panose="020B0806030902050204" pitchFamily="34" charset="0"/>
-              </a:rPr>
-              <a:t>Please wait…</a:t>
-            </a:r>
-          </a:p>
-          <a:p>
-            <a:endParaRPr lang="en-US" sz="4000" spc="300" dirty="0">
+              <a:t>Now you are finally ready for it,</a:t>
+            </a:r>
+          </a:p>
+          <a:p>
+            <a:r>
+              <a:rPr lang="en-US" sz="4000" spc="300" dirty="0">
+                <a:solidFill>
+                  <a:srgbClr val="2EEE53"/>
+                </a:solidFill>
+                <a:latin typeface="Impact" panose="020B0806030902050204" pitchFamily="34" charset="0"/>
+              </a:rPr>
+              <a:t>Your brand new decrypted </a:t>
+            </a:r>
+            <a:r>
+              <a:rPr lang="en-US" sz="4000" b="1" u="sng" spc="300" dirty="0">
+                <a:solidFill>
+                  <a:srgbClr val="2EEE53"/>
+                </a:solidFill>
+                <a:latin typeface="Impact" panose="020B0806030902050204" pitchFamily="34" charset="0"/>
+              </a:rPr>
+              <a:t>FILE</a:t>
+            </a:r>
+            <a:r>
+              <a:rPr lang="en-US" sz="4000" spc="300" dirty="0">
+                <a:solidFill>
+                  <a:srgbClr val="2EEE53"/>
+                </a:solidFill>
+                <a:latin typeface="Impact" panose="020B0806030902050204" pitchFamily="34" charset="0"/>
+              </a:rPr>
+              <a:t> is in the </a:t>
+            </a:r>
+            <a:r>
+              <a:rPr lang="en-US" sz="4000" b="1" u="sng" spc="300" dirty="0">
+                <a:solidFill>
+                  <a:srgbClr val="2EEE53"/>
+                </a:solidFill>
+                <a:latin typeface="Impact" panose="020B0806030902050204" pitchFamily="34" charset="0"/>
+              </a:rPr>
+              <a:t>ENCRYPTE</a:t>
+            </a:r>
+            <a:r>
+              <a:rPr lang="en-US" sz="4000" spc="300" dirty="0">
+                <a:solidFill>
+                  <a:srgbClr val="2EEE53"/>
+                </a:solidFill>
+                <a:latin typeface="Impact" panose="020B0806030902050204" pitchFamily="34" charset="0"/>
+              </a:rPr>
+              <a:t> </a:t>
+            </a:r>
+            <a:r>
+              <a:rPr lang="en-US" sz="4000" b="1" u="sng" spc="300" dirty="0">
+                <a:solidFill>
+                  <a:srgbClr val="2EEE53"/>
+                </a:solidFill>
+                <a:latin typeface="Impact" panose="020B0806030902050204" pitchFamily="34" charset="0"/>
+              </a:rPr>
+              <a:t>DIRECTORY</a:t>
+            </a:r>
+            <a:r>
+              <a:rPr lang="he-IL" sz="4000" spc="300" dirty="0">
+                <a:solidFill>
+                  <a:srgbClr val="2EEE53"/>
+                </a:solidFill>
+                <a:latin typeface="Impact" panose="020B0806030902050204" pitchFamily="34" charset="0"/>
+              </a:rPr>
+              <a:t> </a:t>
+            </a:r>
+            <a:r>
+              <a:rPr lang="en-US" sz="4000" spc="300" dirty="0">
+                <a:solidFill>
+                  <a:srgbClr val="2EEE53"/>
+                </a:solidFill>
+                <a:latin typeface="Impact" panose="020B0806030902050204" pitchFamily="34" charset="0"/>
+              </a:rPr>
+              <a:t>and is called </a:t>
+            </a:r>
+            <a:r>
+              <a:rPr lang="en-US" sz="4000" b="1" i="1" u="sng" spc="300" dirty="0">
+                <a:solidFill>
+                  <a:srgbClr val="2EEE53"/>
+                </a:solidFill>
+                <a:latin typeface="Impact" panose="020B0806030902050204" pitchFamily="34" charset="0"/>
+              </a:rPr>
+              <a:t>ENCRYPTE</a:t>
+            </a:r>
+            <a:r>
+              <a:rPr lang="en-US" sz="4000" spc="300" dirty="0">
+                <a:solidFill>
+                  <a:srgbClr val="2EEE53"/>
+                </a:solidFill>
+                <a:latin typeface="Impact" panose="020B0806030902050204" pitchFamily="34" charset="0"/>
+              </a:rPr>
+              <a:t>, go Download it!</a:t>
+            </a:r>
+          </a:p>
+          <a:p>
+            <a:r>
+              <a:rPr lang="en-US" sz="4000" spc="300" dirty="0">
+                <a:solidFill>
+                  <a:srgbClr val="2EEE53"/>
+                </a:solidFill>
+                <a:latin typeface="Impact" panose="020B0806030902050204" pitchFamily="34" charset="0"/>
+              </a:rPr>
+              <a:t>And don’t forget, you’ll need the </a:t>
+            </a:r>
+            <a:r>
+              <a:rPr lang="en-US" sz="4000" i="1" u="sng" spc="300" dirty="0">
+                <a:solidFill>
+                  <a:srgbClr val="2EEE53"/>
+                </a:solidFill>
+                <a:latin typeface="Impact" panose="020B0806030902050204" pitchFamily="34" charset="0"/>
+              </a:rPr>
+              <a:t>DATAFILE</a:t>
+            </a:r>
+            <a:r>
+              <a:rPr lang="en-US" sz="4000" spc="300" dirty="0">
+                <a:solidFill>
+                  <a:srgbClr val="2EEE53"/>
+                </a:solidFill>
+                <a:latin typeface="Impact" panose="020B0806030902050204" pitchFamily="34" charset="0"/>
+              </a:rPr>
+              <a:t>  to decrypt your file later.</a:t>
+            </a:r>
+            <a:endParaRPr lang="en-US" sz="4000" b="1" u="sng" spc="300" dirty="0">
               <a:solidFill>
                 <a:srgbClr val="2EEE53"/>
               </a:solidFill>
               <a:latin typeface="Impact" panose="020B0806030902050204" pitchFamily="34" charset="0"/>
             </a:endParaRPr>
           </a:p>
-          <a:p>
-            <a:r>
-              <a:rPr lang="en-US" sz="4000" spc="300" dirty="0">
-                <a:solidFill>
-                  <a:srgbClr val="2EEE53"/>
-                </a:solidFill>
-                <a:latin typeface="Impact" panose="020B0806030902050204" pitchFamily="34" charset="0"/>
-              </a:rPr>
-              <a:t>Progress - </a:t>
-            </a:r>
-          </a:p>
-        </p:txBody>
-      </p:sp>
-      <p:sp>
-        <p:nvSpPr>
-          <p:cNvPr id="6" name="Rectangle: Diagonal Corners Snipped 5">
-            <a:extLst>
-              <a:ext uri="{FF2B5EF4-FFF2-40B4-BE49-F238E27FC236}">
-                <a16:creationId xmlns:a16="http://schemas.microsoft.com/office/drawing/2014/main" id="{062DCE8A-0AE9-4F4F-87BE-20C20853C780}"/>
+        </p:txBody>
+      </p:sp>
+      <p:sp>
+        <p:nvSpPr>
+          <p:cNvPr id="21" name="Rectangle: Diagonal Corners Snipped 20">
+            <a:extLst>
+              <a:ext uri="{FF2B5EF4-FFF2-40B4-BE49-F238E27FC236}">
+                <a16:creationId xmlns:a16="http://schemas.microsoft.com/office/drawing/2014/main" id="{55269FB2-D5C2-4595-A855-AF70120B482D}"/>
               </a:ext>
             </a:extLst>
           </p:cNvPr>
@@ -24482,7 +24381,7 @@
         </p:nvSpPr>
         <p:spPr>
           <a:xfrm rot="10800000">
-            <a:off x="10738872" y="5947621"/>
+            <a:off x="-302508" y="5954995"/>
             <a:ext cx="1757927" cy="579598"/>
           </a:xfrm>
           <a:prstGeom prst="snip2DiagRect">
@@ -24530,10 +24429,10 @@
       </p:sp>
       <p:sp>
         <p:nvSpPr>
-          <p:cNvPr id="7" name="TextBox 6">
-            <a:extLst>
-              <a:ext uri="{FF2B5EF4-FFF2-40B4-BE49-F238E27FC236}">
-                <a16:creationId xmlns:a16="http://schemas.microsoft.com/office/drawing/2014/main" id="{DF436022-48DC-428B-8B7B-465B2C7CFC25}"/>
+          <p:cNvPr id="22" name="TextBox 21">
+            <a:extLst>
+              <a:ext uri="{FF2B5EF4-FFF2-40B4-BE49-F238E27FC236}">
+                <a16:creationId xmlns:a16="http://schemas.microsoft.com/office/drawing/2014/main" id="{3BF0ADAB-2E25-4DFE-A509-7CDF1A777D2D}"/>
               </a:ext>
             </a:extLst>
           </p:cNvPr>
@@ -24542,16 +24441,13 @@
         </p:nvSpPr>
         <p:spPr>
           <a:xfrm>
-            <a:off x="10817937" y="5947623"/>
+            <a:off x="-223443" y="5954997"/>
             <a:ext cx="1588814" cy="584775"/>
           </a:xfrm>
           <a:prstGeom prst="rect">
             <a:avLst/>
           </a:prstGeom>
           <a:noFill/>
-          <a:ln>
-            <a:noFill/>
-          </a:ln>
         </p:spPr>
         <p:txBody>
           <a:bodyPr wrap="square" rtlCol="0">
@@ -24563,11 +24459,118 @@
             <a:r>
               <a:rPr lang="en-US" sz="3200" spc="300" dirty="0">
                 <a:solidFill>
-                  <a:srgbClr val="2EEE53"/>
-                </a:solidFill>
-                <a:latin typeface="Impact" panose="020B0806030902050204" pitchFamily="34" charset="0"/>
-              </a:rPr>
-              <a:t>Next</a:t>
+                  <a:srgbClr val="C00000"/>
+                </a:solidFill>
+                <a:latin typeface="Impact" panose="020B0806030902050204" pitchFamily="34" charset="0"/>
+              </a:rPr>
+              <a:t>Exit</a:t>
+            </a:r>
+            <a:endParaRPr lang="en-US" sz="8000" spc="300" dirty="0">
+              <a:solidFill>
+                <a:srgbClr val="C00000"/>
+              </a:solidFill>
+              <a:latin typeface="Impact" panose="020B0806030902050204" pitchFamily="34" charset="0"/>
+            </a:endParaRPr>
+          </a:p>
+        </p:txBody>
+      </p:sp>
+      <p:sp>
+        <p:nvSpPr>
+          <p:cNvPr id="10" name="Rectangle: Diagonal Corners Snipped 9">
+            <a:extLst>
+              <a:ext uri="{FF2B5EF4-FFF2-40B4-BE49-F238E27FC236}">
+                <a16:creationId xmlns:a16="http://schemas.microsoft.com/office/drawing/2014/main" id="{53B7CC88-4C5D-4A0E-9BCF-617CFBD05F41}"/>
+              </a:ext>
+            </a:extLst>
+          </p:cNvPr>
+          <p:cNvSpPr/>
+          <p:nvPr/>
+        </p:nvSpPr>
+        <p:spPr>
+          <a:xfrm rot="10800000">
+            <a:off x="10066020" y="5953927"/>
+            <a:ext cx="2430778" cy="579598"/>
+          </a:xfrm>
+          <a:prstGeom prst="snip2DiagRect">
+            <a:avLst>
+              <a:gd name="adj1" fmla="val 50000"/>
+              <a:gd name="adj2" fmla="val 0"/>
+            </a:avLst>
+          </a:prstGeom>
+          <a:solidFill>
+            <a:schemeClr val="tx1">
+              <a:alpha val="60000"/>
+            </a:schemeClr>
+          </a:solidFill>
+          <a:ln w="95250">
+            <a:solidFill>
+              <a:schemeClr val="bg1"/>
+            </a:solidFill>
+          </a:ln>
+          <a:effectLst/>
+        </p:spPr>
+        <p:style>
+          <a:lnRef idx="2">
+            <a:schemeClr val="accent1">
+              <a:shade val="50000"/>
+            </a:schemeClr>
+          </a:lnRef>
+          <a:fillRef idx="1">
+            <a:schemeClr val="accent1"/>
+          </a:fillRef>
+          <a:effectRef idx="0">
+            <a:schemeClr val="accent1"/>
+          </a:effectRef>
+          <a:fontRef idx="minor">
+            <a:schemeClr val="lt1"/>
+          </a:fontRef>
+        </p:style>
+        <p:txBody>
+          <a:bodyPr rtlCol="0" anchor="ctr"/>
+          <a:lstStyle/>
+          <a:p>
+            <a:pPr algn="ctr"/>
+            <a:endParaRPr lang="en-US" dirty="0"/>
+          </a:p>
+        </p:txBody>
+      </p:sp>
+      <p:sp>
+        <p:nvSpPr>
+          <p:cNvPr id="11" name="TextBox 10">
+            <a:extLst>
+              <a:ext uri="{FF2B5EF4-FFF2-40B4-BE49-F238E27FC236}">
+                <a16:creationId xmlns:a16="http://schemas.microsoft.com/office/drawing/2014/main" id="{60035FEB-C8BD-4EDD-9B1E-9A87F81EBBCE}"/>
+              </a:ext>
+            </a:extLst>
+          </p:cNvPr>
+          <p:cNvSpPr txBox="1"/>
+          <p:nvPr/>
+        </p:nvSpPr>
+        <p:spPr>
+          <a:xfrm>
+            <a:off x="10066020" y="5953929"/>
+            <a:ext cx="2340731" cy="584775"/>
+          </a:xfrm>
+          <a:prstGeom prst="rect">
+            <a:avLst/>
+          </a:prstGeom>
+          <a:noFill/>
+        </p:spPr>
+        <p:txBody>
+          <a:bodyPr wrap="square" rtlCol="0">
+            <a:spAutoFit/>
+          </a:bodyPr>
+          <a:lstStyle/>
+          <a:p>
+            <a:pPr algn="ctr"/>
+            <a:r>
+              <a:rPr lang="en-US" sz="3200" spc="300" dirty="0">
+                <a:solidFill>
+                  <a:srgbClr val="2EEE53"/>
+                </a:solidFill>
+                <a:latin typeface="Impact" panose="020B0806030902050204" pitchFamily="34" charset="0"/>
+              </a:rPr>
+              <a:t>Restart</a:t>
             </a:r>
             <a:endParaRPr lang="en-US" sz="8000" spc="300" dirty="0">
               <a:solidFill>
@@ -24581,7 +24584,7 @@
     </p:spTree>
     <p:extLst>
       <p:ext uri="{BB962C8B-B14F-4D97-AF65-F5344CB8AC3E}">
-        <p14:creationId xmlns:p14="http://schemas.microsoft.com/office/powerpoint/2010/main" val="1175555624"/>
+        <p14:creationId xmlns:p14="http://schemas.microsoft.com/office/powerpoint/2010/main" val="3614375859"/>
       </p:ext>
     </p:extLst>
   </p:cSld>
@@ -24790,7 +24793,7 @@
         <p:spPr>
           <a:xfrm>
             <a:off x="0" y="2137947"/>
-            <a:ext cx="11719560" cy="2554545"/>
+            <a:ext cx="11719560" cy="3785652"/>
           </a:xfrm>
           <a:prstGeom prst="rect">
             <a:avLst/>
@@ -24810,47 +24813,144 @@
                 </a:solidFill>
                 <a:latin typeface="Impact" panose="020B0806030902050204" pitchFamily="34" charset="0"/>
               </a:rPr>
-              <a:t>Your file is being encrypted.</a:t>
-            </a:r>
-          </a:p>
-          <a:p>
-            <a:r>
-              <a:rPr lang="en-US" sz="4000" spc="300" dirty="0">
-                <a:solidFill>
-                  <a:srgbClr val="2EEE53"/>
-                </a:solidFill>
-                <a:latin typeface="Impact" panose="020B0806030902050204" pitchFamily="34" charset="0"/>
-              </a:rPr>
-              <a:t>Please wait…</a:t>
-            </a:r>
-          </a:p>
-          <a:p>
-            <a:endParaRPr lang="en-US" sz="4000" spc="300" dirty="0">
+              <a:t>Now you are finally ready for it,</a:t>
+            </a:r>
+          </a:p>
+          <a:p>
+            <a:r>
+              <a:rPr lang="en-US" sz="4000" spc="300" dirty="0">
+                <a:solidFill>
+                  <a:srgbClr val="2EEE53"/>
+                </a:solidFill>
+                <a:latin typeface="Impact" panose="020B0806030902050204" pitchFamily="34" charset="0"/>
+              </a:rPr>
+              <a:t>Your brand new decrypted </a:t>
+            </a:r>
+            <a:r>
+              <a:rPr lang="en-US" sz="4000" b="1" u="sng" spc="300" dirty="0">
+                <a:solidFill>
+                  <a:srgbClr val="2EEE53"/>
+                </a:solidFill>
+                <a:latin typeface="Impact" panose="020B0806030902050204" pitchFamily="34" charset="0"/>
+              </a:rPr>
+              <a:t>FILE</a:t>
+            </a:r>
+            <a:r>
+              <a:rPr lang="en-US" sz="4000" spc="300" dirty="0">
+                <a:solidFill>
+                  <a:srgbClr val="2EEE53"/>
+                </a:solidFill>
+                <a:latin typeface="Impact" panose="020B0806030902050204" pitchFamily="34" charset="0"/>
+              </a:rPr>
+              <a:t> is in the </a:t>
+            </a:r>
+            <a:r>
+              <a:rPr lang="en-US" sz="4000" b="1" u="sng" spc="300" dirty="0">
+                <a:solidFill>
+                  <a:srgbClr val="2EEE53"/>
+                </a:solidFill>
+                <a:latin typeface="Impact" panose="020B0806030902050204" pitchFamily="34" charset="0"/>
+              </a:rPr>
+              <a:t>ENCRYPTE</a:t>
+            </a:r>
+            <a:r>
+              <a:rPr lang="en-US" sz="4000" spc="300" dirty="0">
+                <a:solidFill>
+                  <a:srgbClr val="2EEE53"/>
+                </a:solidFill>
+                <a:latin typeface="Impact" panose="020B0806030902050204" pitchFamily="34" charset="0"/>
+              </a:rPr>
+              <a:t> </a:t>
+            </a:r>
+            <a:r>
+              <a:rPr lang="en-US" sz="4000" b="1" u="sng" spc="300" dirty="0">
+                <a:solidFill>
+                  <a:srgbClr val="2EEE53"/>
+                </a:solidFill>
+                <a:latin typeface="Impact" panose="020B0806030902050204" pitchFamily="34" charset="0"/>
+              </a:rPr>
+              <a:t>DIRECTORY</a:t>
+            </a:r>
+            <a:r>
+              <a:rPr lang="he-IL" sz="4000" spc="300" dirty="0">
+                <a:solidFill>
+                  <a:srgbClr val="2EEE53"/>
+                </a:solidFill>
+                <a:latin typeface="Impact" panose="020B0806030902050204" pitchFamily="34" charset="0"/>
+              </a:rPr>
+              <a:t> </a:t>
+            </a:r>
+            <a:r>
+              <a:rPr lang="en-US" sz="4000" spc="300" dirty="0">
+                <a:solidFill>
+                  <a:srgbClr val="2EEE53"/>
+                </a:solidFill>
+                <a:latin typeface="Impact" panose="020B0806030902050204" pitchFamily="34" charset="0"/>
+              </a:rPr>
+              <a:t>and is called </a:t>
+            </a:r>
+            <a:r>
+              <a:rPr lang="en-US" sz="4000" b="1" i="1" u="sng" spc="300" dirty="0">
+                <a:solidFill>
+                  <a:srgbClr val="2EEE53"/>
+                </a:solidFill>
+                <a:latin typeface="Impact" panose="020B0806030902050204" pitchFamily="34" charset="0"/>
+              </a:rPr>
+              <a:t>ENCRYPTE</a:t>
+            </a:r>
+            <a:r>
+              <a:rPr lang="en-US" sz="4000" spc="300" dirty="0">
+                <a:solidFill>
+                  <a:srgbClr val="2EEE53"/>
+                </a:solidFill>
+                <a:latin typeface="Impact" panose="020B0806030902050204" pitchFamily="34" charset="0"/>
+              </a:rPr>
+              <a:t>, go Download it!</a:t>
+            </a:r>
+          </a:p>
+          <a:p>
+            <a:r>
+              <a:rPr lang="en-US" sz="4000" spc="300" dirty="0">
+                <a:solidFill>
+                  <a:srgbClr val="2EEE53"/>
+                </a:solidFill>
+                <a:latin typeface="Impact" panose="020B0806030902050204" pitchFamily="34" charset="0"/>
+              </a:rPr>
+              <a:t>And don’t forget, you’ll need the </a:t>
+            </a:r>
+            <a:r>
+              <a:rPr lang="en-US" sz="4000" i="1" u="sng" spc="300" dirty="0">
+                <a:solidFill>
+                  <a:srgbClr val="2EEE53"/>
+                </a:solidFill>
+                <a:latin typeface="Impact" panose="020B0806030902050204" pitchFamily="34" charset="0"/>
+              </a:rPr>
+              <a:t>DATAFILE</a:t>
+            </a:r>
+            <a:r>
+              <a:rPr lang="en-US" sz="4000" spc="300" dirty="0">
+                <a:solidFill>
+                  <a:srgbClr val="2EEE53"/>
+                </a:solidFill>
+                <a:latin typeface="Impact" panose="020B0806030902050204" pitchFamily="34" charset="0"/>
+              </a:rPr>
+              <a:t>  to decrypt your file later.</a:t>
+            </a:r>
+            <a:endParaRPr lang="en-US" sz="4000" b="1" u="sng" spc="300" dirty="0">
               <a:solidFill>
                 <a:srgbClr val="2EEE53"/>
               </a:solidFill>
               <a:latin typeface="Impact" panose="020B0806030902050204" pitchFamily="34" charset="0"/>
             </a:endParaRPr>
           </a:p>
-          <a:p>
-            <a:r>
-              <a:rPr lang="en-US" sz="4000" spc="300" dirty="0">
-                <a:solidFill>
-                  <a:srgbClr val="2EEE53"/>
-                </a:solidFill>
-                <a:latin typeface="Impact" panose="020B0806030902050204" pitchFamily="34" charset="0"/>
-              </a:rPr>
-              <a:t>Progress - </a:t>
-            </a:r>
-          </a:p>
-        </p:txBody>
-      </p:sp>
-      <p:sp>
-        <p:nvSpPr>
-          <p:cNvPr id="10" name="Rectangle: Diagonal Corners Snipped 9">
-            <a:extLst>
-              <a:ext uri="{FF2B5EF4-FFF2-40B4-BE49-F238E27FC236}">
-                <a16:creationId xmlns:a16="http://schemas.microsoft.com/office/drawing/2014/main" id="{53B7CC88-4C5D-4A0E-9BCF-617CFBD05F41}"/>
+        </p:txBody>
+      </p:sp>
+      <p:sp>
+        <p:nvSpPr>
+          <p:cNvPr id="21" name="Rectangle: Diagonal Corners Snipped 20">
+            <a:extLst>
+              <a:ext uri="{FF2B5EF4-FFF2-40B4-BE49-F238E27FC236}">
+                <a16:creationId xmlns:a16="http://schemas.microsoft.com/office/drawing/2014/main" id="{55269FB2-D5C2-4595-A855-AF70120B482D}"/>
               </a:ext>
             </a:extLst>
           </p:cNvPr>
@@ -24859,7 +24959,7 @@
         </p:nvSpPr>
         <p:spPr>
           <a:xfrm rot="10800000">
-            <a:off x="10738872" y="5947621"/>
+            <a:off x="-302508" y="5954995"/>
             <a:ext cx="1757927" cy="579598"/>
           </a:xfrm>
           <a:prstGeom prst="snip2DiagRect">
@@ -24875,7 +24975,7 @@
           </a:solidFill>
           <a:ln w="95250">
             <a:solidFill>
-              <a:srgbClr val="2EEE53"/>
+              <a:srgbClr val="C00000"/>
             </a:solidFill>
           </a:ln>
           <a:effectLst/>
@@ -24907,10 +25007,10 @@
       </p:sp>
       <p:sp>
         <p:nvSpPr>
-          <p:cNvPr id="11" name="TextBox 10">
-            <a:extLst>
-              <a:ext uri="{FF2B5EF4-FFF2-40B4-BE49-F238E27FC236}">
-                <a16:creationId xmlns:a16="http://schemas.microsoft.com/office/drawing/2014/main" id="{60035FEB-C8BD-4EDD-9B1E-9A87F81EBBCE}"/>
+          <p:cNvPr id="22" name="TextBox 21">
+            <a:extLst>
+              <a:ext uri="{FF2B5EF4-FFF2-40B4-BE49-F238E27FC236}">
+                <a16:creationId xmlns:a16="http://schemas.microsoft.com/office/drawing/2014/main" id="{3BF0ADAB-2E25-4DFE-A509-7CDF1A777D2D}"/>
               </a:ext>
             </a:extLst>
           </p:cNvPr>
@@ -24919,7 +25019,7 @@
         </p:nvSpPr>
         <p:spPr>
           <a:xfrm>
-            <a:off x="10817937" y="5947623"/>
+            <a:off x="-223443" y="5954997"/>
             <a:ext cx="1588814" cy="584775"/>
           </a:xfrm>
           <a:prstGeom prst="rect">
@@ -24937,11 +25037,118 @@
             <a:r>
               <a:rPr lang="en-US" sz="3200" spc="300" dirty="0">
                 <a:solidFill>
-                  <a:srgbClr val="2EEE53"/>
-                </a:solidFill>
-                <a:latin typeface="Impact" panose="020B0806030902050204" pitchFamily="34" charset="0"/>
-              </a:rPr>
-              <a:t>Next</a:t>
+                  <a:srgbClr val="C00000"/>
+                </a:solidFill>
+                <a:latin typeface="Impact" panose="020B0806030902050204" pitchFamily="34" charset="0"/>
+              </a:rPr>
+              <a:t>Exit</a:t>
+            </a:r>
+            <a:endParaRPr lang="en-US" sz="8000" spc="300" dirty="0">
+              <a:solidFill>
+                <a:srgbClr val="C00000"/>
+              </a:solidFill>
+              <a:latin typeface="Impact" panose="020B0806030902050204" pitchFamily="34" charset="0"/>
+            </a:endParaRPr>
+          </a:p>
+        </p:txBody>
+      </p:sp>
+      <p:sp>
+        <p:nvSpPr>
+          <p:cNvPr id="10" name="Rectangle: Diagonal Corners Snipped 9">
+            <a:extLst>
+              <a:ext uri="{FF2B5EF4-FFF2-40B4-BE49-F238E27FC236}">
+                <a16:creationId xmlns:a16="http://schemas.microsoft.com/office/drawing/2014/main" id="{53B7CC88-4C5D-4A0E-9BCF-617CFBD05F41}"/>
+              </a:ext>
+            </a:extLst>
+          </p:cNvPr>
+          <p:cNvSpPr/>
+          <p:nvPr/>
+        </p:nvSpPr>
+        <p:spPr>
+          <a:xfrm rot="10800000">
+            <a:off x="10066020" y="5953927"/>
+            <a:ext cx="2430778" cy="579598"/>
+          </a:xfrm>
+          <a:prstGeom prst="snip2DiagRect">
+            <a:avLst>
+              <a:gd name="adj1" fmla="val 50000"/>
+              <a:gd name="adj2" fmla="val 0"/>
+            </a:avLst>
+          </a:prstGeom>
+          <a:solidFill>
+            <a:schemeClr val="tx1">
+              <a:alpha val="60000"/>
+            </a:schemeClr>
+          </a:solidFill>
+          <a:ln w="95250">
+            <a:solidFill>
+              <a:schemeClr val="bg1"/>
+            </a:solidFill>
+          </a:ln>
+          <a:effectLst/>
+        </p:spPr>
+        <p:style>
+          <a:lnRef idx="2">
+            <a:schemeClr val="accent1">
+              <a:shade val="50000"/>
+            </a:schemeClr>
+          </a:lnRef>
+          <a:fillRef idx="1">
+            <a:schemeClr val="accent1"/>
+          </a:fillRef>
+          <a:effectRef idx="0">
+            <a:schemeClr val="accent1"/>
+          </a:effectRef>
+          <a:fontRef idx="minor">
+            <a:schemeClr val="lt1"/>
+          </a:fontRef>
+        </p:style>
+        <p:txBody>
+          <a:bodyPr rtlCol="0" anchor="ctr"/>
+          <a:lstStyle/>
+          <a:p>
+            <a:pPr algn="ctr"/>
+            <a:endParaRPr lang="en-US" dirty="0"/>
+          </a:p>
+        </p:txBody>
+      </p:sp>
+      <p:sp>
+        <p:nvSpPr>
+          <p:cNvPr id="11" name="TextBox 10">
+            <a:extLst>
+              <a:ext uri="{FF2B5EF4-FFF2-40B4-BE49-F238E27FC236}">
+                <a16:creationId xmlns:a16="http://schemas.microsoft.com/office/drawing/2014/main" id="{60035FEB-C8BD-4EDD-9B1E-9A87F81EBBCE}"/>
+              </a:ext>
+            </a:extLst>
+          </p:cNvPr>
+          <p:cNvSpPr txBox="1"/>
+          <p:nvPr/>
+        </p:nvSpPr>
+        <p:spPr>
+          <a:xfrm>
+            <a:off x="10066020" y="5953929"/>
+            <a:ext cx="2340731" cy="584775"/>
+          </a:xfrm>
+          <a:prstGeom prst="rect">
+            <a:avLst/>
+          </a:prstGeom>
+          <a:noFill/>
+        </p:spPr>
+        <p:txBody>
+          <a:bodyPr wrap="square" rtlCol="0">
+            <a:spAutoFit/>
+          </a:bodyPr>
+          <a:lstStyle/>
+          <a:p>
+            <a:pPr algn="ctr"/>
+            <a:r>
+              <a:rPr lang="en-US" sz="3200" spc="300" dirty="0">
+                <a:solidFill>
+                  <a:srgbClr val="2EEE53"/>
+                </a:solidFill>
+                <a:latin typeface="Impact" panose="020B0806030902050204" pitchFamily="34" charset="0"/>
+              </a:rPr>
+              <a:t>Restart</a:t>
             </a:r>
             <a:endParaRPr lang="en-US" sz="8000" spc="300" dirty="0">
               <a:solidFill>
@@ -24955,7 +25162,7 @@
     </p:spTree>
     <p:extLst>
       <p:ext uri="{BB962C8B-B14F-4D97-AF65-F5344CB8AC3E}">
-        <p14:creationId xmlns:p14="http://schemas.microsoft.com/office/powerpoint/2010/main" val="1066838294"/>
+        <p14:creationId xmlns:p14="http://schemas.microsoft.com/office/powerpoint/2010/main" val="1472971372"/>
       </p:ext>
     </p:extLst>
   </p:cSld>
@@ -26115,1162 +26322,6 @@
           </a:solidFill>
           <a:ln w="95250">
             <a:solidFill>
-              <a:schemeClr val="bg1"/>
-            </a:solidFill>
-          </a:ln>
-          <a:effectLst/>
-        </p:spPr>
-        <p:style>
-          <a:lnRef idx="2">
-            <a:schemeClr val="accent1">
-              <a:shade val="50000"/>
-            </a:schemeClr>
-          </a:lnRef>
-          <a:fillRef idx="1">
-            <a:schemeClr val="accent1"/>
-          </a:fillRef>
-          <a:effectRef idx="0">
-            <a:schemeClr val="accent1"/>
-          </a:effectRef>
-          <a:fontRef idx="minor">
-            <a:schemeClr val="lt1"/>
-          </a:fontRef>
-        </p:style>
-        <p:txBody>
-          <a:bodyPr rtlCol="0" anchor="ctr"/>
-          <a:lstStyle/>
-          <a:p>
-            <a:pPr algn="ctr"/>
-            <a:endParaRPr lang="en-US" dirty="0"/>
-          </a:p>
-        </p:txBody>
-      </p:sp>
-      <p:sp>
-        <p:nvSpPr>
-          <p:cNvPr id="11" name="TextBox 10">
-            <a:extLst>
-              <a:ext uri="{FF2B5EF4-FFF2-40B4-BE49-F238E27FC236}">
-                <a16:creationId xmlns:a16="http://schemas.microsoft.com/office/drawing/2014/main" id="{60035FEB-C8BD-4EDD-9B1E-9A87F81EBBCE}"/>
-              </a:ext>
-            </a:extLst>
-          </p:cNvPr>
-          <p:cNvSpPr txBox="1"/>
-          <p:nvPr/>
-        </p:nvSpPr>
-        <p:spPr>
-          <a:xfrm>
-            <a:off x="10066020" y="5953929"/>
-            <a:ext cx="2340731" cy="584775"/>
-          </a:xfrm>
-          <a:prstGeom prst="rect">
-            <a:avLst/>
-          </a:prstGeom>
-          <a:noFill/>
-        </p:spPr>
-        <p:txBody>
-          <a:bodyPr wrap="square" rtlCol="0">
-            <a:spAutoFit/>
-          </a:bodyPr>
-          <a:lstStyle/>
-          <a:p>
-            <a:pPr algn="ctr"/>
-            <a:r>
-              <a:rPr lang="en-US" sz="3200" spc="300" dirty="0">
-                <a:solidFill>
-                  <a:srgbClr val="2EEE53"/>
-                </a:solidFill>
-                <a:latin typeface="Impact" panose="020B0806030902050204" pitchFamily="34" charset="0"/>
-              </a:rPr>
-              <a:t>Restart</a:t>
-            </a:r>
-            <a:endParaRPr lang="en-US" sz="8000" spc="300" dirty="0">
-              <a:solidFill>
-                <a:srgbClr val="2EEE53"/>
-              </a:solidFill>
-              <a:latin typeface="Impact" panose="020B0806030902050204" pitchFamily="34" charset="0"/>
-            </a:endParaRPr>
-          </a:p>
-        </p:txBody>
-      </p:sp>
-    </p:spTree>
-    <p:extLst>
-      <p:ext uri="{BB962C8B-B14F-4D97-AF65-F5344CB8AC3E}">
-        <p14:creationId xmlns:p14="http://schemas.microsoft.com/office/powerpoint/2010/main" val="3614375859"/>
-      </p:ext>
-    </p:extLst>
-  </p:cSld>
-  <p:clrMapOvr>
-    <a:masterClrMapping/>
-  </p:clrMapOvr>
-</p:sld>
-</file>
-
-<file path=ppt/slides/slide51.xml><?xml version="1.0" encoding="utf-8"?>
-<p:sld xmlns:a="http://schemas.openxmlformats.org/drawingml/2006/main" xmlns:r="http://schemas.openxmlformats.org/officeDocument/2006/relationships" xmlns:p="http://schemas.openxmlformats.org/presentationml/2006/main">
-  <p:cSld>
-    <p:spTree>
-      <p:nvGrpSpPr>
-        <p:cNvPr id="1" name=""/>
-        <p:cNvGrpSpPr/>
-        <p:nvPr/>
-      </p:nvGrpSpPr>
-      <p:grpSpPr>
-        <a:xfrm>
-          <a:off x="0" y="0"/>
-          <a:ext cx="0" cy="0"/>
-          <a:chOff x="0" y="0"/>
-          <a:chExt cx="0" cy="0"/>
-        </a:xfrm>
-      </p:grpSpPr>
-      <p:sp>
-        <p:nvSpPr>
-          <p:cNvPr id="40" name="Rectangle: Diagonal Corners Snipped 39">
-            <a:extLst>
-              <a:ext uri="{FF2B5EF4-FFF2-40B4-BE49-F238E27FC236}">
-                <a16:creationId xmlns:a16="http://schemas.microsoft.com/office/drawing/2014/main" id="{7BBCF4E2-9D5D-4D65-9B24-D6E002BE26A6}"/>
-              </a:ext>
-            </a:extLst>
-          </p:cNvPr>
-          <p:cNvSpPr/>
-          <p:nvPr/>
-        </p:nvSpPr>
-        <p:spPr>
-          <a:xfrm>
-            <a:off x="-375920" y="329714"/>
-            <a:ext cx="10043160" cy="1580526"/>
-          </a:xfrm>
-          <a:prstGeom prst="snip2DiagRect">
-            <a:avLst/>
-          </a:prstGeom>
-          <a:solidFill>
-            <a:schemeClr val="tx1">
-              <a:alpha val="60000"/>
-            </a:schemeClr>
-          </a:solidFill>
-          <a:ln w="95250">
-            <a:solidFill>
-              <a:schemeClr val="bg1"/>
-            </a:solidFill>
-          </a:ln>
-          <a:effectLst/>
-        </p:spPr>
-        <p:style>
-          <a:lnRef idx="2">
-            <a:schemeClr val="accent1">
-              <a:shade val="50000"/>
-            </a:schemeClr>
-          </a:lnRef>
-          <a:fillRef idx="1">
-            <a:schemeClr val="accent1"/>
-          </a:fillRef>
-          <a:effectRef idx="0">
-            <a:schemeClr val="accent1"/>
-          </a:effectRef>
-          <a:fontRef idx="minor">
-            <a:schemeClr val="lt1"/>
-          </a:fontRef>
-        </p:style>
-        <p:txBody>
-          <a:bodyPr rtlCol="0" anchor="ctr"/>
-          <a:lstStyle/>
-          <a:p>
-            <a:pPr algn="ctr"/>
-            <a:endParaRPr lang="en-US"/>
-          </a:p>
-        </p:txBody>
-      </p:sp>
-      <p:sp>
-        <p:nvSpPr>
-          <p:cNvPr id="41" name="TextBox 40">
-            <a:extLst>
-              <a:ext uri="{FF2B5EF4-FFF2-40B4-BE49-F238E27FC236}">
-                <a16:creationId xmlns:a16="http://schemas.microsoft.com/office/drawing/2014/main" id="{27B6D619-A007-418F-B651-9AF637930451}"/>
-              </a:ext>
-            </a:extLst>
-          </p:cNvPr>
-          <p:cNvSpPr txBox="1"/>
-          <p:nvPr/>
-        </p:nvSpPr>
-        <p:spPr>
-          <a:xfrm>
-            <a:off x="-375920" y="318848"/>
-            <a:ext cx="10043159" cy="1569660"/>
-          </a:xfrm>
-          <a:prstGeom prst="rect">
-            <a:avLst/>
-          </a:prstGeom>
-          <a:noFill/>
-        </p:spPr>
-        <p:txBody>
-          <a:bodyPr wrap="square" rtlCol="0" anchor="ctr">
-            <a:spAutoFit/>
-          </a:bodyPr>
-          <a:lstStyle/>
-          <a:p>
-            <a:pPr algn="ctr"/>
-            <a:r>
-              <a:rPr lang="en-US" sz="5400" spc="300" dirty="0">
-                <a:solidFill>
-                  <a:schemeClr val="bg1"/>
-                </a:solidFill>
-                <a:latin typeface="Impact" panose="020B0806030902050204" pitchFamily="34" charset="0"/>
-              </a:rPr>
-              <a:t>	</a:t>
-            </a:r>
-            <a:r>
-              <a:rPr lang="en-US" sz="9600" spc="300" dirty="0">
-                <a:solidFill>
-                  <a:srgbClr val="2EEE53"/>
-                </a:solidFill>
-                <a:latin typeface="Impact" panose="020B0806030902050204" pitchFamily="34" charset="0"/>
-              </a:rPr>
-              <a:t>The Encryption:</a:t>
-            </a:r>
-          </a:p>
-        </p:txBody>
-      </p:sp>
-      <p:sp>
-        <p:nvSpPr>
-          <p:cNvPr id="15" name="Rectangle: Diagonal Corners Snipped 14">
-            <a:extLst>
-              <a:ext uri="{FF2B5EF4-FFF2-40B4-BE49-F238E27FC236}">
-                <a16:creationId xmlns:a16="http://schemas.microsoft.com/office/drawing/2014/main" id="{DFCAC337-A778-4993-A5C4-0ECDF60A6DB3}"/>
-              </a:ext>
-            </a:extLst>
-          </p:cNvPr>
-          <p:cNvSpPr/>
-          <p:nvPr/>
-        </p:nvSpPr>
-        <p:spPr>
-          <a:xfrm>
-            <a:off x="-375920" y="2113925"/>
-            <a:ext cx="12095480" cy="3834763"/>
-          </a:xfrm>
-          <a:prstGeom prst="snip2DiagRect">
-            <a:avLst>
-              <a:gd name="adj1" fmla="val 7602"/>
-              <a:gd name="adj2" fmla="val 0"/>
-            </a:avLst>
-          </a:prstGeom>
-          <a:solidFill>
-            <a:schemeClr val="tx1">
-              <a:alpha val="60000"/>
-            </a:schemeClr>
-          </a:solidFill>
-          <a:ln w="95250">
-            <a:solidFill>
-              <a:schemeClr val="bg1"/>
-            </a:solidFill>
-          </a:ln>
-          <a:effectLst/>
-        </p:spPr>
-        <p:style>
-          <a:lnRef idx="2">
-            <a:schemeClr val="accent1">
-              <a:shade val="50000"/>
-            </a:schemeClr>
-          </a:lnRef>
-          <a:fillRef idx="1">
-            <a:schemeClr val="accent1"/>
-          </a:fillRef>
-          <a:effectRef idx="0">
-            <a:schemeClr val="accent1"/>
-          </a:effectRef>
-          <a:fontRef idx="minor">
-            <a:schemeClr val="lt1"/>
-          </a:fontRef>
-        </p:style>
-        <p:txBody>
-          <a:bodyPr rtlCol="0" anchor="ctr"/>
-          <a:lstStyle/>
-          <a:p>
-            <a:pPr algn="ctr"/>
-            <a:endParaRPr lang="en-US"/>
-          </a:p>
-        </p:txBody>
-      </p:sp>
-      <p:sp>
-        <p:nvSpPr>
-          <p:cNvPr id="16" name="TextBox 15">
-            <a:extLst>
-              <a:ext uri="{FF2B5EF4-FFF2-40B4-BE49-F238E27FC236}">
-                <a16:creationId xmlns:a16="http://schemas.microsoft.com/office/drawing/2014/main" id="{8CBEB1DC-1B52-42E4-9215-81B9ECB41B13}"/>
-              </a:ext>
-            </a:extLst>
-          </p:cNvPr>
-          <p:cNvSpPr txBox="1"/>
-          <p:nvPr/>
-        </p:nvSpPr>
-        <p:spPr>
-          <a:xfrm>
-            <a:off x="0" y="2137947"/>
-            <a:ext cx="11719560" cy="3785652"/>
-          </a:xfrm>
-          <a:prstGeom prst="rect">
-            <a:avLst/>
-          </a:prstGeom>
-          <a:noFill/>
-        </p:spPr>
-        <p:txBody>
-          <a:bodyPr wrap="square" rtlCol="0" anchor="t">
-            <a:spAutoFit/>
-          </a:bodyPr>
-          <a:lstStyle/>
-          <a:p>
-            <a:r>
-              <a:rPr lang="en-US" sz="4000" spc="300" dirty="0">
-                <a:solidFill>
-                  <a:srgbClr val="2EEE53"/>
-                </a:solidFill>
-                <a:latin typeface="Impact" panose="020B0806030902050204" pitchFamily="34" charset="0"/>
-              </a:rPr>
-              <a:t>Now you are finally ready for it,</a:t>
-            </a:r>
-          </a:p>
-          <a:p>
-            <a:r>
-              <a:rPr lang="en-US" sz="4000" spc="300" dirty="0">
-                <a:solidFill>
-                  <a:srgbClr val="2EEE53"/>
-                </a:solidFill>
-                <a:latin typeface="Impact" panose="020B0806030902050204" pitchFamily="34" charset="0"/>
-              </a:rPr>
-              <a:t>Your brand new decrypted </a:t>
-            </a:r>
-            <a:r>
-              <a:rPr lang="en-US" sz="4000" b="1" u="sng" spc="300" dirty="0">
-                <a:solidFill>
-                  <a:srgbClr val="2EEE53"/>
-                </a:solidFill>
-                <a:latin typeface="Impact" panose="020B0806030902050204" pitchFamily="34" charset="0"/>
-              </a:rPr>
-              <a:t>FILE</a:t>
-            </a:r>
-            <a:r>
-              <a:rPr lang="en-US" sz="4000" spc="300" dirty="0">
-                <a:solidFill>
-                  <a:srgbClr val="2EEE53"/>
-                </a:solidFill>
-                <a:latin typeface="Impact" panose="020B0806030902050204" pitchFamily="34" charset="0"/>
-              </a:rPr>
-              <a:t> is in the </a:t>
-            </a:r>
-            <a:r>
-              <a:rPr lang="en-US" sz="4000" b="1" u="sng" spc="300" dirty="0">
-                <a:solidFill>
-                  <a:srgbClr val="2EEE53"/>
-                </a:solidFill>
-                <a:latin typeface="Impact" panose="020B0806030902050204" pitchFamily="34" charset="0"/>
-              </a:rPr>
-              <a:t>ENCRYPTE</a:t>
-            </a:r>
-            <a:r>
-              <a:rPr lang="en-US" sz="4000" spc="300" dirty="0">
-                <a:solidFill>
-                  <a:srgbClr val="2EEE53"/>
-                </a:solidFill>
-                <a:latin typeface="Impact" panose="020B0806030902050204" pitchFamily="34" charset="0"/>
-              </a:rPr>
-              <a:t> </a:t>
-            </a:r>
-            <a:r>
-              <a:rPr lang="en-US" sz="4000" b="1" u="sng" spc="300" dirty="0">
-                <a:solidFill>
-                  <a:srgbClr val="2EEE53"/>
-                </a:solidFill>
-                <a:latin typeface="Impact" panose="020B0806030902050204" pitchFamily="34" charset="0"/>
-              </a:rPr>
-              <a:t>DIRECTORY</a:t>
-            </a:r>
-            <a:r>
-              <a:rPr lang="he-IL" sz="4000" spc="300" dirty="0">
-                <a:solidFill>
-                  <a:srgbClr val="2EEE53"/>
-                </a:solidFill>
-                <a:latin typeface="Impact" panose="020B0806030902050204" pitchFamily="34" charset="0"/>
-              </a:rPr>
-              <a:t> </a:t>
-            </a:r>
-            <a:r>
-              <a:rPr lang="en-US" sz="4000" spc="300" dirty="0">
-                <a:solidFill>
-                  <a:srgbClr val="2EEE53"/>
-                </a:solidFill>
-                <a:latin typeface="Impact" panose="020B0806030902050204" pitchFamily="34" charset="0"/>
-              </a:rPr>
-              <a:t>and is called </a:t>
-            </a:r>
-            <a:r>
-              <a:rPr lang="en-US" sz="4000" b="1" i="1" u="sng" spc="300" dirty="0">
-                <a:solidFill>
-                  <a:srgbClr val="2EEE53"/>
-                </a:solidFill>
-                <a:latin typeface="Impact" panose="020B0806030902050204" pitchFamily="34" charset="0"/>
-              </a:rPr>
-              <a:t>ENCRYPTE</a:t>
-            </a:r>
-            <a:r>
-              <a:rPr lang="en-US" sz="4000" spc="300" dirty="0">
-                <a:solidFill>
-                  <a:srgbClr val="2EEE53"/>
-                </a:solidFill>
-                <a:latin typeface="Impact" panose="020B0806030902050204" pitchFamily="34" charset="0"/>
-              </a:rPr>
-              <a:t>, go Download it!</a:t>
-            </a:r>
-          </a:p>
-          <a:p>
-            <a:r>
-              <a:rPr lang="en-US" sz="4000" spc="300" dirty="0">
-                <a:solidFill>
-                  <a:srgbClr val="2EEE53"/>
-                </a:solidFill>
-                <a:latin typeface="Impact" panose="020B0806030902050204" pitchFamily="34" charset="0"/>
-              </a:rPr>
-              <a:t>And don’t forget, you’ll need the </a:t>
-            </a:r>
-            <a:r>
-              <a:rPr lang="en-US" sz="4000" i="1" u="sng" spc="300" dirty="0">
-                <a:solidFill>
-                  <a:srgbClr val="2EEE53"/>
-                </a:solidFill>
-                <a:latin typeface="Impact" panose="020B0806030902050204" pitchFamily="34" charset="0"/>
-              </a:rPr>
-              <a:t>DATAFILE</a:t>
-            </a:r>
-            <a:r>
-              <a:rPr lang="en-US" sz="4000" spc="300" dirty="0">
-                <a:solidFill>
-                  <a:srgbClr val="2EEE53"/>
-                </a:solidFill>
-                <a:latin typeface="Impact" panose="020B0806030902050204" pitchFamily="34" charset="0"/>
-              </a:rPr>
-              <a:t>  to decrypt your file later.</a:t>
-            </a:r>
-            <a:endParaRPr lang="en-US" sz="4000" b="1" u="sng" spc="300" dirty="0">
-              <a:solidFill>
-                <a:srgbClr val="2EEE53"/>
-              </a:solidFill>
-              <a:latin typeface="Impact" panose="020B0806030902050204" pitchFamily="34" charset="0"/>
-            </a:endParaRPr>
-          </a:p>
-        </p:txBody>
-      </p:sp>
-      <p:sp>
-        <p:nvSpPr>
-          <p:cNvPr id="21" name="Rectangle: Diagonal Corners Snipped 20">
-            <a:extLst>
-              <a:ext uri="{FF2B5EF4-FFF2-40B4-BE49-F238E27FC236}">
-                <a16:creationId xmlns:a16="http://schemas.microsoft.com/office/drawing/2014/main" id="{55269FB2-D5C2-4595-A855-AF70120B482D}"/>
-              </a:ext>
-            </a:extLst>
-          </p:cNvPr>
-          <p:cNvSpPr/>
-          <p:nvPr/>
-        </p:nvSpPr>
-        <p:spPr>
-          <a:xfrm rot="10800000">
-            <a:off x="-302508" y="5954995"/>
-            <a:ext cx="1757927" cy="579598"/>
-          </a:xfrm>
-          <a:prstGeom prst="snip2DiagRect">
-            <a:avLst>
-              <a:gd name="adj1" fmla="val 50000"/>
-              <a:gd name="adj2" fmla="val 0"/>
-            </a:avLst>
-          </a:prstGeom>
-          <a:solidFill>
-            <a:schemeClr val="tx1">
-              <a:alpha val="60000"/>
-            </a:schemeClr>
-          </a:solidFill>
-          <a:ln w="95250">
-            <a:solidFill>
-              <a:srgbClr val="C00000"/>
-            </a:solidFill>
-          </a:ln>
-          <a:effectLst/>
-        </p:spPr>
-        <p:style>
-          <a:lnRef idx="2">
-            <a:schemeClr val="accent1">
-              <a:shade val="50000"/>
-            </a:schemeClr>
-          </a:lnRef>
-          <a:fillRef idx="1">
-            <a:schemeClr val="accent1"/>
-          </a:fillRef>
-          <a:effectRef idx="0">
-            <a:schemeClr val="accent1"/>
-          </a:effectRef>
-          <a:fontRef idx="minor">
-            <a:schemeClr val="lt1"/>
-          </a:fontRef>
-        </p:style>
-        <p:txBody>
-          <a:bodyPr rtlCol="0" anchor="ctr"/>
-          <a:lstStyle/>
-          <a:p>
-            <a:pPr algn="ctr"/>
-            <a:endParaRPr lang="en-US" dirty="0"/>
-          </a:p>
-        </p:txBody>
-      </p:sp>
-      <p:sp>
-        <p:nvSpPr>
-          <p:cNvPr id="22" name="TextBox 21">
-            <a:extLst>
-              <a:ext uri="{FF2B5EF4-FFF2-40B4-BE49-F238E27FC236}">
-                <a16:creationId xmlns:a16="http://schemas.microsoft.com/office/drawing/2014/main" id="{3BF0ADAB-2E25-4DFE-A509-7CDF1A777D2D}"/>
-              </a:ext>
-            </a:extLst>
-          </p:cNvPr>
-          <p:cNvSpPr txBox="1"/>
-          <p:nvPr/>
-        </p:nvSpPr>
-        <p:spPr>
-          <a:xfrm>
-            <a:off x="-223443" y="5954997"/>
-            <a:ext cx="1588814" cy="584775"/>
-          </a:xfrm>
-          <a:prstGeom prst="rect">
-            <a:avLst/>
-          </a:prstGeom>
-          <a:noFill/>
-        </p:spPr>
-        <p:txBody>
-          <a:bodyPr wrap="square" rtlCol="0">
-            <a:spAutoFit/>
-          </a:bodyPr>
-          <a:lstStyle/>
-          <a:p>
-            <a:pPr algn="ctr"/>
-            <a:r>
-              <a:rPr lang="en-US" sz="3200" spc="300" dirty="0">
-                <a:solidFill>
-                  <a:srgbClr val="C00000"/>
-                </a:solidFill>
-                <a:latin typeface="Impact" panose="020B0806030902050204" pitchFamily="34" charset="0"/>
-              </a:rPr>
-              <a:t>Exit</a:t>
-            </a:r>
-            <a:endParaRPr lang="en-US" sz="8000" spc="300" dirty="0">
-              <a:solidFill>
-                <a:srgbClr val="C00000"/>
-              </a:solidFill>
-              <a:latin typeface="Impact" panose="020B0806030902050204" pitchFamily="34" charset="0"/>
-            </a:endParaRPr>
-          </a:p>
-        </p:txBody>
-      </p:sp>
-      <p:sp>
-        <p:nvSpPr>
-          <p:cNvPr id="10" name="Rectangle: Diagonal Corners Snipped 9">
-            <a:extLst>
-              <a:ext uri="{FF2B5EF4-FFF2-40B4-BE49-F238E27FC236}">
-                <a16:creationId xmlns:a16="http://schemas.microsoft.com/office/drawing/2014/main" id="{53B7CC88-4C5D-4A0E-9BCF-617CFBD05F41}"/>
-              </a:ext>
-            </a:extLst>
-          </p:cNvPr>
-          <p:cNvSpPr/>
-          <p:nvPr/>
-        </p:nvSpPr>
-        <p:spPr>
-          <a:xfrm rot="10800000">
-            <a:off x="10066020" y="5953927"/>
-            <a:ext cx="2430778" cy="579598"/>
-          </a:xfrm>
-          <a:prstGeom prst="snip2DiagRect">
-            <a:avLst>
-              <a:gd name="adj1" fmla="val 50000"/>
-              <a:gd name="adj2" fmla="val 0"/>
-            </a:avLst>
-          </a:prstGeom>
-          <a:solidFill>
-            <a:schemeClr val="tx1">
-              <a:alpha val="60000"/>
-            </a:schemeClr>
-          </a:solidFill>
-          <a:ln w="95250">
-            <a:solidFill>
-              <a:schemeClr val="bg1"/>
-            </a:solidFill>
-          </a:ln>
-          <a:effectLst/>
-        </p:spPr>
-        <p:style>
-          <a:lnRef idx="2">
-            <a:schemeClr val="accent1">
-              <a:shade val="50000"/>
-            </a:schemeClr>
-          </a:lnRef>
-          <a:fillRef idx="1">
-            <a:schemeClr val="accent1"/>
-          </a:fillRef>
-          <a:effectRef idx="0">
-            <a:schemeClr val="accent1"/>
-          </a:effectRef>
-          <a:fontRef idx="minor">
-            <a:schemeClr val="lt1"/>
-          </a:fontRef>
-        </p:style>
-        <p:txBody>
-          <a:bodyPr rtlCol="0" anchor="ctr"/>
-          <a:lstStyle/>
-          <a:p>
-            <a:pPr algn="ctr"/>
-            <a:endParaRPr lang="en-US" dirty="0"/>
-          </a:p>
-        </p:txBody>
-      </p:sp>
-      <p:sp>
-        <p:nvSpPr>
-          <p:cNvPr id="11" name="TextBox 10">
-            <a:extLst>
-              <a:ext uri="{FF2B5EF4-FFF2-40B4-BE49-F238E27FC236}">
-                <a16:creationId xmlns:a16="http://schemas.microsoft.com/office/drawing/2014/main" id="{60035FEB-C8BD-4EDD-9B1E-9A87F81EBBCE}"/>
-              </a:ext>
-            </a:extLst>
-          </p:cNvPr>
-          <p:cNvSpPr txBox="1"/>
-          <p:nvPr/>
-        </p:nvSpPr>
-        <p:spPr>
-          <a:xfrm>
-            <a:off x="10066020" y="5953929"/>
-            <a:ext cx="2340731" cy="584775"/>
-          </a:xfrm>
-          <a:prstGeom prst="rect">
-            <a:avLst/>
-          </a:prstGeom>
-          <a:noFill/>
-        </p:spPr>
-        <p:txBody>
-          <a:bodyPr wrap="square" rtlCol="0">
-            <a:spAutoFit/>
-          </a:bodyPr>
-          <a:lstStyle/>
-          <a:p>
-            <a:pPr algn="ctr"/>
-            <a:r>
-              <a:rPr lang="en-US" sz="3200" spc="300" dirty="0">
-                <a:solidFill>
-                  <a:srgbClr val="2EEE53"/>
-                </a:solidFill>
-                <a:latin typeface="Impact" panose="020B0806030902050204" pitchFamily="34" charset="0"/>
-              </a:rPr>
-              <a:t>Restart</a:t>
-            </a:r>
-            <a:endParaRPr lang="en-US" sz="8000" spc="300" dirty="0">
-              <a:solidFill>
-                <a:srgbClr val="2EEE53"/>
-              </a:solidFill>
-              <a:latin typeface="Impact" panose="020B0806030902050204" pitchFamily="34" charset="0"/>
-            </a:endParaRPr>
-          </a:p>
-        </p:txBody>
-      </p:sp>
-    </p:spTree>
-    <p:extLst>
-      <p:ext uri="{BB962C8B-B14F-4D97-AF65-F5344CB8AC3E}">
-        <p14:creationId xmlns:p14="http://schemas.microsoft.com/office/powerpoint/2010/main" val="1472971372"/>
-      </p:ext>
-    </p:extLst>
-  </p:cSld>
-  <p:clrMapOvr>
-    <a:masterClrMapping/>
-  </p:clrMapOvr>
-</p:sld>
-</file>
-
-<file path=ppt/slides/slide52.xml><?xml version="1.0" encoding="utf-8"?>
-<p:sld xmlns:a="http://schemas.openxmlformats.org/drawingml/2006/main" xmlns:r="http://schemas.openxmlformats.org/officeDocument/2006/relationships" xmlns:p="http://schemas.openxmlformats.org/presentationml/2006/main">
-  <p:cSld>
-    <p:spTree>
-      <p:nvGrpSpPr>
-        <p:cNvPr id="1" name=""/>
-        <p:cNvGrpSpPr/>
-        <p:nvPr/>
-      </p:nvGrpSpPr>
-      <p:grpSpPr>
-        <a:xfrm>
-          <a:off x="0" y="0"/>
-          <a:ext cx="0" cy="0"/>
-          <a:chOff x="0" y="0"/>
-          <a:chExt cx="0" cy="0"/>
-        </a:xfrm>
-      </p:grpSpPr>
-      <p:sp>
-        <p:nvSpPr>
-          <p:cNvPr id="40" name="Rectangle: Diagonal Corners Snipped 39">
-            <a:extLst>
-              <a:ext uri="{FF2B5EF4-FFF2-40B4-BE49-F238E27FC236}">
-                <a16:creationId xmlns:a16="http://schemas.microsoft.com/office/drawing/2014/main" id="{7BBCF4E2-9D5D-4D65-9B24-D6E002BE26A6}"/>
-              </a:ext>
-            </a:extLst>
-          </p:cNvPr>
-          <p:cNvSpPr/>
-          <p:nvPr/>
-        </p:nvSpPr>
-        <p:spPr>
-          <a:xfrm>
-            <a:off x="-375920" y="329714"/>
-            <a:ext cx="10043160" cy="1580526"/>
-          </a:xfrm>
-          <a:prstGeom prst="snip2DiagRect">
-            <a:avLst/>
-          </a:prstGeom>
-          <a:solidFill>
-            <a:schemeClr val="tx1">
-              <a:alpha val="60000"/>
-            </a:schemeClr>
-          </a:solidFill>
-          <a:ln w="95250">
-            <a:solidFill>
-              <a:schemeClr val="bg1"/>
-            </a:solidFill>
-          </a:ln>
-          <a:effectLst/>
-        </p:spPr>
-        <p:style>
-          <a:lnRef idx="2">
-            <a:schemeClr val="accent1">
-              <a:shade val="50000"/>
-            </a:schemeClr>
-          </a:lnRef>
-          <a:fillRef idx="1">
-            <a:schemeClr val="accent1"/>
-          </a:fillRef>
-          <a:effectRef idx="0">
-            <a:schemeClr val="accent1"/>
-          </a:effectRef>
-          <a:fontRef idx="minor">
-            <a:schemeClr val="lt1"/>
-          </a:fontRef>
-        </p:style>
-        <p:txBody>
-          <a:bodyPr rtlCol="0" anchor="ctr"/>
-          <a:lstStyle/>
-          <a:p>
-            <a:pPr algn="ctr"/>
-            <a:endParaRPr lang="en-US"/>
-          </a:p>
-        </p:txBody>
-      </p:sp>
-      <p:sp>
-        <p:nvSpPr>
-          <p:cNvPr id="41" name="TextBox 40">
-            <a:extLst>
-              <a:ext uri="{FF2B5EF4-FFF2-40B4-BE49-F238E27FC236}">
-                <a16:creationId xmlns:a16="http://schemas.microsoft.com/office/drawing/2014/main" id="{27B6D619-A007-418F-B651-9AF637930451}"/>
-              </a:ext>
-            </a:extLst>
-          </p:cNvPr>
-          <p:cNvSpPr txBox="1"/>
-          <p:nvPr/>
-        </p:nvSpPr>
-        <p:spPr>
-          <a:xfrm>
-            <a:off x="-375920" y="318848"/>
-            <a:ext cx="10043159" cy="1569660"/>
-          </a:xfrm>
-          <a:prstGeom prst="rect">
-            <a:avLst/>
-          </a:prstGeom>
-          <a:noFill/>
-        </p:spPr>
-        <p:txBody>
-          <a:bodyPr wrap="square" rtlCol="0" anchor="ctr">
-            <a:spAutoFit/>
-          </a:bodyPr>
-          <a:lstStyle/>
-          <a:p>
-            <a:pPr algn="ctr"/>
-            <a:r>
-              <a:rPr lang="en-US" sz="5400" spc="300" dirty="0">
-                <a:solidFill>
-                  <a:schemeClr val="bg1"/>
-                </a:solidFill>
-                <a:latin typeface="Impact" panose="020B0806030902050204" pitchFamily="34" charset="0"/>
-              </a:rPr>
-              <a:t>	</a:t>
-            </a:r>
-            <a:r>
-              <a:rPr lang="en-US" sz="9600" spc="300" dirty="0">
-                <a:solidFill>
-                  <a:srgbClr val="2EEE53"/>
-                </a:solidFill>
-                <a:latin typeface="Impact" panose="020B0806030902050204" pitchFamily="34" charset="0"/>
-              </a:rPr>
-              <a:t>The Encryption:</a:t>
-            </a:r>
-          </a:p>
-        </p:txBody>
-      </p:sp>
-      <p:sp>
-        <p:nvSpPr>
-          <p:cNvPr id="15" name="Rectangle: Diagonal Corners Snipped 14">
-            <a:extLst>
-              <a:ext uri="{FF2B5EF4-FFF2-40B4-BE49-F238E27FC236}">
-                <a16:creationId xmlns:a16="http://schemas.microsoft.com/office/drawing/2014/main" id="{DFCAC337-A778-4993-A5C4-0ECDF60A6DB3}"/>
-              </a:ext>
-            </a:extLst>
-          </p:cNvPr>
-          <p:cNvSpPr/>
-          <p:nvPr/>
-        </p:nvSpPr>
-        <p:spPr>
-          <a:xfrm>
-            <a:off x="-375920" y="2113925"/>
-            <a:ext cx="12095480" cy="3834763"/>
-          </a:xfrm>
-          <a:prstGeom prst="snip2DiagRect">
-            <a:avLst>
-              <a:gd name="adj1" fmla="val 7602"/>
-              <a:gd name="adj2" fmla="val 0"/>
-            </a:avLst>
-          </a:prstGeom>
-          <a:solidFill>
-            <a:schemeClr val="tx1">
-              <a:alpha val="60000"/>
-            </a:schemeClr>
-          </a:solidFill>
-          <a:ln w="95250">
-            <a:solidFill>
-              <a:schemeClr val="bg1"/>
-            </a:solidFill>
-          </a:ln>
-          <a:effectLst/>
-        </p:spPr>
-        <p:style>
-          <a:lnRef idx="2">
-            <a:schemeClr val="accent1">
-              <a:shade val="50000"/>
-            </a:schemeClr>
-          </a:lnRef>
-          <a:fillRef idx="1">
-            <a:schemeClr val="accent1"/>
-          </a:fillRef>
-          <a:effectRef idx="0">
-            <a:schemeClr val="accent1"/>
-          </a:effectRef>
-          <a:fontRef idx="minor">
-            <a:schemeClr val="lt1"/>
-          </a:fontRef>
-        </p:style>
-        <p:txBody>
-          <a:bodyPr rtlCol="0" anchor="ctr"/>
-          <a:lstStyle/>
-          <a:p>
-            <a:pPr algn="ctr"/>
-            <a:endParaRPr lang="en-US"/>
-          </a:p>
-        </p:txBody>
-      </p:sp>
-      <p:sp>
-        <p:nvSpPr>
-          <p:cNvPr id="16" name="TextBox 15">
-            <a:extLst>
-              <a:ext uri="{FF2B5EF4-FFF2-40B4-BE49-F238E27FC236}">
-                <a16:creationId xmlns:a16="http://schemas.microsoft.com/office/drawing/2014/main" id="{8CBEB1DC-1B52-42E4-9215-81B9ECB41B13}"/>
-              </a:ext>
-            </a:extLst>
-          </p:cNvPr>
-          <p:cNvSpPr txBox="1"/>
-          <p:nvPr/>
-        </p:nvSpPr>
-        <p:spPr>
-          <a:xfrm>
-            <a:off x="0" y="2137947"/>
-            <a:ext cx="11719560" cy="3785652"/>
-          </a:xfrm>
-          <a:prstGeom prst="rect">
-            <a:avLst/>
-          </a:prstGeom>
-          <a:noFill/>
-        </p:spPr>
-        <p:txBody>
-          <a:bodyPr wrap="square" rtlCol="0" anchor="t">
-            <a:spAutoFit/>
-          </a:bodyPr>
-          <a:lstStyle/>
-          <a:p>
-            <a:r>
-              <a:rPr lang="en-US" sz="4000" spc="300" dirty="0">
-                <a:solidFill>
-                  <a:srgbClr val="2EEE53"/>
-                </a:solidFill>
-                <a:latin typeface="Impact" panose="020B0806030902050204" pitchFamily="34" charset="0"/>
-              </a:rPr>
-              <a:t>Now you are finally ready for it,</a:t>
-            </a:r>
-          </a:p>
-          <a:p>
-            <a:r>
-              <a:rPr lang="en-US" sz="4000" spc="300" dirty="0">
-                <a:solidFill>
-                  <a:srgbClr val="2EEE53"/>
-                </a:solidFill>
-                <a:latin typeface="Impact" panose="020B0806030902050204" pitchFamily="34" charset="0"/>
-              </a:rPr>
-              <a:t>Your brand new decrypted </a:t>
-            </a:r>
-            <a:r>
-              <a:rPr lang="en-US" sz="4000" b="1" u="sng" spc="300" dirty="0">
-                <a:solidFill>
-                  <a:srgbClr val="2EEE53"/>
-                </a:solidFill>
-                <a:latin typeface="Impact" panose="020B0806030902050204" pitchFamily="34" charset="0"/>
-              </a:rPr>
-              <a:t>FILE</a:t>
-            </a:r>
-            <a:r>
-              <a:rPr lang="en-US" sz="4000" spc="300" dirty="0">
-                <a:solidFill>
-                  <a:srgbClr val="2EEE53"/>
-                </a:solidFill>
-                <a:latin typeface="Impact" panose="020B0806030902050204" pitchFamily="34" charset="0"/>
-              </a:rPr>
-              <a:t> is in the </a:t>
-            </a:r>
-            <a:r>
-              <a:rPr lang="en-US" sz="4000" b="1" u="sng" spc="300" dirty="0">
-                <a:solidFill>
-                  <a:srgbClr val="2EEE53"/>
-                </a:solidFill>
-                <a:latin typeface="Impact" panose="020B0806030902050204" pitchFamily="34" charset="0"/>
-              </a:rPr>
-              <a:t>ENCRYPTE</a:t>
-            </a:r>
-            <a:r>
-              <a:rPr lang="en-US" sz="4000" spc="300" dirty="0">
-                <a:solidFill>
-                  <a:srgbClr val="2EEE53"/>
-                </a:solidFill>
-                <a:latin typeface="Impact" panose="020B0806030902050204" pitchFamily="34" charset="0"/>
-              </a:rPr>
-              <a:t> </a:t>
-            </a:r>
-            <a:r>
-              <a:rPr lang="en-US" sz="4000" b="1" u="sng" spc="300" dirty="0">
-                <a:solidFill>
-                  <a:srgbClr val="2EEE53"/>
-                </a:solidFill>
-                <a:latin typeface="Impact" panose="020B0806030902050204" pitchFamily="34" charset="0"/>
-              </a:rPr>
-              <a:t>DIRECTORY</a:t>
-            </a:r>
-            <a:r>
-              <a:rPr lang="he-IL" sz="4000" spc="300" dirty="0">
-                <a:solidFill>
-                  <a:srgbClr val="2EEE53"/>
-                </a:solidFill>
-                <a:latin typeface="Impact" panose="020B0806030902050204" pitchFamily="34" charset="0"/>
-              </a:rPr>
-              <a:t> </a:t>
-            </a:r>
-            <a:r>
-              <a:rPr lang="en-US" sz="4000" spc="300" dirty="0">
-                <a:solidFill>
-                  <a:srgbClr val="2EEE53"/>
-                </a:solidFill>
-                <a:latin typeface="Impact" panose="020B0806030902050204" pitchFamily="34" charset="0"/>
-              </a:rPr>
-              <a:t>and is called </a:t>
-            </a:r>
-            <a:r>
-              <a:rPr lang="en-US" sz="4000" b="1" i="1" u="sng" spc="300" dirty="0">
-                <a:solidFill>
-                  <a:srgbClr val="2EEE53"/>
-                </a:solidFill>
-                <a:latin typeface="Impact" panose="020B0806030902050204" pitchFamily="34" charset="0"/>
-              </a:rPr>
-              <a:t>ENCRYPTE</a:t>
-            </a:r>
-            <a:r>
-              <a:rPr lang="en-US" sz="4000" spc="300" dirty="0">
-                <a:solidFill>
-                  <a:srgbClr val="2EEE53"/>
-                </a:solidFill>
-                <a:latin typeface="Impact" panose="020B0806030902050204" pitchFamily="34" charset="0"/>
-              </a:rPr>
-              <a:t>, go Download it!</a:t>
-            </a:r>
-          </a:p>
-          <a:p>
-            <a:r>
-              <a:rPr lang="en-US" sz="4000" spc="300" dirty="0">
-                <a:solidFill>
-                  <a:srgbClr val="2EEE53"/>
-                </a:solidFill>
-                <a:latin typeface="Impact" panose="020B0806030902050204" pitchFamily="34" charset="0"/>
-              </a:rPr>
-              <a:t>And don’t forget, you’ll need the </a:t>
-            </a:r>
-            <a:r>
-              <a:rPr lang="en-US" sz="4000" i="1" u="sng" spc="300" dirty="0">
-                <a:solidFill>
-                  <a:srgbClr val="2EEE53"/>
-                </a:solidFill>
-                <a:latin typeface="Impact" panose="020B0806030902050204" pitchFamily="34" charset="0"/>
-              </a:rPr>
-              <a:t>DATAFILE</a:t>
-            </a:r>
-            <a:r>
-              <a:rPr lang="en-US" sz="4000" spc="300" dirty="0">
-                <a:solidFill>
-                  <a:srgbClr val="2EEE53"/>
-                </a:solidFill>
-                <a:latin typeface="Impact" panose="020B0806030902050204" pitchFamily="34" charset="0"/>
-              </a:rPr>
-              <a:t>  to decrypt your file later.</a:t>
-            </a:r>
-            <a:endParaRPr lang="en-US" sz="4000" b="1" u="sng" spc="300" dirty="0">
-              <a:solidFill>
-                <a:srgbClr val="2EEE53"/>
-              </a:solidFill>
-              <a:latin typeface="Impact" panose="020B0806030902050204" pitchFamily="34" charset="0"/>
-            </a:endParaRPr>
-          </a:p>
-        </p:txBody>
-      </p:sp>
-      <p:sp>
-        <p:nvSpPr>
-          <p:cNvPr id="21" name="Rectangle: Diagonal Corners Snipped 20">
-            <a:extLst>
-              <a:ext uri="{FF2B5EF4-FFF2-40B4-BE49-F238E27FC236}">
-                <a16:creationId xmlns:a16="http://schemas.microsoft.com/office/drawing/2014/main" id="{55269FB2-D5C2-4595-A855-AF70120B482D}"/>
-              </a:ext>
-            </a:extLst>
-          </p:cNvPr>
-          <p:cNvSpPr/>
-          <p:nvPr/>
-        </p:nvSpPr>
-        <p:spPr>
-          <a:xfrm rot="10800000">
-            <a:off x="-302508" y="5954995"/>
-            <a:ext cx="1757927" cy="579598"/>
-          </a:xfrm>
-          <a:prstGeom prst="snip2DiagRect">
-            <a:avLst>
-              <a:gd name="adj1" fmla="val 50000"/>
-              <a:gd name="adj2" fmla="val 0"/>
-            </a:avLst>
-          </a:prstGeom>
-          <a:solidFill>
-            <a:schemeClr val="tx1">
-              <a:alpha val="60000"/>
-            </a:schemeClr>
-          </a:solidFill>
-          <a:ln w="95250">
-            <a:solidFill>
-              <a:schemeClr val="bg1"/>
-            </a:solidFill>
-          </a:ln>
-          <a:effectLst/>
-        </p:spPr>
-        <p:style>
-          <a:lnRef idx="2">
-            <a:schemeClr val="accent1">
-              <a:shade val="50000"/>
-            </a:schemeClr>
-          </a:lnRef>
-          <a:fillRef idx="1">
-            <a:schemeClr val="accent1"/>
-          </a:fillRef>
-          <a:effectRef idx="0">
-            <a:schemeClr val="accent1"/>
-          </a:effectRef>
-          <a:fontRef idx="minor">
-            <a:schemeClr val="lt1"/>
-          </a:fontRef>
-        </p:style>
-        <p:txBody>
-          <a:bodyPr rtlCol="0" anchor="ctr"/>
-          <a:lstStyle/>
-          <a:p>
-            <a:pPr algn="ctr"/>
-            <a:endParaRPr lang="en-US" dirty="0"/>
-          </a:p>
-        </p:txBody>
-      </p:sp>
-      <p:sp>
-        <p:nvSpPr>
-          <p:cNvPr id="22" name="TextBox 21">
-            <a:extLst>
-              <a:ext uri="{FF2B5EF4-FFF2-40B4-BE49-F238E27FC236}">
-                <a16:creationId xmlns:a16="http://schemas.microsoft.com/office/drawing/2014/main" id="{3BF0ADAB-2E25-4DFE-A509-7CDF1A777D2D}"/>
-              </a:ext>
-            </a:extLst>
-          </p:cNvPr>
-          <p:cNvSpPr txBox="1"/>
-          <p:nvPr/>
-        </p:nvSpPr>
-        <p:spPr>
-          <a:xfrm>
-            <a:off x="-223443" y="5954997"/>
-            <a:ext cx="1588814" cy="584775"/>
-          </a:xfrm>
-          <a:prstGeom prst="rect">
-            <a:avLst/>
-          </a:prstGeom>
-          <a:noFill/>
-        </p:spPr>
-        <p:txBody>
-          <a:bodyPr wrap="square" rtlCol="0">
-            <a:spAutoFit/>
-          </a:bodyPr>
-          <a:lstStyle/>
-          <a:p>
-            <a:pPr algn="ctr"/>
-            <a:r>
-              <a:rPr lang="en-US" sz="3200" spc="300" dirty="0">
-                <a:solidFill>
-                  <a:srgbClr val="C00000"/>
-                </a:solidFill>
-                <a:latin typeface="Impact" panose="020B0806030902050204" pitchFamily="34" charset="0"/>
-              </a:rPr>
-              <a:t>Exit</a:t>
-            </a:r>
-            <a:endParaRPr lang="en-US" sz="8000" spc="300" dirty="0">
-              <a:solidFill>
-                <a:srgbClr val="C00000"/>
-              </a:solidFill>
-              <a:latin typeface="Impact" panose="020B0806030902050204" pitchFamily="34" charset="0"/>
-            </a:endParaRPr>
-          </a:p>
-        </p:txBody>
-      </p:sp>
-      <p:sp>
-        <p:nvSpPr>
-          <p:cNvPr id="10" name="Rectangle: Diagonal Corners Snipped 9">
-            <a:extLst>
-              <a:ext uri="{FF2B5EF4-FFF2-40B4-BE49-F238E27FC236}">
-                <a16:creationId xmlns:a16="http://schemas.microsoft.com/office/drawing/2014/main" id="{53B7CC88-4C5D-4A0E-9BCF-617CFBD05F41}"/>
-              </a:ext>
-            </a:extLst>
-          </p:cNvPr>
-          <p:cNvSpPr/>
-          <p:nvPr/>
-        </p:nvSpPr>
-        <p:spPr>
-          <a:xfrm rot="10800000">
-            <a:off x="10066020" y="5953927"/>
-            <a:ext cx="2430778" cy="579598"/>
-          </a:xfrm>
-          <a:prstGeom prst="snip2DiagRect">
-            <a:avLst>
-              <a:gd name="adj1" fmla="val 50000"/>
-              <a:gd name="adj2" fmla="val 0"/>
-            </a:avLst>
-          </a:prstGeom>
-          <a:solidFill>
-            <a:schemeClr val="tx1">
-              <a:alpha val="60000"/>
-            </a:schemeClr>
-          </a:solidFill>
-          <a:ln w="95250">
-            <a:solidFill>
               <a:srgbClr val="2EEE53"/>
             </a:solidFill>
           </a:ln>
@@ -27361,7 +26412,7 @@
 </p:sld>
 </file>
 
-<file path=ppt/slides/slide53.xml><?xml version="1.0" encoding="utf-8"?>
+<file path=ppt/slides/slide51.xml><?xml version="1.0" encoding="utf-8"?>
 <p:sld xmlns:a="http://schemas.openxmlformats.org/drawingml/2006/main" xmlns:r="http://schemas.openxmlformats.org/officeDocument/2006/relationships" xmlns:p="http://schemas.openxmlformats.org/presentationml/2006/main">
   <p:cSld>
     <p:bg>

</xml_diff>

<commit_message>
Final hand over version.
</commit_message>
<xml_diff>
--- a/Screens/Presentation1.pptx
+++ b/Screens/Presentation1.pptx
@@ -49,13 +49,15 @@
     <p:sldId id="273" r:id="rId43"/>
     <p:sldId id="335" r:id="rId44"/>
     <p:sldId id="324" r:id="rId45"/>
-    <p:sldId id="278" r:id="rId46"/>
-    <p:sldId id="325" r:id="rId47"/>
-    <p:sldId id="306" r:id="rId48"/>
-    <p:sldId id="308" r:id="rId49"/>
-    <p:sldId id="336" r:id="rId50"/>
-    <p:sldId id="326" r:id="rId51"/>
-    <p:sldId id="337" r:id="rId52"/>
+    <p:sldId id="348" r:id="rId46"/>
+    <p:sldId id="349" r:id="rId47"/>
+    <p:sldId id="278" r:id="rId48"/>
+    <p:sldId id="325" r:id="rId49"/>
+    <p:sldId id="306" r:id="rId50"/>
+    <p:sldId id="308" r:id="rId51"/>
+    <p:sldId id="336" r:id="rId52"/>
+    <p:sldId id="326" r:id="rId53"/>
+    <p:sldId id="337" r:id="rId54"/>
   </p:sldIdLst>
   <p:sldSz cx="12192000" cy="6858000"/>
   <p:notesSz cx="6858000" cy="9144000"/>
@@ -235,6 +237,8 @@
             <p14:sldId id="273"/>
             <p14:sldId id="335"/>
             <p14:sldId id="324"/>
+            <p14:sldId id="348"/>
+            <p14:sldId id="349"/>
           </p14:sldIdLst>
         </p14:section>
         <p14:section name="Encryption -&gt; Loading Screen" id="{B88A0A1D-87D6-4A36-97CA-3CD63EF79547}">
@@ -433,7 +437,7 @@
           <a:p>
             <a:fld id="{3201D0F4-FCAE-4EF6-A237-A60763AE8455}" type="datetimeFigureOut">
               <a:rPr lang="en-US" smtClean="0"/>
-              <a:t>5/25/2019</a:t>
+              <a:t>5/26/2019</a:t>
             </a:fld>
             <a:endParaRPr lang="en-US"/>
           </a:p>
@@ -631,7 +635,7 @@
           <a:p>
             <a:fld id="{3201D0F4-FCAE-4EF6-A237-A60763AE8455}" type="datetimeFigureOut">
               <a:rPr lang="en-US" smtClean="0"/>
-              <a:t>5/25/2019</a:t>
+              <a:t>5/26/2019</a:t>
             </a:fld>
             <a:endParaRPr lang="en-US"/>
           </a:p>
@@ -839,7 +843,7 @@
           <a:p>
             <a:fld id="{3201D0F4-FCAE-4EF6-A237-A60763AE8455}" type="datetimeFigureOut">
               <a:rPr lang="en-US" smtClean="0"/>
-              <a:t>5/25/2019</a:t>
+              <a:t>5/26/2019</a:t>
             </a:fld>
             <a:endParaRPr lang="en-US"/>
           </a:p>
@@ -1037,7 +1041,7 @@
           <a:p>
             <a:fld id="{3201D0F4-FCAE-4EF6-A237-A60763AE8455}" type="datetimeFigureOut">
               <a:rPr lang="en-US" smtClean="0"/>
-              <a:t>5/25/2019</a:t>
+              <a:t>5/26/2019</a:t>
             </a:fld>
             <a:endParaRPr lang="en-US"/>
           </a:p>
@@ -1312,7 +1316,7 @@
           <a:p>
             <a:fld id="{3201D0F4-FCAE-4EF6-A237-A60763AE8455}" type="datetimeFigureOut">
               <a:rPr lang="en-US" smtClean="0"/>
-              <a:t>5/25/2019</a:t>
+              <a:t>5/26/2019</a:t>
             </a:fld>
             <a:endParaRPr lang="en-US"/>
           </a:p>
@@ -1577,7 +1581,7 @@
           <a:p>
             <a:fld id="{3201D0F4-FCAE-4EF6-A237-A60763AE8455}" type="datetimeFigureOut">
               <a:rPr lang="en-US" smtClean="0"/>
-              <a:t>5/25/2019</a:t>
+              <a:t>5/26/2019</a:t>
             </a:fld>
             <a:endParaRPr lang="en-US"/>
           </a:p>
@@ -1989,7 +1993,7 @@
           <a:p>
             <a:fld id="{3201D0F4-FCAE-4EF6-A237-A60763AE8455}" type="datetimeFigureOut">
               <a:rPr lang="en-US" smtClean="0"/>
-              <a:t>5/25/2019</a:t>
+              <a:t>5/26/2019</a:t>
             </a:fld>
             <a:endParaRPr lang="en-US"/>
           </a:p>
@@ -2130,7 +2134,7 @@
           <a:p>
             <a:fld id="{3201D0F4-FCAE-4EF6-A237-A60763AE8455}" type="datetimeFigureOut">
               <a:rPr lang="en-US" smtClean="0"/>
-              <a:t>5/25/2019</a:t>
+              <a:t>5/26/2019</a:t>
             </a:fld>
             <a:endParaRPr lang="en-US"/>
           </a:p>
@@ -2243,7 +2247,7 @@
           <a:p>
             <a:fld id="{3201D0F4-FCAE-4EF6-A237-A60763AE8455}" type="datetimeFigureOut">
               <a:rPr lang="en-US" smtClean="0"/>
-              <a:t>5/25/2019</a:t>
+              <a:t>5/26/2019</a:t>
             </a:fld>
             <a:endParaRPr lang="en-US"/>
           </a:p>
@@ -2554,7 +2558,7 @@
           <a:p>
             <a:fld id="{3201D0F4-FCAE-4EF6-A237-A60763AE8455}" type="datetimeFigureOut">
               <a:rPr lang="en-US" smtClean="0"/>
-              <a:t>5/25/2019</a:t>
+              <a:t>5/26/2019</a:t>
             </a:fld>
             <a:endParaRPr lang="en-US"/>
           </a:p>
@@ -2842,7 +2846,7 @@
           <a:p>
             <a:fld id="{3201D0F4-FCAE-4EF6-A237-A60763AE8455}" type="datetimeFigureOut">
               <a:rPr lang="en-US" smtClean="0"/>
-              <a:t>5/25/2019</a:t>
+              <a:t>5/26/2019</a:t>
             </a:fld>
             <a:endParaRPr lang="en-US"/>
           </a:p>
@@ -3092,7 +3096,7 @@
           <a:p>
             <a:fld id="{3201D0F4-FCAE-4EF6-A237-A60763AE8455}" type="datetimeFigureOut">
               <a:rPr lang="en-US" smtClean="0"/>
-              <a:t>5/25/2019</a:t>
+              <a:t>5/26/2019</a:t>
             </a:fld>
             <a:endParaRPr lang="en-US"/>
           </a:p>
@@ -8493,7 +8497,7 @@
                 </a:solidFill>
                 <a:latin typeface="Impact" panose="020B0806030902050204" pitchFamily="34" charset="0"/>
               </a:rPr>
-              <a:t> then 16 letters. </a:t>
+              <a:t> then 17 letters. </a:t>
             </a:r>
           </a:p>
           <a:p>
@@ -8897,7 +8901,7 @@
         <p:spPr>
           <a:xfrm>
             <a:off x="0" y="2137947"/>
-            <a:ext cx="11719560" cy="3785652"/>
+            <a:ext cx="11719560" cy="4401205"/>
           </a:xfrm>
           <a:prstGeom prst="rect">
             <a:avLst/>
@@ -8928,7 +8932,7 @@
                 </a:solidFill>
                 <a:latin typeface="Impact" panose="020B0806030902050204" pitchFamily="34" charset="0"/>
               </a:rPr>
-              <a:t>Please add a data file to the directory and try again.</a:t>
+              <a:t>Please add the data file you were given at the encryption stage to the directory and try again.</a:t>
             </a:r>
             <a:endParaRPr lang="en-US" sz="4000" spc="300" dirty="0">
               <a:solidFill>
@@ -9801,7 +9805,7 @@
         <p:spPr>
           <a:xfrm>
             <a:off x="0" y="2137947"/>
-            <a:ext cx="11719560" cy="3785652"/>
+            <a:ext cx="11719560" cy="4401205"/>
           </a:xfrm>
           <a:prstGeom prst="rect">
             <a:avLst/>
@@ -9832,7 +9836,7 @@
                 </a:solidFill>
                 <a:latin typeface="Impact" panose="020B0806030902050204" pitchFamily="34" charset="0"/>
               </a:rPr>
-              <a:t>Please add a data file to the directory and try again.</a:t>
+              <a:t>Please add the data file you were given at the encryption stage to the directory and try again.</a:t>
             </a:r>
             <a:endParaRPr lang="en-US" sz="4000" spc="300" dirty="0">
               <a:solidFill>
@@ -10238,7 +10242,7 @@
                 </a:solidFill>
                 <a:latin typeface="Impact" panose="020B0806030902050204" pitchFamily="34" charset="0"/>
               </a:rPr>
-              <a:t> then 16 letters. </a:t>
+              <a:t> then 17 letters. </a:t>
             </a:r>
           </a:p>
           <a:p>
@@ -10691,7 +10695,7 @@
                 </a:solidFill>
                 <a:latin typeface="Impact" panose="020B0806030902050204" pitchFamily="34" charset="0"/>
               </a:rPr>
-              <a:t> then 16 letters. </a:t>
+              <a:t> then 17 letters. </a:t>
             </a:r>
           </a:p>
           <a:p>
@@ -11162,7 +11166,7 @@
                 </a:solidFill>
                 <a:latin typeface="Impact" panose="020B0806030902050204" pitchFamily="34" charset="0"/>
               </a:rPr>
-              <a:t> then 16 letters. </a:t>
+              <a:t> then 17 letters. </a:t>
             </a:r>
           </a:p>
           <a:p>
@@ -11633,7 +11637,7 @@
                 </a:solidFill>
                 <a:latin typeface="Impact" panose="020B0806030902050204" pitchFamily="34" charset="0"/>
               </a:rPr>
-              <a:t> then 16 letters. </a:t>
+              <a:t> then 17 letters. </a:t>
             </a:r>
           </a:p>
           <a:p>
@@ -12193,7 +12197,7 @@
                 </a:solidFill>
                 <a:latin typeface="Impact" panose="020B0806030902050204" pitchFamily="34" charset="0"/>
               </a:rPr>
-              <a:t> then 16 letters. </a:t>
+              <a:t> then 17 letters. </a:t>
             </a:r>
           </a:p>
           <a:p>
@@ -12273,7 +12277,7 @@
                 </a:solidFill>
                 <a:latin typeface="Impact" panose="020B0806030902050204" pitchFamily="34" charset="0"/>
               </a:rPr>
-              <a:t>	VALID PASSWORD 		</a:t>
+              <a:t>		</a:t>
             </a:r>
           </a:p>
         </p:txBody>
@@ -12753,7 +12757,7 @@
                 </a:solidFill>
                 <a:latin typeface="Impact" panose="020B0806030902050204" pitchFamily="34" charset="0"/>
               </a:rPr>
-              <a:t> then 16 letters. </a:t>
+              <a:t> then 17 letters. </a:t>
             </a:r>
           </a:p>
           <a:p>
@@ -12833,7 +12837,7 @@
                 </a:solidFill>
                 <a:latin typeface="Impact" panose="020B0806030902050204" pitchFamily="34" charset="0"/>
               </a:rPr>
-              <a:t>	VALID PASSWORD 		</a:t>
+              <a:t>		</a:t>
             </a:r>
           </a:p>
         </p:txBody>
@@ -20663,7 +20667,7 @@
                 </a:solidFill>
                 <a:latin typeface="Impact" panose="020B0806030902050204" pitchFamily="34" charset="0"/>
               </a:rPr>
-              <a:t> then 16 letters. </a:t>
+              <a:t> then 17 letters. </a:t>
             </a:r>
           </a:p>
           <a:p>
@@ -21113,7 +21117,7 @@
                 </a:solidFill>
                 <a:latin typeface="Impact" panose="020B0806030902050204" pitchFamily="34" charset="0"/>
               </a:rPr>
-              <a:t> then 16 letters. </a:t>
+              <a:t> then 17 letters. </a:t>
             </a:r>
           </a:p>
           <a:p>
@@ -21566,7 +21570,7 @@
                 </a:solidFill>
                 <a:latin typeface="Impact" panose="020B0806030902050204" pitchFamily="34" charset="0"/>
               </a:rPr>
-              <a:t> then 16 letters. </a:t>
+              <a:t> then 17 letters. </a:t>
             </a:r>
           </a:p>
           <a:p>
@@ -22126,7 +22130,7 @@
                 </a:solidFill>
                 <a:latin typeface="Impact" panose="020B0806030902050204" pitchFamily="34" charset="0"/>
               </a:rPr>
-              <a:t> then 16 letters. </a:t>
+              <a:t> then 17 letters. </a:t>
             </a:r>
           </a:p>
           <a:p>
@@ -22686,7 +22690,7 @@
                 </a:solidFill>
                 <a:latin typeface="Impact" panose="020B0806030902050204" pitchFamily="34" charset="0"/>
               </a:rPr>
-              <a:t> then 16 letters. </a:t>
+              <a:t> then 17 letters. </a:t>
             </a:r>
           </a:p>
           <a:p>
@@ -23117,7 +23121,7 @@
                 </a:solidFill>
                 <a:latin typeface="Impact" panose="020B0806030902050204" pitchFamily="34" charset="0"/>
               </a:rPr>
-              <a:t>The Encryption:</a:t>
+              <a:t>The Encryption :</a:t>
             </a:r>
           </a:p>
         </p:txBody>
@@ -23197,7 +23201,7 @@
         <p:spPr>
           <a:xfrm>
             <a:off x="0" y="2137947"/>
-            <a:ext cx="11719560" cy="2554545"/>
+            <a:ext cx="11719560" cy="3785652"/>
           </a:xfrm>
           <a:prstGeom prst="rect">
             <a:avLst/>
@@ -23217,45 +23221,249 @@
                 </a:solidFill>
                 <a:latin typeface="Impact" panose="020B0806030902050204" pitchFamily="34" charset="0"/>
               </a:rPr>
-              <a:t>Your file is being encrypted.</a:t>
-            </a:r>
-          </a:p>
-          <a:p>
-            <a:r>
-              <a:rPr lang="en-US" sz="4000" spc="300" dirty="0">
-                <a:solidFill>
-                  <a:srgbClr val="2EEE53"/>
-                </a:solidFill>
-                <a:latin typeface="Impact" panose="020B0806030902050204" pitchFamily="34" charset="0"/>
-              </a:rPr>
-              <a:t>Please wait…</a:t>
-            </a:r>
-          </a:p>
-          <a:p>
-            <a:endParaRPr lang="en-US" sz="4000" spc="300" dirty="0">
+              <a:t>Great name, now please choose a password:</a:t>
+            </a:r>
+          </a:p>
+          <a:p>
+            <a:r>
+              <a:rPr lang="en-US" sz="4000" spc="300" dirty="0">
+                <a:solidFill>
+                  <a:srgbClr val="2EEE53"/>
+                </a:solidFill>
+                <a:latin typeface="Impact" panose="020B0806030902050204" pitchFamily="34" charset="0"/>
+              </a:rPr>
+              <a:t>	- Must be </a:t>
+            </a:r>
+            <a:r>
+              <a:rPr lang="en-US" sz="4000" b="1" u="sng" spc="300" dirty="0">
+                <a:solidFill>
+                  <a:srgbClr val="2EEE53"/>
+                </a:solidFill>
+                <a:latin typeface="Impact" panose="020B0806030902050204" pitchFamily="34" charset="0"/>
+              </a:rPr>
+              <a:t>SHORTER</a:t>
+            </a:r>
+            <a:r>
+              <a:rPr lang="en-US" sz="4000" spc="300" dirty="0">
+                <a:solidFill>
+                  <a:srgbClr val="2EEE53"/>
+                </a:solidFill>
+                <a:latin typeface="Impact" panose="020B0806030902050204" pitchFamily="34" charset="0"/>
+              </a:rPr>
+              <a:t> then 17 letters. </a:t>
+            </a:r>
+          </a:p>
+          <a:p>
+            <a:r>
+              <a:rPr lang="en-US" sz="4000" spc="300" dirty="0">
+                <a:solidFill>
+                  <a:srgbClr val="2EEE53"/>
+                </a:solidFill>
+                <a:latin typeface="Impact" panose="020B0806030902050204" pitchFamily="34" charset="0"/>
+              </a:rPr>
+              <a:t>	- Must include only </a:t>
+            </a:r>
+            <a:r>
+              <a:rPr lang="en-US" sz="4000" b="1" u="sng" spc="300" dirty="0">
+                <a:solidFill>
+                  <a:srgbClr val="2EEE53"/>
+                </a:solidFill>
+                <a:latin typeface="Impact" panose="020B0806030902050204" pitchFamily="34" charset="0"/>
+              </a:rPr>
+              <a:t>LETTERS</a:t>
+            </a:r>
+            <a:r>
+              <a:rPr lang="en-US" sz="4000" spc="300" dirty="0">
+                <a:solidFill>
+                  <a:srgbClr val="2EEE53"/>
+                </a:solidFill>
+                <a:latin typeface="Impact" panose="020B0806030902050204" pitchFamily="34" charset="0"/>
+              </a:rPr>
+              <a:t>, and </a:t>
+            </a:r>
+            <a:r>
+              <a:rPr lang="en-US" sz="4000" b="1" u="sng" spc="300" dirty="0">
+                <a:solidFill>
+                  <a:srgbClr val="2EEE53"/>
+                </a:solidFill>
+                <a:latin typeface="Impact" panose="020B0806030902050204" pitchFamily="34" charset="0"/>
+              </a:rPr>
+              <a:t>NUMBERS</a:t>
+            </a:r>
+            <a:r>
+              <a:rPr lang="en-US" sz="4000" spc="300" dirty="0">
+                <a:solidFill>
+                  <a:srgbClr val="2EEE53"/>
+                </a:solidFill>
+                <a:latin typeface="Impact" panose="020B0806030902050204" pitchFamily="34" charset="0"/>
+              </a:rPr>
+              <a:t>.</a:t>
+            </a:r>
+          </a:p>
+          <a:p>
+            <a:r>
+              <a:rPr lang="en-US" sz="4000" spc="300" dirty="0">
+                <a:solidFill>
+                  <a:srgbClr val="2EEE53"/>
+                </a:solidFill>
+                <a:latin typeface="Impact" panose="020B0806030902050204" pitchFamily="34" charset="0"/>
+              </a:rPr>
+              <a:t>		</a:t>
+            </a:r>
+          </a:p>
+          <a:p>
+            <a:r>
+              <a:rPr lang="en-US" sz="4000" spc="300" dirty="0">
+                <a:solidFill>
+                  <a:srgbClr val="2EEE53"/>
+                </a:solidFill>
+                <a:latin typeface="Impact" panose="020B0806030902050204" pitchFamily="34" charset="0"/>
+              </a:rPr>
+              <a:t>	Password:</a:t>
+            </a:r>
+          </a:p>
+          <a:p>
+            <a:r>
+              <a:rPr lang="en-US" sz="4000" spc="300" dirty="0">
+                <a:solidFill>
+                  <a:srgbClr val="2EEE53"/>
+                </a:solidFill>
+                <a:latin typeface="Impact" panose="020B0806030902050204" pitchFamily="34" charset="0"/>
+              </a:rPr>
+              <a:t>	</a:t>
+            </a:r>
+            <a:r>
+              <a:rPr lang="en-US" sz="4000" spc="300" dirty="0">
+                <a:solidFill>
+                  <a:srgbClr val="C00000"/>
+                </a:solidFill>
+                <a:latin typeface="Impact" panose="020B0806030902050204" pitchFamily="34" charset="0"/>
+              </a:rPr>
+              <a:t>INVALID PASSWORD </a:t>
+            </a:r>
+            <a:r>
+              <a:rPr lang="en-US" sz="4000" spc="300" dirty="0">
+                <a:solidFill>
+                  <a:srgbClr val="2EEE53"/>
+                </a:solidFill>
+                <a:latin typeface="Impact" panose="020B0806030902050204" pitchFamily="34" charset="0"/>
+              </a:rPr>
+              <a:t>		</a:t>
+            </a:r>
+          </a:p>
+        </p:txBody>
+      </p:sp>
+      <p:sp>
+        <p:nvSpPr>
+          <p:cNvPr id="12" name="Rectangle: Diagonal Corners Snipped 11">
+            <a:extLst>
+              <a:ext uri="{FF2B5EF4-FFF2-40B4-BE49-F238E27FC236}">
+                <a16:creationId xmlns:a16="http://schemas.microsoft.com/office/drawing/2014/main" id="{3E074101-ED45-47F3-9880-70918F77EFA1}"/>
+              </a:ext>
+            </a:extLst>
+          </p:cNvPr>
+          <p:cNvSpPr/>
+          <p:nvPr/>
+        </p:nvSpPr>
+        <p:spPr>
+          <a:xfrm rot="10800000">
+            <a:off x="-302508" y="5954995"/>
+            <a:ext cx="1757927" cy="579598"/>
+          </a:xfrm>
+          <a:prstGeom prst="snip2DiagRect">
+            <a:avLst>
+              <a:gd name="adj1" fmla="val 50000"/>
+              <a:gd name="adj2" fmla="val 0"/>
+            </a:avLst>
+          </a:prstGeom>
+          <a:solidFill>
+            <a:schemeClr val="tx1">
+              <a:alpha val="60000"/>
+            </a:schemeClr>
+          </a:solidFill>
+          <a:ln w="95250">
+            <a:solidFill>
+              <a:schemeClr val="bg1"/>
+            </a:solidFill>
+          </a:ln>
+          <a:effectLst/>
+        </p:spPr>
+        <p:style>
+          <a:lnRef idx="2">
+            <a:schemeClr val="accent1">
+              <a:shade val="50000"/>
+            </a:schemeClr>
+          </a:lnRef>
+          <a:fillRef idx="1">
+            <a:schemeClr val="accent1"/>
+          </a:fillRef>
+          <a:effectRef idx="0">
+            <a:schemeClr val="accent1"/>
+          </a:effectRef>
+          <a:fontRef idx="minor">
+            <a:schemeClr val="lt1"/>
+          </a:fontRef>
+        </p:style>
+        <p:txBody>
+          <a:bodyPr rtlCol="0" anchor="ctr"/>
+          <a:lstStyle/>
+          <a:p>
+            <a:pPr algn="ctr"/>
+            <a:endParaRPr lang="en-US" dirty="0"/>
+          </a:p>
+        </p:txBody>
+      </p:sp>
+      <p:sp>
+        <p:nvSpPr>
+          <p:cNvPr id="13" name="TextBox 12">
+            <a:extLst>
+              <a:ext uri="{FF2B5EF4-FFF2-40B4-BE49-F238E27FC236}">
+                <a16:creationId xmlns:a16="http://schemas.microsoft.com/office/drawing/2014/main" id="{F6C5A567-CA49-4B3F-80DD-23A87F15C3B9}"/>
+              </a:ext>
+            </a:extLst>
+          </p:cNvPr>
+          <p:cNvSpPr txBox="1"/>
+          <p:nvPr/>
+        </p:nvSpPr>
+        <p:spPr>
+          <a:xfrm>
+            <a:off x="-223443" y="5954997"/>
+            <a:ext cx="1588814" cy="584775"/>
+          </a:xfrm>
+          <a:prstGeom prst="rect">
+            <a:avLst/>
+          </a:prstGeom>
+          <a:noFill/>
+        </p:spPr>
+        <p:txBody>
+          <a:bodyPr wrap="square" rtlCol="0">
+            <a:spAutoFit/>
+          </a:bodyPr>
+          <a:lstStyle/>
+          <a:p>
+            <a:pPr algn="ctr"/>
+            <a:r>
+              <a:rPr lang="en-US" sz="3200" spc="300" dirty="0">
+                <a:solidFill>
+                  <a:srgbClr val="C00000"/>
+                </a:solidFill>
+                <a:latin typeface="Impact" panose="020B0806030902050204" pitchFamily="34" charset="0"/>
+              </a:rPr>
+              <a:t>Back</a:t>
+            </a:r>
+            <a:endParaRPr lang="en-US" sz="8000" spc="300" dirty="0">
               <a:solidFill>
-                <a:srgbClr val="2EEE53"/>
+                <a:srgbClr val="C00000"/>
               </a:solidFill>
               <a:latin typeface="Impact" panose="020B0806030902050204" pitchFamily="34" charset="0"/>
             </a:endParaRPr>
           </a:p>
-          <a:p>
-            <a:r>
-              <a:rPr lang="en-US" sz="4000" spc="300" dirty="0">
-                <a:solidFill>
-                  <a:srgbClr val="2EEE53"/>
-                </a:solidFill>
-                <a:latin typeface="Impact" panose="020B0806030902050204" pitchFamily="34" charset="0"/>
-              </a:rPr>
-              <a:t>Progress - </a:t>
-            </a:r>
-          </a:p>
         </p:txBody>
       </p:sp>
     </p:spTree>
     <p:extLst>
       <p:ext uri="{BB962C8B-B14F-4D97-AF65-F5344CB8AC3E}">
-        <p14:creationId xmlns:p14="http://schemas.microsoft.com/office/powerpoint/2010/main" val="1939987590"/>
+        <p14:creationId xmlns:p14="http://schemas.microsoft.com/office/powerpoint/2010/main" val="3689767344"/>
       </p:ext>
     </p:extLst>
   </p:cSld>
@@ -23384,7 +23592,7 @@
                 </a:solidFill>
                 <a:latin typeface="Impact" panose="020B0806030902050204" pitchFamily="34" charset="0"/>
               </a:rPr>
-              <a:t>The Encryption:</a:t>
+              <a:t>The Encryption :</a:t>
             </a:r>
           </a:p>
         </p:txBody>
@@ -23464,7 +23672,7 @@
         <p:spPr>
           <a:xfrm>
             <a:off x="0" y="2137947"/>
-            <a:ext cx="11719560" cy="2554545"/>
+            <a:ext cx="11719560" cy="3785652"/>
           </a:xfrm>
           <a:prstGeom prst="rect">
             <a:avLst/>
@@ -23484,47 +23692,144 @@
                 </a:solidFill>
                 <a:latin typeface="Impact" panose="020B0806030902050204" pitchFamily="34" charset="0"/>
               </a:rPr>
-              <a:t>Your file is being encrypted.</a:t>
-            </a:r>
-          </a:p>
-          <a:p>
-            <a:r>
-              <a:rPr lang="en-US" sz="4000" spc="300" dirty="0">
-                <a:solidFill>
-                  <a:srgbClr val="2EEE53"/>
-                </a:solidFill>
-                <a:latin typeface="Impact" panose="020B0806030902050204" pitchFamily="34" charset="0"/>
-              </a:rPr>
-              <a:t>Please wait…</a:t>
-            </a:r>
-          </a:p>
-          <a:p>
-            <a:endParaRPr lang="en-US" sz="4000" spc="300" dirty="0">
-              <a:solidFill>
-                <a:srgbClr val="2EEE53"/>
-              </a:solidFill>
-              <a:latin typeface="Impact" panose="020B0806030902050204" pitchFamily="34" charset="0"/>
-            </a:endParaRPr>
-          </a:p>
-          <a:p>
-            <a:r>
-              <a:rPr lang="en-US" sz="4000" spc="300" dirty="0">
-                <a:solidFill>
-                  <a:srgbClr val="2EEE53"/>
-                </a:solidFill>
-                <a:latin typeface="Impact" panose="020B0806030902050204" pitchFamily="34" charset="0"/>
-              </a:rPr>
-              <a:t>Progress - </a:t>
-            </a:r>
-          </a:p>
-        </p:txBody>
-      </p:sp>
-      <p:sp>
-        <p:nvSpPr>
-          <p:cNvPr id="6" name="Rectangle: Diagonal Corners Snipped 5">
-            <a:extLst>
-              <a:ext uri="{FF2B5EF4-FFF2-40B4-BE49-F238E27FC236}">
-                <a16:creationId xmlns:a16="http://schemas.microsoft.com/office/drawing/2014/main" id="{062DCE8A-0AE9-4F4F-87BE-20C20853C780}"/>
+              <a:t>Great name, now please choose a password:</a:t>
+            </a:r>
+          </a:p>
+          <a:p>
+            <a:r>
+              <a:rPr lang="en-US" sz="4000" spc="300" dirty="0">
+                <a:solidFill>
+                  <a:srgbClr val="2EEE53"/>
+                </a:solidFill>
+                <a:latin typeface="Impact" panose="020B0806030902050204" pitchFamily="34" charset="0"/>
+              </a:rPr>
+              <a:t>	- Must be </a:t>
+            </a:r>
+            <a:r>
+              <a:rPr lang="en-US" sz="4000" b="1" u="sng" spc="300" dirty="0">
+                <a:solidFill>
+                  <a:srgbClr val="2EEE53"/>
+                </a:solidFill>
+                <a:latin typeface="Impact" panose="020B0806030902050204" pitchFamily="34" charset="0"/>
+              </a:rPr>
+              <a:t>SHORTER</a:t>
+            </a:r>
+            <a:r>
+              <a:rPr lang="en-US" sz="4000" spc="300" dirty="0">
+                <a:solidFill>
+                  <a:srgbClr val="2EEE53"/>
+                </a:solidFill>
+                <a:latin typeface="Impact" panose="020B0806030902050204" pitchFamily="34" charset="0"/>
+              </a:rPr>
+              <a:t> then 17 letters. </a:t>
+            </a:r>
+          </a:p>
+          <a:p>
+            <a:r>
+              <a:rPr lang="en-US" sz="4000" spc="300" dirty="0">
+                <a:solidFill>
+                  <a:srgbClr val="2EEE53"/>
+                </a:solidFill>
+                <a:latin typeface="Impact" panose="020B0806030902050204" pitchFamily="34" charset="0"/>
+              </a:rPr>
+              <a:t>	- Must include only </a:t>
+            </a:r>
+            <a:r>
+              <a:rPr lang="en-US" sz="4000" b="1" u="sng" spc="300" dirty="0">
+                <a:solidFill>
+                  <a:srgbClr val="2EEE53"/>
+                </a:solidFill>
+                <a:latin typeface="Impact" panose="020B0806030902050204" pitchFamily="34" charset="0"/>
+              </a:rPr>
+              <a:t>LETTERS</a:t>
+            </a:r>
+            <a:r>
+              <a:rPr lang="en-US" sz="4000" spc="300" dirty="0">
+                <a:solidFill>
+                  <a:srgbClr val="2EEE53"/>
+                </a:solidFill>
+                <a:latin typeface="Impact" panose="020B0806030902050204" pitchFamily="34" charset="0"/>
+              </a:rPr>
+              <a:t>, and </a:t>
+            </a:r>
+            <a:r>
+              <a:rPr lang="en-US" sz="4000" b="1" u="sng" spc="300" dirty="0">
+                <a:solidFill>
+                  <a:srgbClr val="2EEE53"/>
+                </a:solidFill>
+                <a:latin typeface="Impact" panose="020B0806030902050204" pitchFamily="34" charset="0"/>
+              </a:rPr>
+              <a:t>NUMBERS</a:t>
+            </a:r>
+            <a:r>
+              <a:rPr lang="en-US" sz="4000" spc="300" dirty="0">
+                <a:solidFill>
+                  <a:srgbClr val="2EEE53"/>
+                </a:solidFill>
+                <a:latin typeface="Impact" panose="020B0806030902050204" pitchFamily="34" charset="0"/>
+              </a:rPr>
+              <a:t>.</a:t>
+            </a:r>
+          </a:p>
+          <a:p>
+            <a:r>
+              <a:rPr lang="en-US" sz="4000" spc="300" dirty="0">
+                <a:solidFill>
+                  <a:srgbClr val="2EEE53"/>
+                </a:solidFill>
+                <a:latin typeface="Impact" panose="020B0806030902050204" pitchFamily="34" charset="0"/>
+              </a:rPr>
+              <a:t>		</a:t>
+            </a:r>
+          </a:p>
+          <a:p>
+            <a:r>
+              <a:rPr lang="en-US" sz="4000" spc="300" dirty="0">
+                <a:solidFill>
+                  <a:srgbClr val="2EEE53"/>
+                </a:solidFill>
+                <a:latin typeface="Impact" panose="020B0806030902050204" pitchFamily="34" charset="0"/>
+              </a:rPr>
+              <a:t>	Password:</a:t>
+            </a:r>
+          </a:p>
+          <a:p>
+            <a:r>
+              <a:rPr lang="en-US" sz="4000" spc="300" dirty="0">
+                <a:solidFill>
+                  <a:srgbClr val="2EEE53"/>
+                </a:solidFill>
+                <a:latin typeface="Impact" panose="020B0806030902050204" pitchFamily="34" charset="0"/>
+              </a:rPr>
+              <a:t>	</a:t>
+            </a:r>
+            <a:r>
+              <a:rPr lang="en-US" sz="4000" spc="300" dirty="0">
+                <a:solidFill>
+                  <a:srgbClr val="C00000"/>
+                </a:solidFill>
+                <a:latin typeface="Impact" panose="020B0806030902050204" pitchFamily="34" charset="0"/>
+              </a:rPr>
+              <a:t>INVALID PASSWORD </a:t>
+            </a:r>
+            <a:r>
+              <a:rPr lang="en-US" sz="4000" spc="300" dirty="0">
+                <a:solidFill>
+                  <a:srgbClr val="2EEE53"/>
+                </a:solidFill>
+                <a:latin typeface="Impact" panose="020B0806030902050204" pitchFamily="34" charset="0"/>
+              </a:rPr>
+              <a:t>		</a:t>
+            </a:r>
+          </a:p>
+        </p:txBody>
+      </p:sp>
+      <p:sp>
+        <p:nvSpPr>
+          <p:cNvPr id="12" name="Rectangle: Diagonal Corners Snipped 11">
+            <a:extLst>
+              <a:ext uri="{FF2B5EF4-FFF2-40B4-BE49-F238E27FC236}">
+                <a16:creationId xmlns:a16="http://schemas.microsoft.com/office/drawing/2014/main" id="{3E074101-ED45-47F3-9880-70918F77EFA1}"/>
               </a:ext>
             </a:extLst>
           </p:cNvPr>
@@ -23533,7 +23838,7 @@
         </p:nvSpPr>
         <p:spPr>
           <a:xfrm rot="10800000">
-            <a:off x="10738872" y="5947621"/>
+            <a:off x="-302508" y="5954995"/>
             <a:ext cx="1757927" cy="579598"/>
           </a:xfrm>
           <a:prstGeom prst="snip2DiagRect">
@@ -23549,7 +23854,7 @@
           </a:solidFill>
           <a:ln w="95250">
             <a:solidFill>
-              <a:schemeClr val="bg1"/>
+              <a:srgbClr val="C00000"/>
             </a:solidFill>
           </a:ln>
           <a:effectLst/>
@@ -23581,10 +23886,10 @@
       </p:sp>
       <p:sp>
         <p:nvSpPr>
-          <p:cNvPr id="7" name="TextBox 6">
-            <a:extLst>
-              <a:ext uri="{FF2B5EF4-FFF2-40B4-BE49-F238E27FC236}">
-                <a16:creationId xmlns:a16="http://schemas.microsoft.com/office/drawing/2014/main" id="{DF436022-48DC-428B-8B7B-465B2C7CFC25}"/>
+          <p:cNvPr id="13" name="TextBox 12">
+            <a:extLst>
+              <a:ext uri="{FF2B5EF4-FFF2-40B4-BE49-F238E27FC236}">
+                <a16:creationId xmlns:a16="http://schemas.microsoft.com/office/drawing/2014/main" id="{F6C5A567-CA49-4B3F-80DD-23A87F15C3B9}"/>
               </a:ext>
             </a:extLst>
           </p:cNvPr>
@@ -23593,16 +23898,13 @@
         </p:nvSpPr>
         <p:spPr>
           <a:xfrm>
-            <a:off x="10817937" y="5947623"/>
+            <a:off x="-223443" y="5954997"/>
             <a:ext cx="1588814" cy="584775"/>
           </a:xfrm>
           <a:prstGeom prst="rect">
             <a:avLst/>
           </a:prstGeom>
           <a:noFill/>
-          <a:ln>
-            <a:noFill/>
-          </a:ln>
         </p:spPr>
         <p:txBody>
           <a:bodyPr wrap="square" rtlCol="0">
@@ -23614,15 +23916,15 @@
             <a:r>
               <a:rPr lang="en-US" sz="3200" spc="300" dirty="0">
                 <a:solidFill>
-                  <a:srgbClr val="2EEE53"/>
-                </a:solidFill>
-                <a:latin typeface="Impact" panose="020B0806030902050204" pitchFamily="34" charset="0"/>
-              </a:rPr>
-              <a:t>Next</a:t>
+                  <a:srgbClr val="C00000"/>
+                </a:solidFill>
+                <a:latin typeface="Impact" panose="020B0806030902050204" pitchFamily="34" charset="0"/>
+              </a:rPr>
+              <a:t>Back</a:t>
             </a:r>
             <a:endParaRPr lang="en-US" sz="8000" spc="300" dirty="0">
               <a:solidFill>
-                <a:srgbClr val="2EEE53"/>
+                <a:srgbClr val="C00000"/>
               </a:solidFill>
               <a:latin typeface="Impact" panose="020B0806030902050204" pitchFamily="34" charset="0"/>
             </a:endParaRPr>
@@ -23632,7 +23934,7 @@
     </p:spTree>
     <p:extLst>
       <p:ext uri="{BB962C8B-B14F-4D97-AF65-F5344CB8AC3E}">
-        <p14:creationId xmlns:p14="http://schemas.microsoft.com/office/powerpoint/2010/main" val="1175555624"/>
+        <p14:creationId xmlns:p14="http://schemas.microsoft.com/office/powerpoint/2010/main" val="4035285637"/>
       </p:ext>
     </p:extLst>
   </p:cSld>
@@ -23896,117 +24198,10 @@
           </a:p>
         </p:txBody>
       </p:sp>
-      <p:sp>
-        <p:nvSpPr>
-          <p:cNvPr id="10" name="Rectangle: Diagonal Corners Snipped 9">
-            <a:extLst>
-              <a:ext uri="{FF2B5EF4-FFF2-40B4-BE49-F238E27FC236}">
-                <a16:creationId xmlns:a16="http://schemas.microsoft.com/office/drawing/2014/main" id="{53B7CC88-4C5D-4A0E-9BCF-617CFBD05F41}"/>
-              </a:ext>
-            </a:extLst>
-          </p:cNvPr>
-          <p:cNvSpPr/>
-          <p:nvPr/>
-        </p:nvSpPr>
-        <p:spPr>
-          <a:xfrm rot="10800000">
-            <a:off x="10738872" y="5947621"/>
-            <a:ext cx="1757927" cy="579598"/>
-          </a:xfrm>
-          <a:prstGeom prst="snip2DiagRect">
-            <a:avLst>
-              <a:gd name="adj1" fmla="val 50000"/>
-              <a:gd name="adj2" fmla="val 0"/>
-            </a:avLst>
-          </a:prstGeom>
-          <a:solidFill>
-            <a:schemeClr val="tx1">
-              <a:alpha val="60000"/>
-            </a:schemeClr>
-          </a:solidFill>
-          <a:ln w="95250">
-            <a:solidFill>
-              <a:srgbClr val="2EEE53"/>
-            </a:solidFill>
-          </a:ln>
-          <a:effectLst/>
-        </p:spPr>
-        <p:style>
-          <a:lnRef idx="2">
-            <a:schemeClr val="accent1">
-              <a:shade val="50000"/>
-            </a:schemeClr>
-          </a:lnRef>
-          <a:fillRef idx="1">
-            <a:schemeClr val="accent1"/>
-          </a:fillRef>
-          <a:effectRef idx="0">
-            <a:schemeClr val="accent1"/>
-          </a:effectRef>
-          <a:fontRef idx="minor">
-            <a:schemeClr val="lt1"/>
-          </a:fontRef>
-        </p:style>
-        <p:txBody>
-          <a:bodyPr rtlCol="0" anchor="ctr"/>
-          <a:lstStyle/>
-          <a:p>
-            <a:pPr algn="ctr"/>
-            <a:endParaRPr lang="en-US" dirty="0"/>
-          </a:p>
-        </p:txBody>
-      </p:sp>
-      <p:sp>
-        <p:nvSpPr>
-          <p:cNvPr id="11" name="TextBox 10">
-            <a:extLst>
-              <a:ext uri="{FF2B5EF4-FFF2-40B4-BE49-F238E27FC236}">
-                <a16:creationId xmlns:a16="http://schemas.microsoft.com/office/drawing/2014/main" id="{60035FEB-C8BD-4EDD-9B1E-9A87F81EBBCE}"/>
-              </a:ext>
-            </a:extLst>
-          </p:cNvPr>
-          <p:cNvSpPr txBox="1"/>
-          <p:nvPr/>
-        </p:nvSpPr>
-        <p:spPr>
-          <a:xfrm>
-            <a:off x="10817937" y="5947623"/>
-            <a:ext cx="1588814" cy="584775"/>
-          </a:xfrm>
-          <a:prstGeom prst="rect">
-            <a:avLst/>
-          </a:prstGeom>
-          <a:noFill/>
-        </p:spPr>
-        <p:txBody>
-          <a:bodyPr wrap="square" rtlCol="0">
-            <a:spAutoFit/>
-          </a:bodyPr>
-          <a:lstStyle/>
-          <a:p>
-            <a:pPr algn="ctr"/>
-            <a:r>
-              <a:rPr lang="en-US" sz="3200" spc="300" dirty="0">
-                <a:solidFill>
-                  <a:srgbClr val="2EEE53"/>
-                </a:solidFill>
-                <a:latin typeface="Impact" panose="020B0806030902050204" pitchFamily="34" charset="0"/>
-              </a:rPr>
-              <a:t>Next</a:t>
-            </a:r>
-            <a:endParaRPr lang="en-US" sz="8000" spc="300" dirty="0">
-              <a:solidFill>
-                <a:srgbClr val="2EEE53"/>
-              </a:solidFill>
-              <a:latin typeface="Impact" panose="020B0806030902050204" pitchFamily="34" charset="0"/>
-            </a:endParaRPr>
-          </a:p>
-        </p:txBody>
-      </p:sp>
     </p:spTree>
     <p:extLst>
       <p:ext uri="{BB962C8B-B14F-4D97-AF65-F5344CB8AC3E}">
-        <p14:creationId xmlns:p14="http://schemas.microsoft.com/office/powerpoint/2010/main" val="1066838294"/>
+        <p14:creationId xmlns:p14="http://schemas.microsoft.com/office/powerpoint/2010/main" val="1939987590"/>
       </p:ext>
     </p:extLst>
   </p:cSld>
@@ -24215,7 +24410,7 @@
         <p:spPr>
           <a:xfrm>
             <a:off x="0" y="2137947"/>
-            <a:ext cx="11719560" cy="3785652"/>
+            <a:ext cx="11719560" cy="2554545"/>
           </a:xfrm>
           <a:prstGeom prst="rect">
             <a:avLst/>
@@ -24235,144 +24430,47 @@
                 </a:solidFill>
                 <a:latin typeface="Impact" panose="020B0806030902050204" pitchFamily="34" charset="0"/>
               </a:rPr>
-              <a:t>Now you are finally ready for it,</a:t>
-            </a:r>
-          </a:p>
-          <a:p>
-            <a:r>
-              <a:rPr lang="en-US" sz="4000" spc="300" dirty="0">
-                <a:solidFill>
-                  <a:srgbClr val="2EEE53"/>
-                </a:solidFill>
-                <a:latin typeface="Impact" panose="020B0806030902050204" pitchFamily="34" charset="0"/>
-              </a:rPr>
-              <a:t>Your brand new decrypted </a:t>
-            </a:r>
-            <a:r>
-              <a:rPr lang="en-US" sz="4000" b="1" u="sng" spc="300" dirty="0">
-                <a:solidFill>
-                  <a:srgbClr val="2EEE53"/>
-                </a:solidFill>
-                <a:latin typeface="Impact" panose="020B0806030902050204" pitchFamily="34" charset="0"/>
-              </a:rPr>
-              <a:t>FILE</a:t>
-            </a:r>
-            <a:r>
-              <a:rPr lang="en-US" sz="4000" spc="300" dirty="0">
-                <a:solidFill>
-                  <a:srgbClr val="2EEE53"/>
-                </a:solidFill>
-                <a:latin typeface="Impact" panose="020B0806030902050204" pitchFamily="34" charset="0"/>
-              </a:rPr>
-              <a:t> is in the </a:t>
-            </a:r>
-            <a:r>
-              <a:rPr lang="en-US" sz="4000" b="1" u="sng" spc="300" dirty="0">
-                <a:solidFill>
-                  <a:srgbClr val="2EEE53"/>
-                </a:solidFill>
-                <a:latin typeface="Impact" panose="020B0806030902050204" pitchFamily="34" charset="0"/>
-              </a:rPr>
-              <a:t>ENCRYPTE</a:t>
-            </a:r>
-            <a:r>
-              <a:rPr lang="en-US" sz="4000" spc="300" dirty="0">
-                <a:solidFill>
-                  <a:srgbClr val="2EEE53"/>
-                </a:solidFill>
-                <a:latin typeface="Impact" panose="020B0806030902050204" pitchFamily="34" charset="0"/>
-              </a:rPr>
-              <a:t> </a:t>
-            </a:r>
-            <a:r>
-              <a:rPr lang="en-US" sz="4000" b="1" u="sng" spc="300" dirty="0">
-                <a:solidFill>
-                  <a:srgbClr val="2EEE53"/>
-                </a:solidFill>
-                <a:latin typeface="Impact" panose="020B0806030902050204" pitchFamily="34" charset="0"/>
-              </a:rPr>
-              <a:t>DIRECTORY</a:t>
-            </a:r>
-            <a:r>
-              <a:rPr lang="he-IL" sz="4000" spc="300" dirty="0">
-                <a:solidFill>
-                  <a:srgbClr val="2EEE53"/>
-                </a:solidFill>
-                <a:latin typeface="Impact" panose="020B0806030902050204" pitchFamily="34" charset="0"/>
-              </a:rPr>
-              <a:t> </a:t>
-            </a:r>
-            <a:r>
-              <a:rPr lang="en-US" sz="4000" spc="300" dirty="0">
-                <a:solidFill>
-                  <a:srgbClr val="2EEE53"/>
-                </a:solidFill>
-                <a:latin typeface="Impact" panose="020B0806030902050204" pitchFamily="34" charset="0"/>
-              </a:rPr>
-              <a:t>and is called </a:t>
-            </a:r>
-            <a:r>
-              <a:rPr lang="en-US" sz="4000" b="1" i="1" u="sng" spc="300" dirty="0">
-                <a:solidFill>
-                  <a:srgbClr val="2EEE53"/>
-                </a:solidFill>
-                <a:latin typeface="Impact" panose="020B0806030902050204" pitchFamily="34" charset="0"/>
-              </a:rPr>
-              <a:t>ENCRYPTE</a:t>
-            </a:r>
-            <a:r>
-              <a:rPr lang="en-US" sz="4000" spc="300" dirty="0">
-                <a:solidFill>
-                  <a:srgbClr val="2EEE53"/>
-                </a:solidFill>
-                <a:latin typeface="Impact" panose="020B0806030902050204" pitchFamily="34" charset="0"/>
-              </a:rPr>
-              <a:t>, go Download it!</a:t>
-            </a:r>
-          </a:p>
-          <a:p>
-            <a:r>
-              <a:rPr lang="en-US" sz="4000" spc="300" dirty="0">
-                <a:solidFill>
-                  <a:srgbClr val="2EEE53"/>
-                </a:solidFill>
-                <a:latin typeface="Impact" panose="020B0806030902050204" pitchFamily="34" charset="0"/>
-              </a:rPr>
-              <a:t>And don’t forget, you’ll need the </a:t>
-            </a:r>
-            <a:r>
-              <a:rPr lang="en-US" sz="4000" i="1" u="sng" spc="300" dirty="0">
-                <a:solidFill>
-                  <a:srgbClr val="2EEE53"/>
-                </a:solidFill>
-                <a:latin typeface="Impact" panose="020B0806030902050204" pitchFamily="34" charset="0"/>
-              </a:rPr>
-              <a:t>DATAFILE</a:t>
-            </a:r>
-            <a:r>
-              <a:rPr lang="en-US" sz="4000" spc="300" dirty="0">
-                <a:solidFill>
-                  <a:srgbClr val="2EEE53"/>
-                </a:solidFill>
-                <a:latin typeface="Impact" panose="020B0806030902050204" pitchFamily="34" charset="0"/>
-              </a:rPr>
-              <a:t>  to decrypt your file later.</a:t>
-            </a:r>
-            <a:endParaRPr lang="en-US" sz="4000" b="1" u="sng" spc="300" dirty="0">
+              <a:t>Your file is being encrypted.</a:t>
+            </a:r>
+          </a:p>
+          <a:p>
+            <a:r>
+              <a:rPr lang="en-US" sz="4000" spc="300" dirty="0">
+                <a:solidFill>
+                  <a:srgbClr val="2EEE53"/>
+                </a:solidFill>
+                <a:latin typeface="Impact" panose="020B0806030902050204" pitchFamily="34" charset="0"/>
+              </a:rPr>
+              <a:t>Please wait…</a:t>
+            </a:r>
+          </a:p>
+          <a:p>
+            <a:endParaRPr lang="en-US" sz="4000" spc="300" dirty="0">
               <a:solidFill>
                 <a:srgbClr val="2EEE53"/>
               </a:solidFill>
               <a:latin typeface="Impact" panose="020B0806030902050204" pitchFamily="34" charset="0"/>
             </a:endParaRPr>
           </a:p>
-        </p:txBody>
-      </p:sp>
-      <p:sp>
-        <p:nvSpPr>
-          <p:cNvPr id="21" name="Rectangle: Diagonal Corners Snipped 20">
-            <a:extLst>
-              <a:ext uri="{FF2B5EF4-FFF2-40B4-BE49-F238E27FC236}">
-                <a16:creationId xmlns:a16="http://schemas.microsoft.com/office/drawing/2014/main" id="{55269FB2-D5C2-4595-A855-AF70120B482D}"/>
+          <a:p>
+            <a:r>
+              <a:rPr lang="en-US" sz="4000" spc="300" dirty="0">
+                <a:solidFill>
+                  <a:srgbClr val="2EEE53"/>
+                </a:solidFill>
+                <a:latin typeface="Impact" panose="020B0806030902050204" pitchFamily="34" charset="0"/>
+              </a:rPr>
+              <a:t>Progress - </a:t>
+            </a:r>
+          </a:p>
+        </p:txBody>
+      </p:sp>
+      <p:sp>
+        <p:nvSpPr>
+          <p:cNvPr id="6" name="Rectangle: Diagonal Corners Snipped 5">
+            <a:extLst>
+              <a:ext uri="{FF2B5EF4-FFF2-40B4-BE49-F238E27FC236}">
+                <a16:creationId xmlns:a16="http://schemas.microsoft.com/office/drawing/2014/main" id="{062DCE8A-0AE9-4F4F-87BE-20C20853C780}"/>
               </a:ext>
             </a:extLst>
           </p:cNvPr>
@@ -24381,7 +24479,7 @@
         </p:nvSpPr>
         <p:spPr>
           <a:xfrm rot="10800000">
-            <a:off x="-302508" y="5954995"/>
+            <a:off x="10738872" y="5947621"/>
             <a:ext cx="1757927" cy="579598"/>
           </a:xfrm>
           <a:prstGeom prst="snip2DiagRect">
@@ -24429,10 +24527,10 @@
       </p:sp>
       <p:sp>
         <p:nvSpPr>
-          <p:cNvPr id="22" name="TextBox 21">
-            <a:extLst>
-              <a:ext uri="{FF2B5EF4-FFF2-40B4-BE49-F238E27FC236}">
-                <a16:creationId xmlns:a16="http://schemas.microsoft.com/office/drawing/2014/main" id="{3BF0ADAB-2E25-4DFE-A509-7CDF1A777D2D}"/>
+          <p:cNvPr id="7" name="TextBox 6">
+            <a:extLst>
+              <a:ext uri="{FF2B5EF4-FFF2-40B4-BE49-F238E27FC236}">
+                <a16:creationId xmlns:a16="http://schemas.microsoft.com/office/drawing/2014/main" id="{DF436022-48DC-428B-8B7B-465B2C7CFC25}"/>
               </a:ext>
             </a:extLst>
           </p:cNvPr>
@@ -24441,13 +24539,16 @@
         </p:nvSpPr>
         <p:spPr>
           <a:xfrm>
-            <a:off x="-223443" y="5954997"/>
+            <a:off x="10817937" y="5947623"/>
             <a:ext cx="1588814" cy="584775"/>
           </a:xfrm>
           <a:prstGeom prst="rect">
             <a:avLst/>
           </a:prstGeom>
           <a:noFill/>
+          <a:ln>
+            <a:noFill/>
+          </a:ln>
         </p:spPr>
         <p:txBody>
           <a:bodyPr wrap="square" rtlCol="0">
@@ -24459,118 +24560,11 @@
             <a:r>
               <a:rPr lang="en-US" sz="3200" spc="300" dirty="0">
                 <a:solidFill>
-                  <a:srgbClr val="C00000"/>
-                </a:solidFill>
-                <a:latin typeface="Impact" panose="020B0806030902050204" pitchFamily="34" charset="0"/>
-              </a:rPr>
-              <a:t>Exit</a:t>
-            </a:r>
-            <a:endParaRPr lang="en-US" sz="8000" spc="300" dirty="0">
-              <a:solidFill>
-                <a:srgbClr val="C00000"/>
-              </a:solidFill>
-              <a:latin typeface="Impact" panose="020B0806030902050204" pitchFamily="34" charset="0"/>
-            </a:endParaRPr>
-          </a:p>
-        </p:txBody>
-      </p:sp>
-      <p:sp>
-        <p:nvSpPr>
-          <p:cNvPr id="10" name="Rectangle: Diagonal Corners Snipped 9">
-            <a:extLst>
-              <a:ext uri="{FF2B5EF4-FFF2-40B4-BE49-F238E27FC236}">
-                <a16:creationId xmlns:a16="http://schemas.microsoft.com/office/drawing/2014/main" id="{53B7CC88-4C5D-4A0E-9BCF-617CFBD05F41}"/>
-              </a:ext>
-            </a:extLst>
-          </p:cNvPr>
-          <p:cNvSpPr/>
-          <p:nvPr/>
-        </p:nvSpPr>
-        <p:spPr>
-          <a:xfrm rot="10800000">
-            <a:off x="10066020" y="5953927"/>
-            <a:ext cx="2430778" cy="579598"/>
-          </a:xfrm>
-          <a:prstGeom prst="snip2DiagRect">
-            <a:avLst>
-              <a:gd name="adj1" fmla="val 50000"/>
-              <a:gd name="adj2" fmla="val 0"/>
-            </a:avLst>
-          </a:prstGeom>
-          <a:solidFill>
-            <a:schemeClr val="tx1">
-              <a:alpha val="60000"/>
-            </a:schemeClr>
-          </a:solidFill>
-          <a:ln w="95250">
-            <a:solidFill>
-              <a:schemeClr val="bg1"/>
-            </a:solidFill>
-          </a:ln>
-          <a:effectLst/>
-        </p:spPr>
-        <p:style>
-          <a:lnRef idx="2">
-            <a:schemeClr val="accent1">
-              <a:shade val="50000"/>
-            </a:schemeClr>
-          </a:lnRef>
-          <a:fillRef idx="1">
-            <a:schemeClr val="accent1"/>
-          </a:fillRef>
-          <a:effectRef idx="0">
-            <a:schemeClr val="accent1"/>
-          </a:effectRef>
-          <a:fontRef idx="minor">
-            <a:schemeClr val="lt1"/>
-          </a:fontRef>
-        </p:style>
-        <p:txBody>
-          <a:bodyPr rtlCol="0" anchor="ctr"/>
-          <a:lstStyle/>
-          <a:p>
-            <a:pPr algn="ctr"/>
-            <a:endParaRPr lang="en-US" dirty="0"/>
-          </a:p>
-        </p:txBody>
-      </p:sp>
-      <p:sp>
-        <p:nvSpPr>
-          <p:cNvPr id="11" name="TextBox 10">
-            <a:extLst>
-              <a:ext uri="{FF2B5EF4-FFF2-40B4-BE49-F238E27FC236}">
-                <a16:creationId xmlns:a16="http://schemas.microsoft.com/office/drawing/2014/main" id="{60035FEB-C8BD-4EDD-9B1E-9A87F81EBBCE}"/>
-              </a:ext>
-            </a:extLst>
-          </p:cNvPr>
-          <p:cNvSpPr txBox="1"/>
-          <p:nvPr/>
-        </p:nvSpPr>
-        <p:spPr>
-          <a:xfrm>
-            <a:off x="10066020" y="5953929"/>
-            <a:ext cx="2340731" cy="584775"/>
-          </a:xfrm>
-          <a:prstGeom prst="rect">
-            <a:avLst/>
-          </a:prstGeom>
-          <a:noFill/>
-        </p:spPr>
-        <p:txBody>
-          <a:bodyPr wrap="square" rtlCol="0">
-            <a:spAutoFit/>
-          </a:bodyPr>
-          <a:lstStyle/>
-          <a:p>
-            <a:pPr algn="ctr"/>
-            <a:r>
-              <a:rPr lang="en-US" sz="3200" spc="300" dirty="0">
-                <a:solidFill>
-                  <a:srgbClr val="2EEE53"/>
-                </a:solidFill>
-                <a:latin typeface="Impact" panose="020B0806030902050204" pitchFamily="34" charset="0"/>
-              </a:rPr>
-              <a:t>Restart</a:t>
+                  <a:srgbClr val="2EEE53"/>
+                </a:solidFill>
+                <a:latin typeface="Impact" panose="020B0806030902050204" pitchFamily="34" charset="0"/>
+              </a:rPr>
+              <a:t>Next</a:t>
             </a:r>
             <a:endParaRPr lang="en-US" sz="8000" spc="300" dirty="0">
               <a:solidFill>
@@ -24584,7 +24578,7 @@
     </p:spTree>
     <p:extLst>
       <p:ext uri="{BB962C8B-B14F-4D97-AF65-F5344CB8AC3E}">
-        <p14:creationId xmlns:p14="http://schemas.microsoft.com/office/powerpoint/2010/main" val="3614375859"/>
+        <p14:creationId xmlns:p14="http://schemas.microsoft.com/office/powerpoint/2010/main" val="1175555624"/>
       </p:ext>
     </p:extLst>
   </p:cSld>
@@ -24793,7 +24787,7 @@
         <p:spPr>
           <a:xfrm>
             <a:off x="0" y="2137947"/>
-            <a:ext cx="11719560" cy="3785652"/>
+            <a:ext cx="11719560" cy="2554545"/>
           </a:xfrm>
           <a:prstGeom prst="rect">
             <a:avLst/>
@@ -24813,144 +24807,47 @@
                 </a:solidFill>
                 <a:latin typeface="Impact" panose="020B0806030902050204" pitchFamily="34" charset="0"/>
               </a:rPr>
-              <a:t>Now you are finally ready for it,</a:t>
-            </a:r>
-          </a:p>
-          <a:p>
-            <a:r>
-              <a:rPr lang="en-US" sz="4000" spc="300" dirty="0">
-                <a:solidFill>
-                  <a:srgbClr val="2EEE53"/>
-                </a:solidFill>
-                <a:latin typeface="Impact" panose="020B0806030902050204" pitchFamily="34" charset="0"/>
-              </a:rPr>
-              <a:t>Your brand new decrypted </a:t>
-            </a:r>
-            <a:r>
-              <a:rPr lang="en-US" sz="4000" b="1" u="sng" spc="300" dirty="0">
-                <a:solidFill>
-                  <a:srgbClr val="2EEE53"/>
-                </a:solidFill>
-                <a:latin typeface="Impact" panose="020B0806030902050204" pitchFamily="34" charset="0"/>
-              </a:rPr>
-              <a:t>FILE</a:t>
-            </a:r>
-            <a:r>
-              <a:rPr lang="en-US" sz="4000" spc="300" dirty="0">
-                <a:solidFill>
-                  <a:srgbClr val="2EEE53"/>
-                </a:solidFill>
-                <a:latin typeface="Impact" panose="020B0806030902050204" pitchFamily="34" charset="0"/>
-              </a:rPr>
-              <a:t> is in the </a:t>
-            </a:r>
-            <a:r>
-              <a:rPr lang="en-US" sz="4000" b="1" u="sng" spc="300" dirty="0">
-                <a:solidFill>
-                  <a:srgbClr val="2EEE53"/>
-                </a:solidFill>
-                <a:latin typeface="Impact" panose="020B0806030902050204" pitchFamily="34" charset="0"/>
-              </a:rPr>
-              <a:t>ENCRYPTE</a:t>
-            </a:r>
-            <a:r>
-              <a:rPr lang="en-US" sz="4000" spc="300" dirty="0">
-                <a:solidFill>
-                  <a:srgbClr val="2EEE53"/>
-                </a:solidFill>
-                <a:latin typeface="Impact" panose="020B0806030902050204" pitchFamily="34" charset="0"/>
-              </a:rPr>
-              <a:t> </a:t>
-            </a:r>
-            <a:r>
-              <a:rPr lang="en-US" sz="4000" b="1" u="sng" spc="300" dirty="0">
-                <a:solidFill>
-                  <a:srgbClr val="2EEE53"/>
-                </a:solidFill>
-                <a:latin typeface="Impact" panose="020B0806030902050204" pitchFamily="34" charset="0"/>
-              </a:rPr>
-              <a:t>DIRECTORY</a:t>
-            </a:r>
-            <a:r>
-              <a:rPr lang="he-IL" sz="4000" spc="300" dirty="0">
-                <a:solidFill>
-                  <a:srgbClr val="2EEE53"/>
-                </a:solidFill>
-                <a:latin typeface="Impact" panose="020B0806030902050204" pitchFamily="34" charset="0"/>
-              </a:rPr>
-              <a:t> </a:t>
-            </a:r>
-            <a:r>
-              <a:rPr lang="en-US" sz="4000" spc="300" dirty="0">
-                <a:solidFill>
-                  <a:srgbClr val="2EEE53"/>
-                </a:solidFill>
-                <a:latin typeface="Impact" panose="020B0806030902050204" pitchFamily="34" charset="0"/>
-              </a:rPr>
-              <a:t>and is called </a:t>
-            </a:r>
-            <a:r>
-              <a:rPr lang="en-US" sz="4000" b="1" i="1" u="sng" spc="300" dirty="0">
-                <a:solidFill>
-                  <a:srgbClr val="2EEE53"/>
-                </a:solidFill>
-                <a:latin typeface="Impact" panose="020B0806030902050204" pitchFamily="34" charset="0"/>
-              </a:rPr>
-              <a:t>ENCRYPTE</a:t>
-            </a:r>
-            <a:r>
-              <a:rPr lang="en-US" sz="4000" spc="300" dirty="0">
-                <a:solidFill>
-                  <a:srgbClr val="2EEE53"/>
-                </a:solidFill>
-                <a:latin typeface="Impact" panose="020B0806030902050204" pitchFamily="34" charset="0"/>
-              </a:rPr>
-              <a:t>, go Download it!</a:t>
-            </a:r>
-          </a:p>
-          <a:p>
-            <a:r>
-              <a:rPr lang="en-US" sz="4000" spc="300" dirty="0">
-                <a:solidFill>
-                  <a:srgbClr val="2EEE53"/>
-                </a:solidFill>
-                <a:latin typeface="Impact" panose="020B0806030902050204" pitchFamily="34" charset="0"/>
-              </a:rPr>
-              <a:t>And don’t forget, you’ll need the </a:t>
-            </a:r>
-            <a:r>
-              <a:rPr lang="en-US" sz="4000" i="1" u="sng" spc="300" dirty="0">
-                <a:solidFill>
-                  <a:srgbClr val="2EEE53"/>
-                </a:solidFill>
-                <a:latin typeface="Impact" panose="020B0806030902050204" pitchFamily="34" charset="0"/>
-              </a:rPr>
-              <a:t>DATAFILE</a:t>
-            </a:r>
-            <a:r>
-              <a:rPr lang="en-US" sz="4000" spc="300" dirty="0">
-                <a:solidFill>
-                  <a:srgbClr val="2EEE53"/>
-                </a:solidFill>
-                <a:latin typeface="Impact" panose="020B0806030902050204" pitchFamily="34" charset="0"/>
-              </a:rPr>
-              <a:t>  to decrypt your file later.</a:t>
-            </a:r>
-            <a:endParaRPr lang="en-US" sz="4000" b="1" u="sng" spc="300" dirty="0">
+              <a:t>Your file is being encrypted.</a:t>
+            </a:r>
+          </a:p>
+          <a:p>
+            <a:r>
+              <a:rPr lang="en-US" sz="4000" spc="300" dirty="0">
+                <a:solidFill>
+                  <a:srgbClr val="2EEE53"/>
+                </a:solidFill>
+                <a:latin typeface="Impact" panose="020B0806030902050204" pitchFamily="34" charset="0"/>
+              </a:rPr>
+              <a:t>Please wait…</a:t>
+            </a:r>
+          </a:p>
+          <a:p>
+            <a:endParaRPr lang="en-US" sz="4000" spc="300" dirty="0">
               <a:solidFill>
                 <a:srgbClr val="2EEE53"/>
               </a:solidFill>
               <a:latin typeface="Impact" panose="020B0806030902050204" pitchFamily="34" charset="0"/>
             </a:endParaRPr>
           </a:p>
-        </p:txBody>
-      </p:sp>
-      <p:sp>
-        <p:nvSpPr>
-          <p:cNvPr id="21" name="Rectangle: Diagonal Corners Snipped 20">
-            <a:extLst>
-              <a:ext uri="{FF2B5EF4-FFF2-40B4-BE49-F238E27FC236}">
-                <a16:creationId xmlns:a16="http://schemas.microsoft.com/office/drawing/2014/main" id="{55269FB2-D5C2-4595-A855-AF70120B482D}"/>
+          <a:p>
+            <a:r>
+              <a:rPr lang="en-US" sz="4000" spc="300" dirty="0">
+                <a:solidFill>
+                  <a:srgbClr val="2EEE53"/>
+                </a:solidFill>
+                <a:latin typeface="Impact" panose="020B0806030902050204" pitchFamily="34" charset="0"/>
+              </a:rPr>
+              <a:t>Progress - </a:t>
+            </a:r>
+          </a:p>
+        </p:txBody>
+      </p:sp>
+      <p:sp>
+        <p:nvSpPr>
+          <p:cNvPr id="10" name="Rectangle: Diagonal Corners Snipped 9">
+            <a:extLst>
+              <a:ext uri="{FF2B5EF4-FFF2-40B4-BE49-F238E27FC236}">
+                <a16:creationId xmlns:a16="http://schemas.microsoft.com/office/drawing/2014/main" id="{53B7CC88-4C5D-4A0E-9BCF-617CFBD05F41}"/>
               </a:ext>
             </a:extLst>
           </p:cNvPr>
@@ -24959,7 +24856,7 @@
         </p:nvSpPr>
         <p:spPr>
           <a:xfrm rot="10800000">
-            <a:off x="-302508" y="5954995"/>
+            <a:off x="10738872" y="5947621"/>
             <a:ext cx="1757927" cy="579598"/>
           </a:xfrm>
           <a:prstGeom prst="snip2DiagRect">
@@ -24975,7 +24872,7 @@
           </a:solidFill>
           <a:ln w="95250">
             <a:solidFill>
-              <a:srgbClr val="C00000"/>
+              <a:srgbClr val="2EEE53"/>
             </a:solidFill>
           </a:ln>
           <a:effectLst/>
@@ -25007,10 +24904,10 @@
       </p:sp>
       <p:sp>
         <p:nvSpPr>
-          <p:cNvPr id="22" name="TextBox 21">
-            <a:extLst>
-              <a:ext uri="{FF2B5EF4-FFF2-40B4-BE49-F238E27FC236}">
-                <a16:creationId xmlns:a16="http://schemas.microsoft.com/office/drawing/2014/main" id="{3BF0ADAB-2E25-4DFE-A509-7CDF1A777D2D}"/>
+          <p:cNvPr id="11" name="TextBox 10">
+            <a:extLst>
+              <a:ext uri="{FF2B5EF4-FFF2-40B4-BE49-F238E27FC236}">
+                <a16:creationId xmlns:a16="http://schemas.microsoft.com/office/drawing/2014/main" id="{60035FEB-C8BD-4EDD-9B1E-9A87F81EBBCE}"/>
               </a:ext>
             </a:extLst>
           </p:cNvPr>
@@ -25019,7 +24916,7 @@
         </p:nvSpPr>
         <p:spPr>
           <a:xfrm>
-            <a:off x="-223443" y="5954997"/>
+            <a:off x="10817937" y="5947623"/>
             <a:ext cx="1588814" cy="584775"/>
           </a:xfrm>
           <a:prstGeom prst="rect">
@@ -25037,118 +24934,11 @@
             <a:r>
               <a:rPr lang="en-US" sz="3200" spc="300" dirty="0">
                 <a:solidFill>
-                  <a:srgbClr val="C00000"/>
-                </a:solidFill>
-                <a:latin typeface="Impact" panose="020B0806030902050204" pitchFamily="34" charset="0"/>
-              </a:rPr>
-              <a:t>Exit</a:t>
-            </a:r>
-            <a:endParaRPr lang="en-US" sz="8000" spc="300" dirty="0">
-              <a:solidFill>
-                <a:srgbClr val="C00000"/>
-              </a:solidFill>
-              <a:latin typeface="Impact" panose="020B0806030902050204" pitchFamily="34" charset="0"/>
-            </a:endParaRPr>
-          </a:p>
-        </p:txBody>
-      </p:sp>
-      <p:sp>
-        <p:nvSpPr>
-          <p:cNvPr id="10" name="Rectangle: Diagonal Corners Snipped 9">
-            <a:extLst>
-              <a:ext uri="{FF2B5EF4-FFF2-40B4-BE49-F238E27FC236}">
-                <a16:creationId xmlns:a16="http://schemas.microsoft.com/office/drawing/2014/main" id="{53B7CC88-4C5D-4A0E-9BCF-617CFBD05F41}"/>
-              </a:ext>
-            </a:extLst>
-          </p:cNvPr>
-          <p:cNvSpPr/>
-          <p:nvPr/>
-        </p:nvSpPr>
-        <p:spPr>
-          <a:xfrm rot="10800000">
-            <a:off x="10066020" y="5953927"/>
-            <a:ext cx="2430778" cy="579598"/>
-          </a:xfrm>
-          <a:prstGeom prst="snip2DiagRect">
-            <a:avLst>
-              <a:gd name="adj1" fmla="val 50000"/>
-              <a:gd name="adj2" fmla="val 0"/>
-            </a:avLst>
-          </a:prstGeom>
-          <a:solidFill>
-            <a:schemeClr val="tx1">
-              <a:alpha val="60000"/>
-            </a:schemeClr>
-          </a:solidFill>
-          <a:ln w="95250">
-            <a:solidFill>
-              <a:schemeClr val="bg1"/>
-            </a:solidFill>
-          </a:ln>
-          <a:effectLst/>
-        </p:spPr>
-        <p:style>
-          <a:lnRef idx="2">
-            <a:schemeClr val="accent1">
-              <a:shade val="50000"/>
-            </a:schemeClr>
-          </a:lnRef>
-          <a:fillRef idx="1">
-            <a:schemeClr val="accent1"/>
-          </a:fillRef>
-          <a:effectRef idx="0">
-            <a:schemeClr val="accent1"/>
-          </a:effectRef>
-          <a:fontRef idx="minor">
-            <a:schemeClr val="lt1"/>
-          </a:fontRef>
-        </p:style>
-        <p:txBody>
-          <a:bodyPr rtlCol="0" anchor="ctr"/>
-          <a:lstStyle/>
-          <a:p>
-            <a:pPr algn="ctr"/>
-            <a:endParaRPr lang="en-US" dirty="0"/>
-          </a:p>
-        </p:txBody>
-      </p:sp>
-      <p:sp>
-        <p:nvSpPr>
-          <p:cNvPr id="11" name="TextBox 10">
-            <a:extLst>
-              <a:ext uri="{FF2B5EF4-FFF2-40B4-BE49-F238E27FC236}">
-                <a16:creationId xmlns:a16="http://schemas.microsoft.com/office/drawing/2014/main" id="{60035FEB-C8BD-4EDD-9B1E-9A87F81EBBCE}"/>
-              </a:ext>
-            </a:extLst>
-          </p:cNvPr>
-          <p:cNvSpPr txBox="1"/>
-          <p:nvPr/>
-        </p:nvSpPr>
-        <p:spPr>
-          <a:xfrm>
-            <a:off x="10066020" y="5953929"/>
-            <a:ext cx="2340731" cy="584775"/>
-          </a:xfrm>
-          <a:prstGeom prst="rect">
-            <a:avLst/>
-          </a:prstGeom>
-          <a:noFill/>
-        </p:spPr>
-        <p:txBody>
-          <a:bodyPr wrap="square" rtlCol="0">
-            <a:spAutoFit/>
-          </a:bodyPr>
-          <a:lstStyle/>
-          <a:p>
-            <a:pPr algn="ctr"/>
-            <a:r>
-              <a:rPr lang="en-US" sz="3200" spc="300" dirty="0">
-                <a:solidFill>
-                  <a:srgbClr val="2EEE53"/>
-                </a:solidFill>
-                <a:latin typeface="Impact" panose="020B0806030902050204" pitchFamily="34" charset="0"/>
-              </a:rPr>
-              <a:t>Restart</a:t>
+                  <a:srgbClr val="2EEE53"/>
+                </a:solidFill>
+                <a:latin typeface="Impact" panose="020B0806030902050204" pitchFamily="34" charset="0"/>
+              </a:rPr>
+              <a:t>Next</a:t>
             </a:r>
             <a:endParaRPr lang="en-US" sz="8000" spc="300" dirty="0">
               <a:solidFill>
@@ -25162,7 +24952,7 @@
     </p:spTree>
     <p:extLst>
       <p:ext uri="{BB962C8B-B14F-4D97-AF65-F5344CB8AC3E}">
-        <p14:creationId xmlns:p14="http://schemas.microsoft.com/office/powerpoint/2010/main" val="1472971372"/>
+        <p14:creationId xmlns:p14="http://schemas.microsoft.com/office/powerpoint/2010/main" val="1066838294"/>
       </p:ext>
     </p:extLst>
   </p:cSld>
@@ -25371,7 +25161,7 @@
         <p:spPr>
           <a:xfrm>
             <a:off x="0" y="2137947"/>
-            <a:ext cx="11719560" cy="4401205"/>
+            <a:ext cx="11719560" cy="3785652"/>
           </a:xfrm>
           <a:prstGeom prst="rect">
             <a:avLst/>
@@ -25429,6 +25219,35 @@
                 </a:solidFill>
                 <a:latin typeface="Impact" panose="020B0806030902050204" pitchFamily="34" charset="0"/>
               </a:rPr>
+              <a:t>FILE</a:t>
+            </a:r>
+            <a:r>
+              <a:rPr lang="en-US" sz="4000" spc="300" dirty="0">
+                <a:solidFill>
+                  <a:srgbClr val="2EEE53"/>
+                </a:solidFill>
+                <a:latin typeface="Impact" panose="020B0806030902050204" pitchFamily="34" charset="0"/>
+              </a:rPr>
+              <a:t>.</a:t>
+            </a:r>
+          </a:p>
+          <a:p>
+            <a:r>
+              <a:rPr lang="en-US" sz="4000" spc="300" dirty="0">
+                <a:solidFill>
+                  <a:srgbClr val="2EEE53"/>
+                </a:solidFill>
+                <a:latin typeface="Impact" panose="020B0806030902050204" pitchFamily="34" charset="0"/>
+              </a:rPr>
+              <a:t>	2. Choose a </a:t>
+            </a:r>
+            <a:r>
+              <a:rPr lang="en-US" sz="4000" u="sng" spc="300" dirty="0">
+                <a:solidFill>
+                  <a:srgbClr val="2EEE53"/>
+                </a:solidFill>
+                <a:latin typeface="Impact" panose="020B0806030902050204" pitchFamily="34" charset="0"/>
+              </a:rPr>
               <a:t>PASSWORD</a:t>
             </a:r>
             <a:r>
@@ -25449,10 +25268,57 @@
                 </a:solidFill>
                 <a:latin typeface="Impact" panose="020B0806030902050204" pitchFamily="34" charset="0"/>
               </a:rPr>
-              <a:t>	2. Choose a </a:t>
-            </a:r>
-            <a:r>
-              <a:rPr lang="en-US" sz="4000" u="sng" spc="300" dirty="0">
+              <a:t>	3. Download your new </a:t>
+            </a:r>
+            <a:r>
+              <a:rPr lang="en-US" sz="4000" b="1" u="sng" spc="300" dirty="0">
+                <a:solidFill>
+                  <a:srgbClr val="2EEE53"/>
+                </a:solidFill>
+                <a:latin typeface="Impact" panose="020B0806030902050204" pitchFamily="34" charset="0"/>
+              </a:rPr>
+              <a:t>FILES</a:t>
+            </a:r>
+            <a:r>
+              <a:rPr lang="en-US" sz="4000" spc="300" dirty="0">
+                <a:solidFill>
+                  <a:srgbClr val="2EEE53"/>
+                </a:solidFill>
+                <a:latin typeface="Impact" panose="020B0806030902050204" pitchFamily="34" charset="0"/>
+              </a:rPr>
+              <a:t>:</a:t>
+            </a:r>
+          </a:p>
+          <a:p>
+            <a:r>
+              <a:rPr lang="en-US" sz="4000" spc="300" dirty="0">
+                <a:solidFill>
+                  <a:srgbClr val="2EEE53"/>
+                </a:solidFill>
+                <a:latin typeface="Impact" panose="020B0806030902050204" pitchFamily="34" charset="0"/>
+              </a:rPr>
+              <a:t>		-</a:t>
+            </a:r>
+            <a:r>
+              <a:rPr lang="en-US" sz="4000" b="1" u="sng" spc="300" dirty="0">
+                <a:solidFill>
+                  <a:srgbClr val="2EEE53"/>
+                </a:solidFill>
+                <a:latin typeface="Impact" panose="020B0806030902050204" pitchFamily="34" charset="0"/>
+              </a:rPr>
+              <a:t>ENCRYPTE</a:t>
+            </a:r>
+            <a:r>
+              <a:rPr lang="en-US" sz="4000" spc="300" dirty="0">
+                <a:solidFill>
+                  <a:srgbClr val="2EEE53"/>
+                </a:solidFill>
+                <a:latin typeface="Impact" panose="020B0806030902050204" pitchFamily="34" charset="0"/>
+              </a:rPr>
+              <a:t>, the new encrypted </a:t>
+            </a:r>
+            <a:r>
+              <a:rPr lang="en-US" sz="4000" b="1" u="sng" spc="300" dirty="0">
                 <a:solidFill>
                   <a:srgbClr val="2EEE53"/>
                 </a:solidFill>
@@ -25478,7 +25344,7 @@
                 </a:solidFill>
                 <a:latin typeface="Impact" panose="020B0806030902050204" pitchFamily="34" charset="0"/>
               </a:rPr>
-              <a:t>	3. Download your new </a:t>
+              <a:t>		-</a:t>
             </a:r>
             <a:r>
               <a:rPr lang="en-US" sz="4000" b="1" u="sng" spc="300" dirty="0">
@@ -25487,27 +25353,16 @@
                 </a:solidFill>
                 <a:latin typeface="Impact" panose="020B0806030902050204" pitchFamily="34" charset="0"/>
               </a:rPr>
-              <a:t>FILES</a:t>
-            </a:r>
-            <a:r>
-              <a:rPr lang="en-US" sz="4000" spc="300" dirty="0">
-                <a:solidFill>
-                  <a:srgbClr val="2EEE53"/>
-                </a:solidFill>
-                <a:latin typeface="Impact" panose="020B0806030902050204" pitchFamily="34" charset="0"/>
-              </a:rPr>
-              <a:t>:</a:t>
-            </a:r>
-          </a:p>
-          <a:p>
-            <a:r>
-              <a:rPr lang="en-US" sz="4000" spc="300" dirty="0">
-                <a:solidFill>
-                  <a:srgbClr val="2EEE53"/>
-                </a:solidFill>
-                <a:latin typeface="Impact" panose="020B0806030902050204" pitchFamily="34" charset="0"/>
-              </a:rPr>
-              <a:t>		-</a:t>
+              <a:t>DATAFILE</a:t>
+            </a:r>
+            <a:r>
+              <a:rPr lang="en-US" sz="4000" spc="300" dirty="0">
+                <a:solidFill>
+                  <a:srgbClr val="2EEE53"/>
+                </a:solidFill>
+                <a:latin typeface="Impact" panose="020B0806030902050204" pitchFamily="34" charset="0"/>
+              </a:rPr>
+              <a:t>, the key </a:t>
             </a:r>
             <a:r>
               <a:rPr lang="en-US" sz="4000" b="1" u="sng" spc="300" dirty="0">
@@ -25516,24 +25371,6 @@
                 </a:solidFill>
                 <a:latin typeface="Impact" panose="020B0806030902050204" pitchFamily="34" charset="0"/>
               </a:rPr>
-              <a:t>ENCRYPTE</a:t>
-            </a:r>
-            <a:r>
-              <a:rPr lang="en-US" sz="4000" spc="300" dirty="0">
-                <a:solidFill>
-                  <a:srgbClr val="2EEE53"/>
-                </a:solidFill>
-                <a:latin typeface="Impact" panose="020B0806030902050204" pitchFamily="34" charset="0"/>
-              </a:rPr>
-              <a:t>, the new encrypted </a:t>
-            </a:r>
-            <a:r>
-              <a:rPr lang="en-US" sz="4000" b="1" u="sng" spc="300" dirty="0">
-                <a:solidFill>
-                  <a:srgbClr val="2EEE53"/>
-                </a:solidFill>
-                <a:latin typeface="Impact" panose="020B0806030902050204" pitchFamily="34" charset="0"/>
-              </a:rPr>
               <a:t>FILE</a:t>
             </a:r>
             <a:r>
@@ -25543,66 +25380,7 @@
                 </a:solidFill>
                 <a:latin typeface="Impact" panose="020B0806030902050204" pitchFamily="34" charset="0"/>
               </a:rPr>
-              <a:t>.</a:t>
-            </a:r>
-          </a:p>
-          <a:p>
-            <a:r>
-              <a:rPr lang="en-US" sz="4000" spc="300" dirty="0">
-                <a:solidFill>
-                  <a:srgbClr val="2EEE53"/>
-                </a:solidFill>
-                <a:latin typeface="Impact" panose="020B0806030902050204" pitchFamily="34" charset="0"/>
-              </a:rPr>
-              <a:t>		-</a:t>
-            </a:r>
-            <a:r>
-              <a:rPr lang="en-US" sz="4000" b="1" u="sng" spc="300" dirty="0">
-                <a:solidFill>
-                  <a:srgbClr val="2EEE53"/>
-                </a:solidFill>
-                <a:latin typeface="Impact" panose="020B0806030902050204" pitchFamily="34" charset="0"/>
-              </a:rPr>
-              <a:t>DATAFILE</a:t>
-            </a:r>
-            <a:r>
-              <a:rPr lang="en-US" sz="4000" spc="300" dirty="0">
-                <a:solidFill>
-                  <a:srgbClr val="2EEE53"/>
-                </a:solidFill>
-                <a:latin typeface="Impact" panose="020B0806030902050204" pitchFamily="34" charset="0"/>
-              </a:rPr>
-              <a:t>, the key </a:t>
-            </a:r>
-            <a:r>
-              <a:rPr lang="en-US" sz="4000" b="1" u="sng" spc="300" dirty="0">
-                <a:solidFill>
-                  <a:srgbClr val="2EEE53"/>
-                </a:solidFill>
-                <a:latin typeface="Impact" panose="020B0806030902050204" pitchFamily="34" charset="0"/>
-              </a:rPr>
-              <a:t>FILE</a:t>
-            </a:r>
-            <a:r>
-              <a:rPr lang="en-US" sz="4000" spc="300" dirty="0">
-                <a:solidFill>
-                  <a:srgbClr val="2EEE53"/>
-                </a:solidFill>
-                <a:latin typeface="Impact" panose="020B0806030902050204" pitchFamily="34" charset="0"/>
-              </a:rPr>
               <a:t> for decryption.</a:t>
-            </a:r>
-          </a:p>
-          <a:p>
-            <a:pPr lvl="2"/>
-            <a:r>
-              <a:rPr lang="en-US" sz="4000" spc="300" dirty="0">
-                <a:solidFill>
-                  <a:srgbClr val="2EEE53"/>
-                </a:solidFill>
-                <a:latin typeface="Impact" panose="020B0806030902050204" pitchFamily="34" charset="0"/>
-              </a:rPr>
-              <a:t>		</a:t>
             </a:r>
           </a:p>
         </p:txBody>
@@ -26322,6 +26100,1162 @@
           </a:solidFill>
           <a:ln w="95250">
             <a:solidFill>
+              <a:schemeClr val="bg1"/>
+            </a:solidFill>
+          </a:ln>
+          <a:effectLst/>
+        </p:spPr>
+        <p:style>
+          <a:lnRef idx="2">
+            <a:schemeClr val="accent1">
+              <a:shade val="50000"/>
+            </a:schemeClr>
+          </a:lnRef>
+          <a:fillRef idx="1">
+            <a:schemeClr val="accent1"/>
+          </a:fillRef>
+          <a:effectRef idx="0">
+            <a:schemeClr val="accent1"/>
+          </a:effectRef>
+          <a:fontRef idx="minor">
+            <a:schemeClr val="lt1"/>
+          </a:fontRef>
+        </p:style>
+        <p:txBody>
+          <a:bodyPr rtlCol="0" anchor="ctr"/>
+          <a:lstStyle/>
+          <a:p>
+            <a:pPr algn="ctr"/>
+            <a:endParaRPr lang="en-US" dirty="0"/>
+          </a:p>
+        </p:txBody>
+      </p:sp>
+      <p:sp>
+        <p:nvSpPr>
+          <p:cNvPr id="11" name="TextBox 10">
+            <a:extLst>
+              <a:ext uri="{FF2B5EF4-FFF2-40B4-BE49-F238E27FC236}">
+                <a16:creationId xmlns:a16="http://schemas.microsoft.com/office/drawing/2014/main" id="{60035FEB-C8BD-4EDD-9B1E-9A87F81EBBCE}"/>
+              </a:ext>
+            </a:extLst>
+          </p:cNvPr>
+          <p:cNvSpPr txBox="1"/>
+          <p:nvPr/>
+        </p:nvSpPr>
+        <p:spPr>
+          <a:xfrm>
+            <a:off x="10066020" y="5953929"/>
+            <a:ext cx="2340731" cy="584775"/>
+          </a:xfrm>
+          <a:prstGeom prst="rect">
+            <a:avLst/>
+          </a:prstGeom>
+          <a:noFill/>
+        </p:spPr>
+        <p:txBody>
+          <a:bodyPr wrap="square" rtlCol="0">
+            <a:spAutoFit/>
+          </a:bodyPr>
+          <a:lstStyle/>
+          <a:p>
+            <a:pPr algn="ctr"/>
+            <a:r>
+              <a:rPr lang="en-US" sz="3200" spc="300" dirty="0">
+                <a:solidFill>
+                  <a:srgbClr val="2EEE53"/>
+                </a:solidFill>
+                <a:latin typeface="Impact" panose="020B0806030902050204" pitchFamily="34" charset="0"/>
+              </a:rPr>
+              <a:t>Restart</a:t>
+            </a:r>
+            <a:endParaRPr lang="en-US" sz="8000" spc="300" dirty="0">
+              <a:solidFill>
+                <a:srgbClr val="2EEE53"/>
+              </a:solidFill>
+              <a:latin typeface="Impact" panose="020B0806030902050204" pitchFamily="34" charset="0"/>
+            </a:endParaRPr>
+          </a:p>
+        </p:txBody>
+      </p:sp>
+    </p:spTree>
+    <p:extLst>
+      <p:ext uri="{BB962C8B-B14F-4D97-AF65-F5344CB8AC3E}">
+        <p14:creationId xmlns:p14="http://schemas.microsoft.com/office/powerpoint/2010/main" val="3614375859"/>
+      </p:ext>
+    </p:extLst>
+  </p:cSld>
+  <p:clrMapOvr>
+    <a:masterClrMapping/>
+  </p:clrMapOvr>
+</p:sld>
+</file>
+
+<file path=ppt/slides/slide51.xml><?xml version="1.0" encoding="utf-8"?>
+<p:sld xmlns:a="http://schemas.openxmlformats.org/drawingml/2006/main" xmlns:r="http://schemas.openxmlformats.org/officeDocument/2006/relationships" xmlns:p="http://schemas.openxmlformats.org/presentationml/2006/main">
+  <p:cSld>
+    <p:spTree>
+      <p:nvGrpSpPr>
+        <p:cNvPr id="1" name=""/>
+        <p:cNvGrpSpPr/>
+        <p:nvPr/>
+      </p:nvGrpSpPr>
+      <p:grpSpPr>
+        <a:xfrm>
+          <a:off x="0" y="0"/>
+          <a:ext cx="0" cy="0"/>
+          <a:chOff x="0" y="0"/>
+          <a:chExt cx="0" cy="0"/>
+        </a:xfrm>
+      </p:grpSpPr>
+      <p:sp>
+        <p:nvSpPr>
+          <p:cNvPr id="40" name="Rectangle: Diagonal Corners Snipped 39">
+            <a:extLst>
+              <a:ext uri="{FF2B5EF4-FFF2-40B4-BE49-F238E27FC236}">
+                <a16:creationId xmlns:a16="http://schemas.microsoft.com/office/drawing/2014/main" id="{7BBCF4E2-9D5D-4D65-9B24-D6E002BE26A6}"/>
+              </a:ext>
+            </a:extLst>
+          </p:cNvPr>
+          <p:cNvSpPr/>
+          <p:nvPr/>
+        </p:nvSpPr>
+        <p:spPr>
+          <a:xfrm>
+            <a:off x="-375920" y="329714"/>
+            <a:ext cx="10043160" cy="1580526"/>
+          </a:xfrm>
+          <a:prstGeom prst="snip2DiagRect">
+            <a:avLst/>
+          </a:prstGeom>
+          <a:solidFill>
+            <a:schemeClr val="tx1">
+              <a:alpha val="60000"/>
+            </a:schemeClr>
+          </a:solidFill>
+          <a:ln w="95250">
+            <a:solidFill>
+              <a:schemeClr val="bg1"/>
+            </a:solidFill>
+          </a:ln>
+          <a:effectLst/>
+        </p:spPr>
+        <p:style>
+          <a:lnRef idx="2">
+            <a:schemeClr val="accent1">
+              <a:shade val="50000"/>
+            </a:schemeClr>
+          </a:lnRef>
+          <a:fillRef idx="1">
+            <a:schemeClr val="accent1"/>
+          </a:fillRef>
+          <a:effectRef idx="0">
+            <a:schemeClr val="accent1"/>
+          </a:effectRef>
+          <a:fontRef idx="minor">
+            <a:schemeClr val="lt1"/>
+          </a:fontRef>
+        </p:style>
+        <p:txBody>
+          <a:bodyPr rtlCol="0" anchor="ctr"/>
+          <a:lstStyle/>
+          <a:p>
+            <a:pPr algn="ctr"/>
+            <a:endParaRPr lang="en-US"/>
+          </a:p>
+        </p:txBody>
+      </p:sp>
+      <p:sp>
+        <p:nvSpPr>
+          <p:cNvPr id="41" name="TextBox 40">
+            <a:extLst>
+              <a:ext uri="{FF2B5EF4-FFF2-40B4-BE49-F238E27FC236}">
+                <a16:creationId xmlns:a16="http://schemas.microsoft.com/office/drawing/2014/main" id="{27B6D619-A007-418F-B651-9AF637930451}"/>
+              </a:ext>
+            </a:extLst>
+          </p:cNvPr>
+          <p:cNvSpPr txBox="1"/>
+          <p:nvPr/>
+        </p:nvSpPr>
+        <p:spPr>
+          <a:xfrm>
+            <a:off x="-375920" y="318848"/>
+            <a:ext cx="10043159" cy="1569660"/>
+          </a:xfrm>
+          <a:prstGeom prst="rect">
+            <a:avLst/>
+          </a:prstGeom>
+          <a:noFill/>
+        </p:spPr>
+        <p:txBody>
+          <a:bodyPr wrap="square" rtlCol="0" anchor="ctr">
+            <a:spAutoFit/>
+          </a:bodyPr>
+          <a:lstStyle/>
+          <a:p>
+            <a:pPr algn="ctr"/>
+            <a:r>
+              <a:rPr lang="en-US" sz="5400" spc="300" dirty="0">
+                <a:solidFill>
+                  <a:schemeClr val="bg1"/>
+                </a:solidFill>
+                <a:latin typeface="Impact" panose="020B0806030902050204" pitchFamily="34" charset="0"/>
+              </a:rPr>
+              <a:t>	</a:t>
+            </a:r>
+            <a:r>
+              <a:rPr lang="en-US" sz="9600" spc="300" dirty="0">
+                <a:solidFill>
+                  <a:srgbClr val="2EEE53"/>
+                </a:solidFill>
+                <a:latin typeface="Impact" panose="020B0806030902050204" pitchFamily="34" charset="0"/>
+              </a:rPr>
+              <a:t>The Encryption:</a:t>
+            </a:r>
+          </a:p>
+        </p:txBody>
+      </p:sp>
+      <p:sp>
+        <p:nvSpPr>
+          <p:cNvPr id="15" name="Rectangle: Diagonal Corners Snipped 14">
+            <a:extLst>
+              <a:ext uri="{FF2B5EF4-FFF2-40B4-BE49-F238E27FC236}">
+                <a16:creationId xmlns:a16="http://schemas.microsoft.com/office/drawing/2014/main" id="{DFCAC337-A778-4993-A5C4-0ECDF60A6DB3}"/>
+              </a:ext>
+            </a:extLst>
+          </p:cNvPr>
+          <p:cNvSpPr/>
+          <p:nvPr/>
+        </p:nvSpPr>
+        <p:spPr>
+          <a:xfrm>
+            <a:off x="-375920" y="2113925"/>
+            <a:ext cx="12095480" cy="3834763"/>
+          </a:xfrm>
+          <a:prstGeom prst="snip2DiagRect">
+            <a:avLst>
+              <a:gd name="adj1" fmla="val 7602"/>
+              <a:gd name="adj2" fmla="val 0"/>
+            </a:avLst>
+          </a:prstGeom>
+          <a:solidFill>
+            <a:schemeClr val="tx1">
+              <a:alpha val="60000"/>
+            </a:schemeClr>
+          </a:solidFill>
+          <a:ln w="95250">
+            <a:solidFill>
+              <a:schemeClr val="bg1"/>
+            </a:solidFill>
+          </a:ln>
+          <a:effectLst/>
+        </p:spPr>
+        <p:style>
+          <a:lnRef idx="2">
+            <a:schemeClr val="accent1">
+              <a:shade val="50000"/>
+            </a:schemeClr>
+          </a:lnRef>
+          <a:fillRef idx="1">
+            <a:schemeClr val="accent1"/>
+          </a:fillRef>
+          <a:effectRef idx="0">
+            <a:schemeClr val="accent1"/>
+          </a:effectRef>
+          <a:fontRef idx="minor">
+            <a:schemeClr val="lt1"/>
+          </a:fontRef>
+        </p:style>
+        <p:txBody>
+          <a:bodyPr rtlCol="0" anchor="ctr"/>
+          <a:lstStyle/>
+          <a:p>
+            <a:pPr algn="ctr"/>
+            <a:endParaRPr lang="en-US"/>
+          </a:p>
+        </p:txBody>
+      </p:sp>
+      <p:sp>
+        <p:nvSpPr>
+          <p:cNvPr id="16" name="TextBox 15">
+            <a:extLst>
+              <a:ext uri="{FF2B5EF4-FFF2-40B4-BE49-F238E27FC236}">
+                <a16:creationId xmlns:a16="http://schemas.microsoft.com/office/drawing/2014/main" id="{8CBEB1DC-1B52-42E4-9215-81B9ECB41B13}"/>
+              </a:ext>
+            </a:extLst>
+          </p:cNvPr>
+          <p:cNvSpPr txBox="1"/>
+          <p:nvPr/>
+        </p:nvSpPr>
+        <p:spPr>
+          <a:xfrm>
+            <a:off x="0" y="2137947"/>
+            <a:ext cx="11719560" cy="3785652"/>
+          </a:xfrm>
+          <a:prstGeom prst="rect">
+            <a:avLst/>
+          </a:prstGeom>
+          <a:noFill/>
+        </p:spPr>
+        <p:txBody>
+          <a:bodyPr wrap="square" rtlCol="0" anchor="t">
+            <a:spAutoFit/>
+          </a:bodyPr>
+          <a:lstStyle/>
+          <a:p>
+            <a:r>
+              <a:rPr lang="en-US" sz="4000" spc="300" dirty="0">
+                <a:solidFill>
+                  <a:srgbClr val="2EEE53"/>
+                </a:solidFill>
+                <a:latin typeface="Impact" panose="020B0806030902050204" pitchFamily="34" charset="0"/>
+              </a:rPr>
+              <a:t>Now you are finally ready for it,</a:t>
+            </a:r>
+          </a:p>
+          <a:p>
+            <a:r>
+              <a:rPr lang="en-US" sz="4000" spc="300" dirty="0">
+                <a:solidFill>
+                  <a:srgbClr val="2EEE53"/>
+                </a:solidFill>
+                <a:latin typeface="Impact" panose="020B0806030902050204" pitchFamily="34" charset="0"/>
+              </a:rPr>
+              <a:t>Your brand new decrypted </a:t>
+            </a:r>
+            <a:r>
+              <a:rPr lang="en-US" sz="4000" b="1" u="sng" spc="300" dirty="0">
+                <a:solidFill>
+                  <a:srgbClr val="2EEE53"/>
+                </a:solidFill>
+                <a:latin typeface="Impact" panose="020B0806030902050204" pitchFamily="34" charset="0"/>
+              </a:rPr>
+              <a:t>FILE</a:t>
+            </a:r>
+            <a:r>
+              <a:rPr lang="en-US" sz="4000" spc="300" dirty="0">
+                <a:solidFill>
+                  <a:srgbClr val="2EEE53"/>
+                </a:solidFill>
+                <a:latin typeface="Impact" panose="020B0806030902050204" pitchFamily="34" charset="0"/>
+              </a:rPr>
+              <a:t> is in the </a:t>
+            </a:r>
+            <a:r>
+              <a:rPr lang="en-US" sz="4000" b="1" u="sng" spc="300" dirty="0">
+                <a:solidFill>
+                  <a:srgbClr val="2EEE53"/>
+                </a:solidFill>
+                <a:latin typeface="Impact" panose="020B0806030902050204" pitchFamily="34" charset="0"/>
+              </a:rPr>
+              <a:t>ENCRYPTE</a:t>
+            </a:r>
+            <a:r>
+              <a:rPr lang="en-US" sz="4000" spc="300" dirty="0">
+                <a:solidFill>
+                  <a:srgbClr val="2EEE53"/>
+                </a:solidFill>
+                <a:latin typeface="Impact" panose="020B0806030902050204" pitchFamily="34" charset="0"/>
+              </a:rPr>
+              <a:t> </a:t>
+            </a:r>
+            <a:r>
+              <a:rPr lang="en-US" sz="4000" b="1" u="sng" spc="300" dirty="0">
+                <a:solidFill>
+                  <a:srgbClr val="2EEE53"/>
+                </a:solidFill>
+                <a:latin typeface="Impact" panose="020B0806030902050204" pitchFamily="34" charset="0"/>
+              </a:rPr>
+              <a:t>DIRECTORY</a:t>
+            </a:r>
+            <a:r>
+              <a:rPr lang="he-IL" sz="4000" spc="300" dirty="0">
+                <a:solidFill>
+                  <a:srgbClr val="2EEE53"/>
+                </a:solidFill>
+                <a:latin typeface="Impact" panose="020B0806030902050204" pitchFamily="34" charset="0"/>
+              </a:rPr>
+              <a:t> </a:t>
+            </a:r>
+            <a:r>
+              <a:rPr lang="en-US" sz="4000" spc="300" dirty="0">
+                <a:solidFill>
+                  <a:srgbClr val="2EEE53"/>
+                </a:solidFill>
+                <a:latin typeface="Impact" panose="020B0806030902050204" pitchFamily="34" charset="0"/>
+              </a:rPr>
+              <a:t>and is called </a:t>
+            </a:r>
+            <a:r>
+              <a:rPr lang="en-US" sz="4000" b="1" i="1" u="sng" spc="300" dirty="0">
+                <a:solidFill>
+                  <a:srgbClr val="2EEE53"/>
+                </a:solidFill>
+                <a:latin typeface="Impact" panose="020B0806030902050204" pitchFamily="34" charset="0"/>
+              </a:rPr>
+              <a:t>ENCRYPTE</a:t>
+            </a:r>
+            <a:r>
+              <a:rPr lang="en-US" sz="4000" spc="300" dirty="0">
+                <a:solidFill>
+                  <a:srgbClr val="2EEE53"/>
+                </a:solidFill>
+                <a:latin typeface="Impact" panose="020B0806030902050204" pitchFamily="34" charset="0"/>
+              </a:rPr>
+              <a:t>, go Download it!</a:t>
+            </a:r>
+          </a:p>
+          <a:p>
+            <a:r>
+              <a:rPr lang="en-US" sz="4000" spc="300" dirty="0">
+                <a:solidFill>
+                  <a:srgbClr val="2EEE53"/>
+                </a:solidFill>
+                <a:latin typeface="Impact" panose="020B0806030902050204" pitchFamily="34" charset="0"/>
+              </a:rPr>
+              <a:t>And don’t forget, you’ll need the </a:t>
+            </a:r>
+            <a:r>
+              <a:rPr lang="en-US" sz="4000" i="1" u="sng" spc="300" dirty="0">
+                <a:solidFill>
+                  <a:srgbClr val="2EEE53"/>
+                </a:solidFill>
+                <a:latin typeface="Impact" panose="020B0806030902050204" pitchFamily="34" charset="0"/>
+              </a:rPr>
+              <a:t>DATAFILE</a:t>
+            </a:r>
+            <a:r>
+              <a:rPr lang="en-US" sz="4000" spc="300" dirty="0">
+                <a:solidFill>
+                  <a:srgbClr val="2EEE53"/>
+                </a:solidFill>
+                <a:latin typeface="Impact" panose="020B0806030902050204" pitchFamily="34" charset="0"/>
+              </a:rPr>
+              <a:t>  to decrypt your file later.</a:t>
+            </a:r>
+            <a:endParaRPr lang="en-US" sz="4000" b="1" u="sng" spc="300" dirty="0">
+              <a:solidFill>
+                <a:srgbClr val="2EEE53"/>
+              </a:solidFill>
+              <a:latin typeface="Impact" panose="020B0806030902050204" pitchFamily="34" charset="0"/>
+            </a:endParaRPr>
+          </a:p>
+        </p:txBody>
+      </p:sp>
+      <p:sp>
+        <p:nvSpPr>
+          <p:cNvPr id="21" name="Rectangle: Diagonal Corners Snipped 20">
+            <a:extLst>
+              <a:ext uri="{FF2B5EF4-FFF2-40B4-BE49-F238E27FC236}">
+                <a16:creationId xmlns:a16="http://schemas.microsoft.com/office/drawing/2014/main" id="{55269FB2-D5C2-4595-A855-AF70120B482D}"/>
+              </a:ext>
+            </a:extLst>
+          </p:cNvPr>
+          <p:cNvSpPr/>
+          <p:nvPr/>
+        </p:nvSpPr>
+        <p:spPr>
+          <a:xfrm rot="10800000">
+            <a:off x="-302508" y="5954995"/>
+            <a:ext cx="1757927" cy="579598"/>
+          </a:xfrm>
+          <a:prstGeom prst="snip2DiagRect">
+            <a:avLst>
+              <a:gd name="adj1" fmla="val 50000"/>
+              <a:gd name="adj2" fmla="val 0"/>
+            </a:avLst>
+          </a:prstGeom>
+          <a:solidFill>
+            <a:schemeClr val="tx1">
+              <a:alpha val="60000"/>
+            </a:schemeClr>
+          </a:solidFill>
+          <a:ln w="95250">
+            <a:solidFill>
+              <a:srgbClr val="C00000"/>
+            </a:solidFill>
+          </a:ln>
+          <a:effectLst/>
+        </p:spPr>
+        <p:style>
+          <a:lnRef idx="2">
+            <a:schemeClr val="accent1">
+              <a:shade val="50000"/>
+            </a:schemeClr>
+          </a:lnRef>
+          <a:fillRef idx="1">
+            <a:schemeClr val="accent1"/>
+          </a:fillRef>
+          <a:effectRef idx="0">
+            <a:schemeClr val="accent1"/>
+          </a:effectRef>
+          <a:fontRef idx="minor">
+            <a:schemeClr val="lt1"/>
+          </a:fontRef>
+        </p:style>
+        <p:txBody>
+          <a:bodyPr rtlCol="0" anchor="ctr"/>
+          <a:lstStyle/>
+          <a:p>
+            <a:pPr algn="ctr"/>
+            <a:endParaRPr lang="en-US" dirty="0"/>
+          </a:p>
+        </p:txBody>
+      </p:sp>
+      <p:sp>
+        <p:nvSpPr>
+          <p:cNvPr id="22" name="TextBox 21">
+            <a:extLst>
+              <a:ext uri="{FF2B5EF4-FFF2-40B4-BE49-F238E27FC236}">
+                <a16:creationId xmlns:a16="http://schemas.microsoft.com/office/drawing/2014/main" id="{3BF0ADAB-2E25-4DFE-A509-7CDF1A777D2D}"/>
+              </a:ext>
+            </a:extLst>
+          </p:cNvPr>
+          <p:cNvSpPr txBox="1"/>
+          <p:nvPr/>
+        </p:nvSpPr>
+        <p:spPr>
+          <a:xfrm>
+            <a:off x="-223443" y="5954997"/>
+            <a:ext cx="1588814" cy="584775"/>
+          </a:xfrm>
+          <a:prstGeom prst="rect">
+            <a:avLst/>
+          </a:prstGeom>
+          <a:noFill/>
+        </p:spPr>
+        <p:txBody>
+          <a:bodyPr wrap="square" rtlCol="0">
+            <a:spAutoFit/>
+          </a:bodyPr>
+          <a:lstStyle/>
+          <a:p>
+            <a:pPr algn="ctr"/>
+            <a:r>
+              <a:rPr lang="en-US" sz="3200" spc="300" dirty="0">
+                <a:solidFill>
+                  <a:srgbClr val="C00000"/>
+                </a:solidFill>
+                <a:latin typeface="Impact" panose="020B0806030902050204" pitchFamily="34" charset="0"/>
+              </a:rPr>
+              <a:t>Exit</a:t>
+            </a:r>
+            <a:endParaRPr lang="en-US" sz="8000" spc="300" dirty="0">
+              <a:solidFill>
+                <a:srgbClr val="C00000"/>
+              </a:solidFill>
+              <a:latin typeface="Impact" panose="020B0806030902050204" pitchFamily="34" charset="0"/>
+            </a:endParaRPr>
+          </a:p>
+        </p:txBody>
+      </p:sp>
+      <p:sp>
+        <p:nvSpPr>
+          <p:cNvPr id="10" name="Rectangle: Diagonal Corners Snipped 9">
+            <a:extLst>
+              <a:ext uri="{FF2B5EF4-FFF2-40B4-BE49-F238E27FC236}">
+                <a16:creationId xmlns:a16="http://schemas.microsoft.com/office/drawing/2014/main" id="{53B7CC88-4C5D-4A0E-9BCF-617CFBD05F41}"/>
+              </a:ext>
+            </a:extLst>
+          </p:cNvPr>
+          <p:cNvSpPr/>
+          <p:nvPr/>
+        </p:nvSpPr>
+        <p:spPr>
+          <a:xfrm rot="10800000">
+            <a:off x="10066020" y="5953927"/>
+            <a:ext cx="2430778" cy="579598"/>
+          </a:xfrm>
+          <a:prstGeom prst="snip2DiagRect">
+            <a:avLst>
+              <a:gd name="adj1" fmla="val 50000"/>
+              <a:gd name="adj2" fmla="val 0"/>
+            </a:avLst>
+          </a:prstGeom>
+          <a:solidFill>
+            <a:schemeClr val="tx1">
+              <a:alpha val="60000"/>
+            </a:schemeClr>
+          </a:solidFill>
+          <a:ln w="95250">
+            <a:solidFill>
+              <a:schemeClr val="bg1"/>
+            </a:solidFill>
+          </a:ln>
+          <a:effectLst/>
+        </p:spPr>
+        <p:style>
+          <a:lnRef idx="2">
+            <a:schemeClr val="accent1">
+              <a:shade val="50000"/>
+            </a:schemeClr>
+          </a:lnRef>
+          <a:fillRef idx="1">
+            <a:schemeClr val="accent1"/>
+          </a:fillRef>
+          <a:effectRef idx="0">
+            <a:schemeClr val="accent1"/>
+          </a:effectRef>
+          <a:fontRef idx="minor">
+            <a:schemeClr val="lt1"/>
+          </a:fontRef>
+        </p:style>
+        <p:txBody>
+          <a:bodyPr rtlCol="0" anchor="ctr"/>
+          <a:lstStyle/>
+          <a:p>
+            <a:pPr algn="ctr"/>
+            <a:endParaRPr lang="en-US" dirty="0"/>
+          </a:p>
+        </p:txBody>
+      </p:sp>
+      <p:sp>
+        <p:nvSpPr>
+          <p:cNvPr id="11" name="TextBox 10">
+            <a:extLst>
+              <a:ext uri="{FF2B5EF4-FFF2-40B4-BE49-F238E27FC236}">
+                <a16:creationId xmlns:a16="http://schemas.microsoft.com/office/drawing/2014/main" id="{60035FEB-C8BD-4EDD-9B1E-9A87F81EBBCE}"/>
+              </a:ext>
+            </a:extLst>
+          </p:cNvPr>
+          <p:cNvSpPr txBox="1"/>
+          <p:nvPr/>
+        </p:nvSpPr>
+        <p:spPr>
+          <a:xfrm>
+            <a:off x="10066020" y="5953929"/>
+            <a:ext cx="2340731" cy="584775"/>
+          </a:xfrm>
+          <a:prstGeom prst="rect">
+            <a:avLst/>
+          </a:prstGeom>
+          <a:noFill/>
+        </p:spPr>
+        <p:txBody>
+          <a:bodyPr wrap="square" rtlCol="0">
+            <a:spAutoFit/>
+          </a:bodyPr>
+          <a:lstStyle/>
+          <a:p>
+            <a:pPr algn="ctr"/>
+            <a:r>
+              <a:rPr lang="en-US" sz="3200" spc="300" dirty="0">
+                <a:solidFill>
+                  <a:srgbClr val="2EEE53"/>
+                </a:solidFill>
+                <a:latin typeface="Impact" panose="020B0806030902050204" pitchFamily="34" charset="0"/>
+              </a:rPr>
+              <a:t>Restart</a:t>
+            </a:r>
+            <a:endParaRPr lang="en-US" sz="8000" spc="300" dirty="0">
+              <a:solidFill>
+                <a:srgbClr val="2EEE53"/>
+              </a:solidFill>
+              <a:latin typeface="Impact" panose="020B0806030902050204" pitchFamily="34" charset="0"/>
+            </a:endParaRPr>
+          </a:p>
+        </p:txBody>
+      </p:sp>
+    </p:spTree>
+    <p:extLst>
+      <p:ext uri="{BB962C8B-B14F-4D97-AF65-F5344CB8AC3E}">
+        <p14:creationId xmlns:p14="http://schemas.microsoft.com/office/powerpoint/2010/main" val="1472971372"/>
+      </p:ext>
+    </p:extLst>
+  </p:cSld>
+  <p:clrMapOvr>
+    <a:masterClrMapping/>
+  </p:clrMapOvr>
+</p:sld>
+</file>
+
+<file path=ppt/slides/slide52.xml><?xml version="1.0" encoding="utf-8"?>
+<p:sld xmlns:a="http://schemas.openxmlformats.org/drawingml/2006/main" xmlns:r="http://schemas.openxmlformats.org/officeDocument/2006/relationships" xmlns:p="http://schemas.openxmlformats.org/presentationml/2006/main">
+  <p:cSld>
+    <p:spTree>
+      <p:nvGrpSpPr>
+        <p:cNvPr id="1" name=""/>
+        <p:cNvGrpSpPr/>
+        <p:nvPr/>
+      </p:nvGrpSpPr>
+      <p:grpSpPr>
+        <a:xfrm>
+          <a:off x="0" y="0"/>
+          <a:ext cx="0" cy="0"/>
+          <a:chOff x="0" y="0"/>
+          <a:chExt cx="0" cy="0"/>
+        </a:xfrm>
+      </p:grpSpPr>
+      <p:sp>
+        <p:nvSpPr>
+          <p:cNvPr id="40" name="Rectangle: Diagonal Corners Snipped 39">
+            <a:extLst>
+              <a:ext uri="{FF2B5EF4-FFF2-40B4-BE49-F238E27FC236}">
+                <a16:creationId xmlns:a16="http://schemas.microsoft.com/office/drawing/2014/main" id="{7BBCF4E2-9D5D-4D65-9B24-D6E002BE26A6}"/>
+              </a:ext>
+            </a:extLst>
+          </p:cNvPr>
+          <p:cNvSpPr/>
+          <p:nvPr/>
+        </p:nvSpPr>
+        <p:spPr>
+          <a:xfrm>
+            <a:off x="-375920" y="329714"/>
+            <a:ext cx="10043160" cy="1580526"/>
+          </a:xfrm>
+          <a:prstGeom prst="snip2DiagRect">
+            <a:avLst/>
+          </a:prstGeom>
+          <a:solidFill>
+            <a:schemeClr val="tx1">
+              <a:alpha val="60000"/>
+            </a:schemeClr>
+          </a:solidFill>
+          <a:ln w="95250">
+            <a:solidFill>
+              <a:schemeClr val="bg1"/>
+            </a:solidFill>
+          </a:ln>
+          <a:effectLst/>
+        </p:spPr>
+        <p:style>
+          <a:lnRef idx="2">
+            <a:schemeClr val="accent1">
+              <a:shade val="50000"/>
+            </a:schemeClr>
+          </a:lnRef>
+          <a:fillRef idx="1">
+            <a:schemeClr val="accent1"/>
+          </a:fillRef>
+          <a:effectRef idx="0">
+            <a:schemeClr val="accent1"/>
+          </a:effectRef>
+          <a:fontRef idx="minor">
+            <a:schemeClr val="lt1"/>
+          </a:fontRef>
+        </p:style>
+        <p:txBody>
+          <a:bodyPr rtlCol="0" anchor="ctr"/>
+          <a:lstStyle/>
+          <a:p>
+            <a:pPr algn="ctr"/>
+            <a:endParaRPr lang="en-US"/>
+          </a:p>
+        </p:txBody>
+      </p:sp>
+      <p:sp>
+        <p:nvSpPr>
+          <p:cNvPr id="41" name="TextBox 40">
+            <a:extLst>
+              <a:ext uri="{FF2B5EF4-FFF2-40B4-BE49-F238E27FC236}">
+                <a16:creationId xmlns:a16="http://schemas.microsoft.com/office/drawing/2014/main" id="{27B6D619-A007-418F-B651-9AF637930451}"/>
+              </a:ext>
+            </a:extLst>
+          </p:cNvPr>
+          <p:cNvSpPr txBox="1"/>
+          <p:nvPr/>
+        </p:nvSpPr>
+        <p:spPr>
+          <a:xfrm>
+            <a:off x="-375920" y="318848"/>
+            <a:ext cx="10043159" cy="1569660"/>
+          </a:xfrm>
+          <a:prstGeom prst="rect">
+            <a:avLst/>
+          </a:prstGeom>
+          <a:noFill/>
+        </p:spPr>
+        <p:txBody>
+          <a:bodyPr wrap="square" rtlCol="0" anchor="ctr">
+            <a:spAutoFit/>
+          </a:bodyPr>
+          <a:lstStyle/>
+          <a:p>
+            <a:pPr algn="ctr"/>
+            <a:r>
+              <a:rPr lang="en-US" sz="5400" spc="300" dirty="0">
+                <a:solidFill>
+                  <a:schemeClr val="bg1"/>
+                </a:solidFill>
+                <a:latin typeface="Impact" panose="020B0806030902050204" pitchFamily="34" charset="0"/>
+              </a:rPr>
+              <a:t>	</a:t>
+            </a:r>
+            <a:r>
+              <a:rPr lang="en-US" sz="9600" spc="300" dirty="0">
+                <a:solidFill>
+                  <a:srgbClr val="2EEE53"/>
+                </a:solidFill>
+                <a:latin typeface="Impact" panose="020B0806030902050204" pitchFamily="34" charset="0"/>
+              </a:rPr>
+              <a:t>The Encryption:</a:t>
+            </a:r>
+          </a:p>
+        </p:txBody>
+      </p:sp>
+      <p:sp>
+        <p:nvSpPr>
+          <p:cNvPr id="15" name="Rectangle: Diagonal Corners Snipped 14">
+            <a:extLst>
+              <a:ext uri="{FF2B5EF4-FFF2-40B4-BE49-F238E27FC236}">
+                <a16:creationId xmlns:a16="http://schemas.microsoft.com/office/drawing/2014/main" id="{DFCAC337-A778-4993-A5C4-0ECDF60A6DB3}"/>
+              </a:ext>
+            </a:extLst>
+          </p:cNvPr>
+          <p:cNvSpPr/>
+          <p:nvPr/>
+        </p:nvSpPr>
+        <p:spPr>
+          <a:xfrm>
+            <a:off x="-375920" y="2113925"/>
+            <a:ext cx="12095480" cy="3834763"/>
+          </a:xfrm>
+          <a:prstGeom prst="snip2DiagRect">
+            <a:avLst>
+              <a:gd name="adj1" fmla="val 7602"/>
+              <a:gd name="adj2" fmla="val 0"/>
+            </a:avLst>
+          </a:prstGeom>
+          <a:solidFill>
+            <a:schemeClr val="tx1">
+              <a:alpha val="60000"/>
+            </a:schemeClr>
+          </a:solidFill>
+          <a:ln w="95250">
+            <a:solidFill>
+              <a:schemeClr val="bg1"/>
+            </a:solidFill>
+          </a:ln>
+          <a:effectLst/>
+        </p:spPr>
+        <p:style>
+          <a:lnRef idx="2">
+            <a:schemeClr val="accent1">
+              <a:shade val="50000"/>
+            </a:schemeClr>
+          </a:lnRef>
+          <a:fillRef idx="1">
+            <a:schemeClr val="accent1"/>
+          </a:fillRef>
+          <a:effectRef idx="0">
+            <a:schemeClr val="accent1"/>
+          </a:effectRef>
+          <a:fontRef idx="minor">
+            <a:schemeClr val="lt1"/>
+          </a:fontRef>
+        </p:style>
+        <p:txBody>
+          <a:bodyPr rtlCol="0" anchor="ctr"/>
+          <a:lstStyle/>
+          <a:p>
+            <a:pPr algn="ctr"/>
+            <a:endParaRPr lang="en-US"/>
+          </a:p>
+        </p:txBody>
+      </p:sp>
+      <p:sp>
+        <p:nvSpPr>
+          <p:cNvPr id="16" name="TextBox 15">
+            <a:extLst>
+              <a:ext uri="{FF2B5EF4-FFF2-40B4-BE49-F238E27FC236}">
+                <a16:creationId xmlns:a16="http://schemas.microsoft.com/office/drawing/2014/main" id="{8CBEB1DC-1B52-42E4-9215-81B9ECB41B13}"/>
+              </a:ext>
+            </a:extLst>
+          </p:cNvPr>
+          <p:cNvSpPr txBox="1"/>
+          <p:nvPr/>
+        </p:nvSpPr>
+        <p:spPr>
+          <a:xfrm>
+            <a:off x="0" y="2137947"/>
+            <a:ext cx="11719560" cy="3785652"/>
+          </a:xfrm>
+          <a:prstGeom prst="rect">
+            <a:avLst/>
+          </a:prstGeom>
+          <a:noFill/>
+        </p:spPr>
+        <p:txBody>
+          <a:bodyPr wrap="square" rtlCol="0" anchor="t">
+            <a:spAutoFit/>
+          </a:bodyPr>
+          <a:lstStyle/>
+          <a:p>
+            <a:r>
+              <a:rPr lang="en-US" sz="4000" spc="300" dirty="0">
+                <a:solidFill>
+                  <a:srgbClr val="2EEE53"/>
+                </a:solidFill>
+                <a:latin typeface="Impact" panose="020B0806030902050204" pitchFamily="34" charset="0"/>
+              </a:rPr>
+              <a:t>Now you are finally ready for it,</a:t>
+            </a:r>
+          </a:p>
+          <a:p>
+            <a:r>
+              <a:rPr lang="en-US" sz="4000" spc="300" dirty="0">
+                <a:solidFill>
+                  <a:srgbClr val="2EEE53"/>
+                </a:solidFill>
+                <a:latin typeface="Impact" panose="020B0806030902050204" pitchFamily="34" charset="0"/>
+              </a:rPr>
+              <a:t>Your brand new decrypted </a:t>
+            </a:r>
+            <a:r>
+              <a:rPr lang="en-US" sz="4000" b="1" u="sng" spc="300" dirty="0">
+                <a:solidFill>
+                  <a:srgbClr val="2EEE53"/>
+                </a:solidFill>
+                <a:latin typeface="Impact" panose="020B0806030902050204" pitchFamily="34" charset="0"/>
+              </a:rPr>
+              <a:t>FILE</a:t>
+            </a:r>
+            <a:r>
+              <a:rPr lang="en-US" sz="4000" spc="300" dirty="0">
+                <a:solidFill>
+                  <a:srgbClr val="2EEE53"/>
+                </a:solidFill>
+                <a:latin typeface="Impact" panose="020B0806030902050204" pitchFamily="34" charset="0"/>
+              </a:rPr>
+              <a:t> is in the </a:t>
+            </a:r>
+            <a:r>
+              <a:rPr lang="en-US" sz="4000" b="1" u="sng" spc="300" dirty="0">
+                <a:solidFill>
+                  <a:srgbClr val="2EEE53"/>
+                </a:solidFill>
+                <a:latin typeface="Impact" panose="020B0806030902050204" pitchFamily="34" charset="0"/>
+              </a:rPr>
+              <a:t>ENCRYPTE</a:t>
+            </a:r>
+            <a:r>
+              <a:rPr lang="en-US" sz="4000" spc="300" dirty="0">
+                <a:solidFill>
+                  <a:srgbClr val="2EEE53"/>
+                </a:solidFill>
+                <a:latin typeface="Impact" panose="020B0806030902050204" pitchFamily="34" charset="0"/>
+              </a:rPr>
+              <a:t> </a:t>
+            </a:r>
+            <a:r>
+              <a:rPr lang="en-US" sz="4000" b="1" u="sng" spc="300" dirty="0">
+                <a:solidFill>
+                  <a:srgbClr val="2EEE53"/>
+                </a:solidFill>
+                <a:latin typeface="Impact" panose="020B0806030902050204" pitchFamily="34" charset="0"/>
+              </a:rPr>
+              <a:t>DIRECTORY</a:t>
+            </a:r>
+            <a:r>
+              <a:rPr lang="he-IL" sz="4000" spc="300" dirty="0">
+                <a:solidFill>
+                  <a:srgbClr val="2EEE53"/>
+                </a:solidFill>
+                <a:latin typeface="Impact" panose="020B0806030902050204" pitchFamily="34" charset="0"/>
+              </a:rPr>
+              <a:t> </a:t>
+            </a:r>
+            <a:r>
+              <a:rPr lang="en-US" sz="4000" spc="300" dirty="0">
+                <a:solidFill>
+                  <a:srgbClr val="2EEE53"/>
+                </a:solidFill>
+                <a:latin typeface="Impact" panose="020B0806030902050204" pitchFamily="34" charset="0"/>
+              </a:rPr>
+              <a:t>and is called </a:t>
+            </a:r>
+            <a:r>
+              <a:rPr lang="en-US" sz="4000" b="1" i="1" u="sng" spc="300" dirty="0">
+                <a:solidFill>
+                  <a:srgbClr val="2EEE53"/>
+                </a:solidFill>
+                <a:latin typeface="Impact" panose="020B0806030902050204" pitchFamily="34" charset="0"/>
+              </a:rPr>
+              <a:t>ENCRYPTE</a:t>
+            </a:r>
+            <a:r>
+              <a:rPr lang="en-US" sz="4000" spc="300" dirty="0">
+                <a:solidFill>
+                  <a:srgbClr val="2EEE53"/>
+                </a:solidFill>
+                <a:latin typeface="Impact" panose="020B0806030902050204" pitchFamily="34" charset="0"/>
+              </a:rPr>
+              <a:t>, go Download it!</a:t>
+            </a:r>
+          </a:p>
+          <a:p>
+            <a:r>
+              <a:rPr lang="en-US" sz="4000" spc="300" dirty="0">
+                <a:solidFill>
+                  <a:srgbClr val="2EEE53"/>
+                </a:solidFill>
+                <a:latin typeface="Impact" panose="020B0806030902050204" pitchFamily="34" charset="0"/>
+              </a:rPr>
+              <a:t>And don’t forget, you’ll need the </a:t>
+            </a:r>
+            <a:r>
+              <a:rPr lang="en-US" sz="4000" i="1" u="sng" spc="300" dirty="0">
+                <a:solidFill>
+                  <a:srgbClr val="2EEE53"/>
+                </a:solidFill>
+                <a:latin typeface="Impact" panose="020B0806030902050204" pitchFamily="34" charset="0"/>
+              </a:rPr>
+              <a:t>DATAFILE</a:t>
+            </a:r>
+            <a:r>
+              <a:rPr lang="en-US" sz="4000" spc="300" dirty="0">
+                <a:solidFill>
+                  <a:srgbClr val="2EEE53"/>
+                </a:solidFill>
+                <a:latin typeface="Impact" panose="020B0806030902050204" pitchFamily="34" charset="0"/>
+              </a:rPr>
+              <a:t>  to decrypt your file later.</a:t>
+            </a:r>
+            <a:endParaRPr lang="en-US" sz="4000" b="1" u="sng" spc="300" dirty="0">
+              <a:solidFill>
+                <a:srgbClr val="2EEE53"/>
+              </a:solidFill>
+              <a:latin typeface="Impact" panose="020B0806030902050204" pitchFamily="34" charset="0"/>
+            </a:endParaRPr>
+          </a:p>
+        </p:txBody>
+      </p:sp>
+      <p:sp>
+        <p:nvSpPr>
+          <p:cNvPr id="21" name="Rectangle: Diagonal Corners Snipped 20">
+            <a:extLst>
+              <a:ext uri="{FF2B5EF4-FFF2-40B4-BE49-F238E27FC236}">
+                <a16:creationId xmlns:a16="http://schemas.microsoft.com/office/drawing/2014/main" id="{55269FB2-D5C2-4595-A855-AF70120B482D}"/>
+              </a:ext>
+            </a:extLst>
+          </p:cNvPr>
+          <p:cNvSpPr/>
+          <p:nvPr/>
+        </p:nvSpPr>
+        <p:spPr>
+          <a:xfrm rot="10800000">
+            <a:off x="-302508" y="5954995"/>
+            <a:ext cx="1757927" cy="579598"/>
+          </a:xfrm>
+          <a:prstGeom prst="snip2DiagRect">
+            <a:avLst>
+              <a:gd name="adj1" fmla="val 50000"/>
+              <a:gd name="adj2" fmla="val 0"/>
+            </a:avLst>
+          </a:prstGeom>
+          <a:solidFill>
+            <a:schemeClr val="tx1">
+              <a:alpha val="60000"/>
+            </a:schemeClr>
+          </a:solidFill>
+          <a:ln w="95250">
+            <a:solidFill>
+              <a:schemeClr val="bg1"/>
+            </a:solidFill>
+          </a:ln>
+          <a:effectLst/>
+        </p:spPr>
+        <p:style>
+          <a:lnRef idx="2">
+            <a:schemeClr val="accent1">
+              <a:shade val="50000"/>
+            </a:schemeClr>
+          </a:lnRef>
+          <a:fillRef idx="1">
+            <a:schemeClr val="accent1"/>
+          </a:fillRef>
+          <a:effectRef idx="0">
+            <a:schemeClr val="accent1"/>
+          </a:effectRef>
+          <a:fontRef idx="minor">
+            <a:schemeClr val="lt1"/>
+          </a:fontRef>
+        </p:style>
+        <p:txBody>
+          <a:bodyPr rtlCol="0" anchor="ctr"/>
+          <a:lstStyle/>
+          <a:p>
+            <a:pPr algn="ctr"/>
+            <a:endParaRPr lang="en-US" dirty="0"/>
+          </a:p>
+        </p:txBody>
+      </p:sp>
+      <p:sp>
+        <p:nvSpPr>
+          <p:cNvPr id="22" name="TextBox 21">
+            <a:extLst>
+              <a:ext uri="{FF2B5EF4-FFF2-40B4-BE49-F238E27FC236}">
+                <a16:creationId xmlns:a16="http://schemas.microsoft.com/office/drawing/2014/main" id="{3BF0ADAB-2E25-4DFE-A509-7CDF1A777D2D}"/>
+              </a:ext>
+            </a:extLst>
+          </p:cNvPr>
+          <p:cNvSpPr txBox="1"/>
+          <p:nvPr/>
+        </p:nvSpPr>
+        <p:spPr>
+          <a:xfrm>
+            <a:off x="-223443" y="5954997"/>
+            <a:ext cx="1588814" cy="584775"/>
+          </a:xfrm>
+          <a:prstGeom prst="rect">
+            <a:avLst/>
+          </a:prstGeom>
+          <a:noFill/>
+        </p:spPr>
+        <p:txBody>
+          <a:bodyPr wrap="square" rtlCol="0">
+            <a:spAutoFit/>
+          </a:bodyPr>
+          <a:lstStyle/>
+          <a:p>
+            <a:pPr algn="ctr"/>
+            <a:r>
+              <a:rPr lang="en-US" sz="3200" spc="300" dirty="0">
+                <a:solidFill>
+                  <a:srgbClr val="C00000"/>
+                </a:solidFill>
+                <a:latin typeface="Impact" panose="020B0806030902050204" pitchFamily="34" charset="0"/>
+              </a:rPr>
+              <a:t>Exit</a:t>
+            </a:r>
+            <a:endParaRPr lang="en-US" sz="8000" spc="300" dirty="0">
+              <a:solidFill>
+                <a:srgbClr val="C00000"/>
+              </a:solidFill>
+              <a:latin typeface="Impact" panose="020B0806030902050204" pitchFamily="34" charset="0"/>
+            </a:endParaRPr>
+          </a:p>
+        </p:txBody>
+      </p:sp>
+      <p:sp>
+        <p:nvSpPr>
+          <p:cNvPr id="10" name="Rectangle: Diagonal Corners Snipped 9">
+            <a:extLst>
+              <a:ext uri="{FF2B5EF4-FFF2-40B4-BE49-F238E27FC236}">
+                <a16:creationId xmlns:a16="http://schemas.microsoft.com/office/drawing/2014/main" id="{53B7CC88-4C5D-4A0E-9BCF-617CFBD05F41}"/>
+              </a:ext>
+            </a:extLst>
+          </p:cNvPr>
+          <p:cNvSpPr/>
+          <p:nvPr/>
+        </p:nvSpPr>
+        <p:spPr>
+          <a:xfrm rot="10800000">
+            <a:off x="10066020" y="5953927"/>
+            <a:ext cx="2430778" cy="579598"/>
+          </a:xfrm>
+          <a:prstGeom prst="snip2DiagRect">
+            <a:avLst>
+              <a:gd name="adj1" fmla="val 50000"/>
+              <a:gd name="adj2" fmla="val 0"/>
+            </a:avLst>
+          </a:prstGeom>
+          <a:solidFill>
+            <a:schemeClr val="tx1">
+              <a:alpha val="60000"/>
+            </a:schemeClr>
+          </a:solidFill>
+          <a:ln w="95250">
+            <a:solidFill>
               <a:srgbClr val="2EEE53"/>
             </a:solidFill>
           </a:ln>
@@ -26412,7 +27346,7 @@
 </p:sld>
 </file>
 
-<file path=ppt/slides/slide51.xml><?xml version="1.0" encoding="utf-8"?>
+<file path=ppt/slides/slide53.xml><?xml version="1.0" encoding="utf-8"?>
 <p:sld xmlns:a="http://schemas.openxmlformats.org/drawingml/2006/main" xmlns:r="http://schemas.openxmlformats.org/officeDocument/2006/relationships" xmlns:p="http://schemas.openxmlformats.org/presentationml/2006/main">
   <p:cSld>
     <p:bg>
@@ -26802,36 +27736,36 @@
                 </a:solidFill>
                 <a:latin typeface="Impact" panose="020B0806030902050204" pitchFamily="34" charset="0"/>
               </a:rPr>
+              <a:t>FILE</a:t>
+            </a:r>
+            <a:r>
+              <a:rPr lang="en-US" sz="4000" spc="300" dirty="0">
+                <a:solidFill>
+                  <a:srgbClr val="2EEE53"/>
+                </a:solidFill>
+                <a:latin typeface="Impact" panose="020B0806030902050204" pitchFamily="34" charset="0"/>
+              </a:rPr>
+              <a:t>.</a:t>
+            </a:r>
+          </a:p>
+          <a:p>
+            <a:r>
+              <a:rPr lang="en-US" sz="4000" spc="300" dirty="0">
+                <a:solidFill>
+                  <a:srgbClr val="2EEE53"/>
+                </a:solidFill>
+                <a:latin typeface="Impact" panose="020B0806030902050204" pitchFamily="34" charset="0"/>
+              </a:rPr>
+              <a:t>	2. Choose a </a:t>
+            </a:r>
+            <a:r>
+              <a:rPr lang="en-US" sz="4000" u="sng" spc="300" dirty="0">
+                <a:solidFill>
+                  <a:srgbClr val="2EEE53"/>
+                </a:solidFill>
+                <a:latin typeface="Impact" panose="020B0806030902050204" pitchFamily="34" charset="0"/>
+              </a:rPr>
               <a:t>PASSWORD</a:t>
-            </a:r>
-            <a:r>
-              <a:rPr lang="en-US" sz="4000" spc="300" dirty="0">
-                <a:solidFill>
-                  <a:srgbClr val="2EEE53"/>
-                </a:solidFill>
-                <a:latin typeface="Impact" panose="020B0806030902050204" pitchFamily="34" charset="0"/>
-              </a:rPr>
-              <a:t>.</a:t>
-            </a:r>
-          </a:p>
-          <a:p>
-            <a:r>
-              <a:rPr lang="en-US" sz="4000" spc="300" dirty="0">
-                <a:solidFill>
-                  <a:srgbClr val="2EEE53"/>
-                </a:solidFill>
-                <a:latin typeface="Impact" panose="020B0806030902050204" pitchFamily="34" charset="0"/>
-              </a:rPr>
-              <a:t>	2. Choose a </a:t>
-            </a:r>
-            <a:r>
-              <a:rPr lang="en-US" sz="4000" u="sng" spc="300" dirty="0">
-                <a:solidFill>
-                  <a:srgbClr val="2EEE53"/>
-                </a:solidFill>
-                <a:latin typeface="Impact" panose="020B0806030902050204" pitchFamily="34" charset="0"/>
-              </a:rPr>
-              <a:t>FILE</a:t>
             </a:r>
             <a:r>
               <a:rPr lang="en-US" sz="4000" spc="300" dirty="0">
@@ -27406,7 +28340,7 @@
         <p:spPr>
           <a:xfrm>
             <a:off x="0" y="2137947"/>
-            <a:ext cx="11719560" cy="4401205"/>
+            <a:ext cx="11719560" cy="3785652"/>
           </a:xfrm>
           <a:prstGeom prst="rect">
             <a:avLst/>
@@ -27464,6 +28398,35 @@
                 </a:solidFill>
                 <a:latin typeface="Impact" panose="020B0806030902050204" pitchFamily="34" charset="0"/>
               </a:rPr>
+              <a:t>FILE</a:t>
+            </a:r>
+            <a:r>
+              <a:rPr lang="en-US" sz="4000" spc="300" dirty="0">
+                <a:solidFill>
+                  <a:srgbClr val="2EEE53"/>
+                </a:solidFill>
+                <a:latin typeface="Impact" panose="020B0806030902050204" pitchFamily="34" charset="0"/>
+              </a:rPr>
+              <a:t>.</a:t>
+            </a:r>
+          </a:p>
+          <a:p>
+            <a:r>
+              <a:rPr lang="en-US" sz="4000" spc="300" dirty="0">
+                <a:solidFill>
+                  <a:srgbClr val="2EEE53"/>
+                </a:solidFill>
+                <a:latin typeface="Impact" panose="020B0806030902050204" pitchFamily="34" charset="0"/>
+              </a:rPr>
+              <a:t>	2. Choose a </a:t>
+            </a:r>
+            <a:r>
+              <a:rPr lang="en-US" sz="4000" u="sng" spc="300" dirty="0">
+                <a:solidFill>
+                  <a:srgbClr val="2EEE53"/>
+                </a:solidFill>
+                <a:latin typeface="Impact" panose="020B0806030902050204" pitchFamily="34" charset="0"/>
+              </a:rPr>
               <a:t>PASSWORD</a:t>
             </a:r>
             <a:r>
@@ -27484,10 +28447,57 @@
                 </a:solidFill>
                 <a:latin typeface="Impact" panose="020B0806030902050204" pitchFamily="34" charset="0"/>
               </a:rPr>
-              <a:t>	2. Choose a </a:t>
-            </a:r>
-            <a:r>
-              <a:rPr lang="en-US" sz="4000" u="sng" spc="300" dirty="0">
+              <a:t>	3. Download your new </a:t>
+            </a:r>
+            <a:r>
+              <a:rPr lang="en-US" sz="4000" b="1" u="sng" spc="300" dirty="0">
+                <a:solidFill>
+                  <a:srgbClr val="2EEE53"/>
+                </a:solidFill>
+                <a:latin typeface="Impact" panose="020B0806030902050204" pitchFamily="34" charset="0"/>
+              </a:rPr>
+              <a:t>FILES</a:t>
+            </a:r>
+            <a:r>
+              <a:rPr lang="en-US" sz="4000" spc="300" dirty="0">
+                <a:solidFill>
+                  <a:srgbClr val="2EEE53"/>
+                </a:solidFill>
+                <a:latin typeface="Impact" panose="020B0806030902050204" pitchFamily="34" charset="0"/>
+              </a:rPr>
+              <a:t>:</a:t>
+            </a:r>
+          </a:p>
+          <a:p>
+            <a:r>
+              <a:rPr lang="en-US" sz="4000" spc="300" dirty="0">
+                <a:solidFill>
+                  <a:srgbClr val="2EEE53"/>
+                </a:solidFill>
+                <a:latin typeface="Impact" panose="020B0806030902050204" pitchFamily="34" charset="0"/>
+              </a:rPr>
+              <a:t>		-</a:t>
+            </a:r>
+            <a:r>
+              <a:rPr lang="en-US" sz="4000" b="1" u="sng" spc="300" dirty="0">
+                <a:solidFill>
+                  <a:srgbClr val="2EEE53"/>
+                </a:solidFill>
+                <a:latin typeface="Impact" panose="020B0806030902050204" pitchFamily="34" charset="0"/>
+              </a:rPr>
+              <a:t>ENCRYPTE</a:t>
+            </a:r>
+            <a:r>
+              <a:rPr lang="en-US" sz="4000" spc="300" dirty="0">
+                <a:solidFill>
+                  <a:srgbClr val="2EEE53"/>
+                </a:solidFill>
+                <a:latin typeface="Impact" panose="020B0806030902050204" pitchFamily="34" charset="0"/>
+              </a:rPr>
+              <a:t>, the new encrypted </a:t>
+            </a:r>
+            <a:r>
+              <a:rPr lang="en-US" sz="4000" b="1" u="sng" spc="300" dirty="0">
                 <a:solidFill>
                   <a:srgbClr val="2EEE53"/>
                 </a:solidFill>
@@ -27513,7 +28523,7 @@
                 </a:solidFill>
                 <a:latin typeface="Impact" panose="020B0806030902050204" pitchFamily="34" charset="0"/>
               </a:rPr>
-              <a:t>	3. Download your new </a:t>
+              <a:t>		-</a:t>
             </a:r>
             <a:r>
               <a:rPr lang="en-US" sz="4000" b="1" u="sng" spc="300" dirty="0">
@@ -27522,27 +28532,16 @@
                 </a:solidFill>
                 <a:latin typeface="Impact" panose="020B0806030902050204" pitchFamily="34" charset="0"/>
               </a:rPr>
-              <a:t>FILES</a:t>
-            </a:r>
-            <a:r>
-              <a:rPr lang="en-US" sz="4000" spc="300" dirty="0">
-                <a:solidFill>
-                  <a:srgbClr val="2EEE53"/>
-                </a:solidFill>
-                <a:latin typeface="Impact" panose="020B0806030902050204" pitchFamily="34" charset="0"/>
-              </a:rPr>
-              <a:t>:</a:t>
-            </a:r>
-          </a:p>
-          <a:p>
-            <a:r>
-              <a:rPr lang="en-US" sz="4000" spc="300" dirty="0">
-                <a:solidFill>
-                  <a:srgbClr val="2EEE53"/>
-                </a:solidFill>
-                <a:latin typeface="Impact" panose="020B0806030902050204" pitchFamily="34" charset="0"/>
-              </a:rPr>
-              <a:t>		-</a:t>
+              <a:t>DATAFILE</a:t>
+            </a:r>
+            <a:r>
+              <a:rPr lang="en-US" sz="4000" spc="300" dirty="0">
+                <a:solidFill>
+                  <a:srgbClr val="2EEE53"/>
+                </a:solidFill>
+                <a:latin typeface="Impact" panose="020B0806030902050204" pitchFamily="34" charset="0"/>
+              </a:rPr>
+              <a:t>, the key </a:t>
             </a:r>
             <a:r>
               <a:rPr lang="en-US" sz="4000" b="1" u="sng" spc="300" dirty="0">
@@ -27551,24 +28550,6 @@
                 </a:solidFill>
                 <a:latin typeface="Impact" panose="020B0806030902050204" pitchFamily="34" charset="0"/>
               </a:rPr>
-              <a:t>ENCRYPTE</a:t>
-            </a:r>
-            <a:r>
-              <a:rPr lang="en-US" sz="4000" spc="300" dirty="0">
-                <a:solidFill>
-                  <a:srgbClr val="2EEE53"/>
-                </a:solidFill>
-                <a:latin typeface="Impact" panose="020B0806030902050204" pitchFamily="34" charset="0"/>
-              </a:rPr>
-              <a:t>, the new encrypted </a:t>
-            </a:r>
-            <a:r>
-              <a:rPr lang="en-US" sz="4000" b="1" u="sng" spc="300" dirty="0">
-                <a:solidFill>
-                  <a:srgbClr val="2EEE53"/>
-                </a:solidFill>
-                <a:latin typeface="Impact" panose="020B0806030902050204" pitchFamily="34" charset="0"/>
-              </a:rPr>
               <a:t>FILE</a:t>
             </a:r>
             <a:r>
@@ -27578,66 +28559,7 @@
                 </a:solidFill>
                 <a:latin typeface="Impact" panose="020B0806030902050204" pitchFamily="34" charset="0"/>
               </a:rPr>
-              <a:t>.</a:t>
-            </a:r>
-          </a:p>
-          <a:p>
-            <a:r>
-              <a:rPr lang="en-US" sz="4000" spc="300" dirty="0">
-                <a:solidFill>
-                  <a:srgbClr val="2EEE53"/>
-                </a:solidFill>
-                <a:latin typeface="Impact" panose="020B0806030902050204" pitchFamily="34" charset="0"/>
-              </a:rPr>
-              <a:t>		-</a:t>
-            </a:r>
-            <a:r>
-              <a:rPr lang="en-US" sz="4000" b="1" u="sng" spc="300" dirty="0">
-                <a:solidFill>
-                  <a:srgbClr val="2EEE53"/>
-                </a:solidFill>
-                <a:latin typeface="Impact" panose="020B0806030902050204" pitchFamily="34" charset="0"/>
-              </a:rPr>
-              <a:t>DATAFILE</a:t>
-            </a:r>
-            <a:r>
-              <a:rPr lang="en-US" sz="4000" spc="300" dirty="0">
-                <a:solidFill>
-                  <a:srgbClr val="2EEE53"/>
-                </a:solidFill>
-                <a:latin typeface="Impact" panose="020B0806030902050204" pitchFamily="34" charset="0"/>
-              </a:rPr>
-              <a:t>, the key </a:t>
-            </a:r>
-            <a:r>
-              <a:rPr lang="en-US" sz="4000" b="1" u="sng" spc="300" dirty="0">
-                <a:solidFill>
-                  <a:srgbClr val="2EEE53"/>
-                </a:solidFill>
-                <a:latin typeface="Impact" panose="020B0806030902050204" pitchFamily="34" charset="0"/>
-              </a:rPr>
-              <a:t>FILE</a:t>
-            </a:r>
-            <a:r>
-              <a:rPr lang="en-US" sz="4000" spc="300" dirty="0">
-                <a:solidFill>
-                  <a:srgbClr val="2EEE53"/>
-                </a:solidFill>
-                <a:latin typeface="Impact" panose="020B0806030902050204" pitchFamily="34" charset="0"/>
-              </a:rPr>
               <a:t> for decryption.</a:t>
-            </a:r>
-          </a:p>
-          <a:p>
-            <a:pPr lvl="2"/>
-            <a:r>
-              <a:rPr lang="en-US" sz="4000" spc="300" dirty="0">
-                <a:solidFill>
-                  <a:srgbClr val="2EEE53"/>
-                </a:solidFill>
-                <a:latin typeface="Impact" panose="020B0806030902050204" pitchFamily="34" charset="0"/>
-              </a:rPr>
-              <a:t>		</a:t>
             </a:r>
           </a:p>
         </p:txBody>

</xml_diff>